<commit_message>
Ranking de inovação - Imagens das páginas 10 e 13
</commit_message>
<xml_diff>
--- a/apresentacao-sbg-2020.pptx
+++ b/apresentacao-sbg-2020.pptx
@@ -9,31 +9,41 @@
     <p:sldId id="271" r:id="rId3"/>
     <p:sldId id="273" r:id="rId4"/>
     <p:sldId id="272" r:id="rId5"/>
-    <p:sldId id="279" r:id="rId6"/>
-    <p:sldId id="274" r:id="rId7"/>
-    <p:sldId id="275" r:id="rId8"/>
-    <p:sldId id="276" r:id="rId9"/>
-    <p:sldId id="277" r:id="rId10"/>
-    <p:sldId id="278" r:id="rId11"/>
+    <p:sldId id="280" r:id="rId6"/>
+    <p:sldId id="279" r:id="rId7"/>
+    <p:sldId id="274" r:id="rId8"/>
+    <p:sldId id="275" r:id="rId9"/>
+    <p:sldId id="276" r:id="rId10"/>
+    <p:sldId id="277" r:id="rId11"/>
+    <p:sldId id="278" r:id="rId12"/>
+    <p:sldId id="281" r:id="rId13"/>
+    <p:sldId id="282" r:id="rId14"/>
   </p:sldIdLst>
   <p:sldSz cx="9753600" cy="7315200"/>
   <p:notesSz cx="6858000" cy="9144000"/>
   <p:embeddedFontLst>
     <p:embeddedFont>
+      <p:font typeface="Calibri" panose="020F0502020204030204" pitchFamily="34" charset="0"/>
+      <p:regular r:id="rId15"/>
+      <p:bold r:id="rId16"/>
+      <p:italic r:id="rId17"/>
+      <p:boldItalic r:id="rId18"/>
+    </p:embeddedFont>
+    <p:embeddedFont>
       <p:font typeface="Josefin Sans Regular Bold" panose="020B0604020202020204" charset="0"/>
-      <p:regular r:id="rId12"/>
+      <p:regular r:id="rId19"/>
     </p:embeddedFont>
     <p:embeddedFont>
       <p:font typeface="Poppins" panose="00000500000000000000" pitchFamily="2" charset="0"/>
-      <p:regular r:id="rId13"/>
-      <p:bold r:id="rId14"/>
-      <p:italic r:id="rId15"/>
-      <p:boldItalic r:id="rId16"/>
+      <p:regular r:id="rId20"/>
+      <p:bold r:id="rId21"/>
+      <p:italic r:id="rId22"/>
+      <p:boldItalic r:id="rId23"/>
     </p:embeddedFont>
     <p:embeddedFont>
       <p:font typeface="Poppins Light" panose="00000400000000000000" pitchFamily="2" charset="0"/>
-      <p:regular r:id="rId17"/>
-      <p:italic r:id="rId18"/>
+      <p:regular r:id="rId24"/>
+      <p:italic r:id="rId25"/>
     </p:embeddedFont>
   </p:embeddedFontLst>
   <p:defaultTextStyle>
@@ -10862,6 +10872,119 @@
           <p:cNvPr id="3" name="Imagem 2">
             <a:extLst>
               <a:ext uri="{FF2B5EF4-FFF2-40B4-BE49-F238E27FC236}">
+                <a16:creationId xmlns:a16="http://schemas.microsoft.com/office/drawing/2014/main" id="{088A29E9-A7B2-4BCC-A8F4-06055C50A050}"/>
+              </a:ext>
+            </a:extLst>
+          </p:cNvPr>
+          <p:cNvPicPr>
+            <a:picLocks noChangeAspect="1"/>
+          </p:cNvPicPr>
+          <p:nvPr/>
+        </p:nvPicPr>
+        <p:blipFill>
+          <a:blip r:embed="rId2"/>
+          <a:stretch>
+            <a:fillRect/>
+          </a:stretch>
+        </p:blipFill>
+        <p:spPr>
+          <a:xfrm>
+            <a:off x="1676400" y="1143000"/>
+            <a:ext cx="6524625" cy="5372100"/>
+          </a:xfrm>
+          <a:prstGeom prst="rect">
+            <a:avLst/>
+          </a:prstGeom>
+        </p:spPr>
+      </p:pic>
+      <p:sp>
+        <p:nvSpPr>
+          <p:cNvPr id="5" name="CaixaDeTexto 4">
+            <a:extLst>
+              <a:ext uri="{FF2B5EF4-FFF2-40B4-BE49-F238E27FC236}">
+                <a16:creationId xmlns:a16="http://schemas.microsoft.com/office/drawing/2014/main" id="{5E33B2A3-CAD5-4061-932A-034289628260}"/>
+              </a:ext>
+            </a:extLst>
+          </p:cNvPr>
+          <p:cNvSpPr txBox="1"/>
+          <p:nvPr/>
+        </p:nvSpPr>
+        <p:spPr>
+          <a:xfrm>
+            <a:off x="1918274" y="6781800"/>
+            <a:ext cx="6040876" cy="338554"/>
+          </a:xfrm>
+          <a:prstGeom prst="rect">
+            <a:avLst/>
+          </a:prstGeom>
+          <a:noFill/>
+        </p:spPr>
+        <p:txBody>
+          <a:bodyPr wrap="square">
+            <a:spAutoFit/>
+          </a:bodyPr>
+          <a:lstStyle/>
+          <a:p>
+            <a:pPr algn="l"/>
+            <a:r>
+              <a:rPr lang="pt-BR" sz="800" b="0" i="0" u="none" strike="noStrike" baseline="0" dirty="0">
+                <a:latin typeface="Poppins" panose="00000500000000000000" pitchFamily="2" charset="0"/>
+                <a:cs typeface="Poppins" panose="00000500000000000000" pitchFamily="2" charset="0"/>
+              </a:rPr>
+              <a:t>Fonte: IBGE, Diretoria de Pesquisas, Coordenação de Serviços</a:t>
+            </a:r>
+          </a:p>
+          <a:p>
+            <a:pPr algn="l"/>
+            <a:r>
+              <a:rPr lang="pt-BR" sz="800" b="0" i="0" u="none" strike="noStrike" baseline="0" dirty="0">
+                <a:latin typeface="Poppins" panose="00000500000000000000" pitchFamily="2" charset="0"/>
+                <a:cs typeface="Poppins" panose="00000500000000000000" pitchFamily="2" charset="0"/>
+              </a:rPr>
+              <a:t>e Comércio, Pesquisa de Inovação 2009-2017.</a:t>
+            </a:r>
+            <a:endParaRPr lang="pt-BR" dirty="0">
+              <a:latin typeface="Poppins" panose="00000500000000000000" pitchFamily="2" charset="0"/>
+              <a:cs typeface="Poppins" panose="00000500000000000000" pitchFamily="2" charset="0"/>
+            </a:endParaRPr>
+          </a:p>
+        </p:txBody>
+      </p:sp>
+    </p:spTree>
+    <p:extLst>
+      <p:ext uri="{BB962C8B-B14F-4D97-AF65-F5344CB8AC3E}">
+        <p14:creationId xmlns:p14="http://schemas.microsoft.com/office/powerpoint/2010/main" val="2495432460"/>
+      </p:ext>
+    </p:extLst>
+  </p:cSld>
+  <p:clrMapOvr>
+    <a:masterClrMapping/>
+  </p:clrMapOvr>
+</p:sld>
+</file>
+
+<file path=ppt/slides/slide11.xml><?xml version="1.0" encoding="utf-8"?>
+<p:sld xmlns:a="http://schemas.openxmlformats.org/drawingml/2006/main" xmlns:r="http://schemas.openxmlformats.org/officeDocument/2006/relationships" xmlns:p="http://schemas.openxmlformats.org/presentationml/2006/main">
+  <p:cSld>
+    <p:spTree>
+      <p:nvGrpSpPr>
+        <p:cNvPr id="1" name=""/>
+        <p:cNvGrpSpPr/>
+        <p:nvPr/>
+      </p:nvGrpSpPr>
+      <p:grpSpPr>
+        <a:xfrm>
+          <a:off x="0" y="0"/>
+          <a:ext cx="0" cy="0"/>
+          <a:chOff x="0" y="0"/>
+          <a:chExt cx="0" cy="0"/>
+        </a:xfrm>
+      </p:grpSpPr>
+      <p:pic>
+        <p:nvPicPr>
+          <p:cNvPr id="3" name="Imagem 2">
+            <a:extLst>
+              <a:ext uri="{FF2B5EF4-FFF2-40B4-BE49-F238E27FC236}">
                 <a16:creationId xmlns:a16="http://schemas.microsoft.com/office/drawing/2014/main" id="{017E1B08-DB3A-4C61-A806-4BD4A4E1FB18}"/>
               </a:ext>
             </a:extLst>
@@ -10944,6 +11067,134 @@
     <p:extLst>
       <p:ext uri="{BB962C8B-B14F-4D97-AF65-F5344CB8AC3E}">
         <p14:creationId xmlns:p14="http://schemas.microsoft.com/office/powerpoint/2010/main" val="1653088542"/>
+      </p:ext>
+    </p:extLst>
+  </p:cSld>
+  <p:clrMapOvr>
+    <a:masterClrMapping/>
+  </p:clrMapOvr>
+</p:sld>
+</file>
+
+<file path=ppt/slides/slide12.xml><?xml version="1.0" encoding="utf-8"?>
+<p:sld xmlns:a="http://schemas.openxmlformats.org/drawingml/2006/main" xmlns:r="http://schemas.openxmlformats.org/officeDocument/2006/relationships" xmlns:p="http://schemas.openxmlformats.org/presentationml/2006/main">
+  <p:cSld>
+    <p:spTree>
+      <p:nvGrpSpPr>
+        <p:cNvPr id="1" name=""/>
+        <p:cNvGrpSpPr/>
+        <p:nvPr/>
+      </p:nvGrpSpPr>
+      <p:grpSpPr>
+        <a:xfrm>
+          <a:off x="0" y="0"/>
+          <a:ext cx="0" cy="0"/>
+          <a:chOff x="0" y="0"/>
+          <a:chExt cx="0" cy="0"/>
+        </a:xfrm>
+      </p:grpSpPr>
+      <p:sp>
+        <p:nvSpPr>
+          <p:cNvPr id="2" name="Título 1">
+            <a:extLst>
+              <a:ext uri="{FF2B5EF4-FFF2-40B4-BE49-F238E27FC236}">
+                <a16:creationId xmlns:a16="http://schemas.microsoft.com/office/drawing/2014/main" id="{B04E7774-7D4A-4F74-B33E-EBD461F07DB6}"/>
+              </a:ext>
+            </a:extLst>
+          </p:cNvPr>
+          <p:cNvSpPr>
+            <a:spLocks noGrp="1"/>
+          </p:cNvSpPr>
+          <p:nvPr>
+            <p:ph type="title"/>
+          </p:nvPr>
+        </p:nvSpPr>
+        <p:spPr/>
+        <p:txBody>
+          <a:bodyPr/>
+          <a:lstStyle/>
+          <a:p>
+            <a:r>
+              <a:rPr lang="pt-BR" sz="1800" b="1" dirty="0">
+                <a:effectLst/>
+                <a:latin typeface="Calibri" panose="020F0502020204030204" pitchFamily="34" charset="0"/>
+                <a:ea typeface="Calibri" panose="020F0502020204030204" pitchFamily="34" charset="0"/>
+                <a:cs typeface="Times New Roman" panose="02020603050405020304" pitchFamily="18" charset="0"/>
+              </a:rPr>
+              <a:t>Índice Global de Inovação 2019</a:t>
+            </a:r>
+            <a:endParaRPr lang="pt-BR" dirty="0"/>
+          </a:p>
+        </p:txBody>
+      </p:sp>
+    </p:spTree>
+    <p:extLst>
+      <p:ext uri="{BB962C8B-B14F-4D97-AF65-F5344CB8AC3E}">
+        <p14:creationId xmlns:p14="http://schemas.microsoft.com/office/powerpoint/2010/main" val="2821038028"/>
+      </p:ext>
+    </p:extLst>
+  </p:cSld>
+  <p:clrMapOvr>
+    <a:masterClrMapping/>
+  </p:clrMapOvr>
+</p:sld>
+</file>
+
+<file path=ppt/slides/slide13.xml><?xml version="1.0" encoding="utf-8"?>
+<p:sld xmlns:a="http://schemas.openxmlformats.org/drawingml/2006/main" xmlns:r="http://schemas.openxmlformats.org/officeDocument/2006/relationships" xmlns:p="http://schemas.openxmlformats.org/presentationml/2006/main">
+  <p:cSld>
+    <p:spTree>
+      <p:nvGrpSpPr>
+        <p:cNvPr id="1" name=""/>
+        <p:cNvGrpSpPr/>
+        <p:nvPr/>
+      </p:nvGrpSpPr>
+      <p:grpSpPr>
+        <a:xfrm>
+          <a:off x="0" y="0"/>
+          <a:ext cx="0" cy="0"/>
+          <a:chOff x="0" y="0"/>
+          <a:chExt cx="0" cy="0"/>
+        </a:xfrm>
+      </p:grpSpPr>
+      <p:sp>
+        <p:nvSpPr>
+          <p:cNvPr id="2" name="Título 1">
+            <a:extLst>
+              <a:ext uri="{FF2B5EF4-FFF2-40B4-BE49-F238E27FC236}">
+                <a16:creationId xmlns:a16="http://schemas.microsoft.com/office/drawing/2014/main" id="{3438147E-AC69-42F8-8FAF-747C320F62BE}"/>
+              </a:ext>
+            </a:extLst>
+          </p:cNvPr>
+          <p:cNvSpPr>
+            <a:spLocks noGrp="1"/>
+          </p:cNvSpPr>
+          <p:nvPr>
+            <p:ph type="title"/>
+          </p:nvPr>
+        </p:nvSpPr>
+        <p:spPr/>
+        <p:txBody>
+          <a:bodyPr/>
+          <a:lstStyle/>
+          <a:p>
+            <a:r>
+              <a:rPr lang="pt-BR" sz="1800" b="1" dirty="0">
+                <a:effectLst/>
+                <a:latin typeface="Calibri" panose="020F0502020204030204" pitchFamily="34" charset="0"/>
+                <a:ea typeface="Calibri" panose="020F0502020204030204" pitchFamily="34" charset="0"/>
+                <a:cs typeface="Times New Roman" panose="02020603050405020304" pitchFamily="18" charset="0"/>
+              </a:rPr>
+              <a:t>Indicadores Nacionais de Ciência e Tecnologia e Inovação 2019</a:t>
+            </a:r>
+            <a:endParaRPr lang="pt-BR" dirty="0"/>
+          </a:p>
+        </p:txBody>
+      </p:sp>
+    </p:spTree>
+    <p:extLst>
+      <p:ext uri="{BB962C8B-B14F-4D97-AF65-F5344CB8AC3E}">
+        <p14:creationId xmlns:p14="http://schemas.microsoft.com/office/powerpoint/2010/main" val="1387175423"/>
       </p:ext>
     </p:extLst>
   </p:cSld>
@@ -11510,6 +11761,70 @@
           <a:chExt cx="0" cy="0"/>
         </a:xfrm>
       </p:grpSpPr>
+      <p:sp>
+        <p:nvSpPr>
+          <p:cNvPr id="4" name="Título 3">
+            <a:extLst>
+              <a:ext uri="{FF2B5EF4-FFF2-40B4-BE49-F238E27FC236}">
+                <a16:creationId xmlns:a16="http://schemas.microsoft.com/office/drawing/2014/main" id="{BDA5AA84-2FD4-42C1-A252-B96CA0A4164D}"/>
+              </a:ext>
+            </a:extLst>
+          </p:cNvPr>
+          <p:cNvSpPr>
+            <a:spLocks noGrp="1"/>
+          </p:cNvSpPr>
+          <p:nvPr>
+            <p:ph type="title"/>
+          </p:nvPr>
+        </p:nvSpPr>
+        <p:spPr/>
+        <p:txBody>
+          <a:bodyPr/>
+          <a:lstStyle/>
+          <a:p>
+            <a:r>
+              <a:rPr lang="pt-BR" sz="1800" b="1" dirty="0">
+                <a:effectLst/>
+                <a:latin typeface="Calibri" panose="020F0502020204030204" pitchFamily="34" charset="0"/>
+                <a:ea typeface="Calibri" panose="020F0502020204030204" pitchFamily="34" charset="0"/>
+                <a:cs typeface="Times New Roman" panose="02020603050405020304" pitchFamily="18" charset="0"/>
+              </a:rPr>
+              <a:t>PINTEC 2017</a:t>
+            </a:r>
+            <a:endParaRPr lang="pt-BR" dirty="0"/>
+          </a:p>
+        </p:txBody>
+      </p:sp>
+    </p:spTree>
+    <p:extLst>
+      <p:ext uri="{BB962C8B-B14F-4D97-AF65-F5344CB8AC3E}">
+        <p14:creationId xmlns:p14="http://schemas.microsoft.com/office/powerpoint/2010/main" val="586104128"/>
+      </p:ext>
+    </p:extLst>
+  </p:cSld>
+  <p:clrMapOvr>
+    <a:masterClrMapping/>
+  </p:clrMapOvr>
+</p:sld>
+</file>
+
+<file path=ppt/slides/slide6.xml><?xml version="1.0" encoding="utf-8"?>
+<p:sld xmlns:a="http://schemas.openxmlformats.org/drawingml/2006/main" xmlns:r="http://schemas.openxmlformats.org/officeDocument/2006/relationships" xmlns:p="http://schemas.openxmlformats.org/presentationml/2006/main">
+  <p:cSld>
+    <p:spTree>
+      <p:nvGrpSpPr>
+        <p:cNvPr id="1" name=""/>
+        <p:cNvGrpSpPr/>
+        <p:nvPr/>
+      </p:nvGrpSpPr>
+      <p:grpSpPr>
+        <a:xfrm>
+          <a:off x="0" y="0"/>
+          <a:ext cx="0" cy="0"/>
+          <a:chOff x="0" y="0"/>
+          <a:chExt cx="0" cy="0"/>
+        </a:xfrm>
+      </p:grpSpPr>
       <p:pic>
         <p:nvPicPr>
           <p:cNvPr id="3" name="Imagem 2">
@@ -11617,7 +11932,7 @@
 </p:sld>
 </file>
 
-<file path=ppt/slides/slide6.xml><?xml version="1.0" encoding="utf-8"?>
+<file path=ppt/slides/slide7.xml><?xml version="1.0" encoding="utf-8"?>
 <p:sld xmlns:a="http://schemas.openxmlformats.org/drawingml/2006/main" xmlns:r="http://schemas.openxmlformats.org/officeDocument/2006/relationships" xmlns:p="http://schemas.openxmlformats.org/presentationml/2006/main">
   <p:cSld>
     <p:spTree>
@@ -11741,7 +12056,7 @@
 </p:sld>
 </file>
 
-<file path=ppt/slides/slide7.xml><?xml version="1.0" encoding="utf-8"?>
+<file path=ppt/slides/slide8.xml><?xml version="1.0" encoding="utf-8"?>
 <p:sld xmlns:a="http://schemas.openxmlformats.org/drawingml/2006/main" xmlns:r="http://schemas.openxmlformats.org/officeDocument/2006/relationships" xmlns:p="http://schemas.openxmlformats.org/presentationml/2006/main">
   <p:cSld>
     <p:spTree>
@@ -11885,7 +12200,7 @@
 </p:sld>
 </file>
 
-<file path=ppt/slides/slide8.xml><?xml version="1.0" encoding="utf-8"?>
+<file path=ppt/slides/slide9.xml><?xml version="1.0" encoding="utf-8"?>
 <p:sld xmlns:a="http://schemas.openxmlformats.org/drawingml/2006/main" xmlns:r="http://schemas.openxmlformats.org/officeDocument/2006/relationships" xmlns:p="http://schemas.openxmlformats.org/presentationml/2006/main">
   <p:cSld>
     <p:spTree>
@@ -11989,119 +12304,6 @@
     <p:extLst>
       <p:ext uri="{BB962C8B-B14F-4D97-AF65-F5344CB8AC3E}">
         <p14:creationId xmlns:p14="http://schemas.microsoft.com/office/powerpoint/2010/main" val="4280588949"/>
-      </p:ext>
-    </p:extLst>
-  </p:cSld>
-  <p:clrMapOvr>
-    <a:masterClrMapping/>
-  </p:clrMapOvr>
-</p:sld>
-</file>
-
-<file path=ppt/slides/slide9.xml><?xml version="1.0" encoding="utf-8"?>
-<p:sld xmlns:a="http://schemas.openxmlformats.org/drawingml/2006/main" xmlns:r="http://schemas.openxmlformats.org/officeDocument/2006/relationships" xmlns:p="http://schemas.openxmlformats.org/presentationml/2006/main">
-  <p:cSld>
-    <p:spTree>
-      <p:nvGrpSpPr>
-        <p:cNvPr id="1" name=""/>
-        <p:cNvGrpSpPr/>
-        <p:nvPr/>
-      </p:nvGrpSpPr>
-      <p:grpSpPr>
-        <a:xfrm>
-          <a:off x="0" y="0"/>
-          <a:ext cx="0" cy="0"/>
-          <a:chOff x="0" y="0"/>
-          <a:chExt cx="0" cy="0"/>
-        </a:xfrm>
-      </p:grpSpPr>
-      <p:pic>
-        <p:nvPicPr>
-          <p:cNvPr id="3" name="Imagem 2">
-            <a:extLst>
-              <a:ext uri="{FF2B5EF4-FFF2-40B4-BE49-F238E27FC236}">
-                <a16:creationId xmlns:a16="http://schemas.microsoft.com/office/drawing/2014/main" id="{088A29E9-A7B2-4BCC-A8F4-06055C50A050}"/>
-              </a:ext>
-            </a:extLst>
-          </p:cNvPr>
-          <p:cNvPicPr>
-            <a:picLocks noChangeAspect="1"/>
-          </p:cNvPicPr>
-          <p:nvPr/>
-        </p:nvPicPr>
-        <p:blipFill>
-          <a:blip r:embed="rId2"/>
-          <a:stretch>
-            <a:fillRect/>
-          </a:stretch>
-        </p:blipFill>
-        <p:spPr>
-          <a:xfrm>
-            <a:off x="1676400" y="1143000"/>
-            <a:ext cx="6524625" cy="5372100"/>
-          </a:xfrm>
-          <a:prstGeom prst="rect">
-            <a:avLst/>
-          </a:prstGeom>
-        </p:spPr>
-      </p:pic>
-      <p:sp>
-        <p:nvSpPr>
-          <p:cNvPr id="5" name="CaixaDeTexto 4">
-            <a:extLst>
-              <a:ext uri="{FF2B5EF4-FFF2-40B4-BE49-F238E27FC236}">
-                <a16:creationId xmlns:a16="http://schemas.microsoft.com/office/drawing/2014/main" id="{5E33B2A3-CAD5-4061-932A-034289628260}"/>
-              </a:ext>
-            </a:extLst>
-          </p:cNvPr>
-          <p:cNvSpPr txBox="1"/>
-          <p:nvPr/>
-        </p:nvSpPr>
-        <p:spPr>
-          <a:xfrm>
-            <a:off x="1918274" y="6781800"/>
-            <a:ext cx="6040876" cy="338554"/>
-          </a:xfrm>
-          <a:prstGeom prst="rect">
-            <a:avLst/>
-          </a:prstGeom>
-          <a:noFill/>
-        </p:spPr>
-        <p:txBody>
-          <a:bodyPr wrap="square">
-            <a:spAutoFit/>
-          </a:bodyPr>
-          <a:lstStyle/>
-          <a:p>
-            <a:pPr algn="l"/>
-            <a:r>
-              <a:rPr lang="pt-BR" sz="800" b="0" i="0" u="none" strike="noStrike" baseline="0" dirty="0">
-                <a:latin typeface="Poppins" panose="00000500000000000000" pitchFamily="2" charset="0"/>
-                <a:cs typeface="Poppins" panose="00000500000000000000" pitchFamily="2" charset="0"/>
-              </a:rPr>
-              <a:t>Fonte: IBGE, Diretoria de Pesquisas, Coordenação de Serviços</a:t>
-            </a:r>
-          </a:p>
-          <a:p>
-            <a:pPr algn="l"/>
-            <a:r>
-              <a:rPr lang="pt-BR" sz="800" b="0" i="0" u="none" strike="noStrike" baseline="0" dirty="0">
-                <a:latin typeface="Poppins" panose="00000500000000000000" pitchFamily="2" charset="0"/>
-                <a:cs typeface="Poppins" panose="00000500000000000000" pitchFamily="2" charset="0"/>
-              </a:rPr>
-              <a:t>e Comércio, Pesquisa de Inovação 2009-2017.</a:t>
-            </a:r>
-            <a:endParaRPr lang="pt-BR" dirty="0">
-              <a:latin typeface="Poppins" panose="00000500000000000000" pitchFamily="2" charset="0"/>
-              <a:cs typeface="Poppins" panose="00000500000000000000" pitchFamily="2" charset="0"/>
-            </a:endParaRPr>
-          </a:p>
-        </p:txBody>
-      </p:sp>
-    </p:spTree>
-    <p:extLst>
-      <p:ext uri="{BB962C8B-B14F-4D97-AF65-F5344CB8AC3E}">
-        <p14:creationId xmlns:p14="http://schemas.microsoft.com/office/powerpoint/2010/main" val="2495432460"/>
       </p:ext>
     </p:extLst>
   </p:cSld>

</xml_diff>

<commit_message>
Ranking de inovação - imagens extraídas até a página 20
</commit_message>
<xml_diff>
--- a/apresentacao-sbg-2020.pptx
+++ b/apresentacao-sbg-2020.pptx
@@ -17,33 +17,39 @@
     <p:sldId id="277" r:id="rId11"/>
     <p:sldId id="278" r:id="rId12"/>
     <p:sldId id="281" r:id="rId13"/>
-    <p:sldId id="282" r:id="rId14"/>
+    <p:sldId id="283" r:id="rId14"/>
+    <p:sldId id="284" r:id="rId15"/>
+    <p:sldId id="285" r:id="rId16"/>
+    <p:sldId id="286" r:id="rId17"/>
+    <p:sldId id="287" r:id="rId18"/>
+    <p:sldId id="288" r:id="rId19"/>
+    <p:sldId id="282" r:id="rId20"/>
   </p:sldIdLst>
   <p:sldSz cx="9753600" cy="7315200"/>
   <p:notesSz cx="6858000" cy="9144000"/>
   <p:embeddedFontLst>
     <p:embeddedFont>
       <p:font typeface="Calibri" panose="020F0502020204030204" pitchFamily="34" charset="0"/>
-      <p:regular r:id="rId15"/>
-      <p:bold r:id="rId16"/>
-      <p:italic r:id="rId17"/>
-      <p:boldItalic r:id="rId18"/>
+      <p:regular r:id="rId21"/>
+      <p:bold r:id="rId22"/>
+      <p:italic r:id="rId23"/>
+      <p:boldItalic r:id="rId24"/>
     </p:embeddedFont>
     <p:embeddedFont>
       <p:font typeface="Josefin Sans Regular Bold" panose="020B0604020202020204" charset="0"/>
-      <p:regular r:id="rId19"/>
+      <p:regular r:id="rId25"/>
     </p:embeddedFont>
     <p:embeddedFont>
       <p:font typeface="Poppins" panose="00000500000000000000" pitchFamily="2" charset="0"/>
-      <p:regular r:id="rId20"/>
-      <p:bold r:id="rId21"/>
-      <p:italic r:id="rId22"/>
-      <p:boldItalic r:id="rId23"/>
+      <p:regular r:id="rId26"/>
+      <p:bold r:id="rId27"/>
+      <p:italic r:id="rId28"/>
+      <p:boldItalic r:id="rId29"/>
     </p:embeddedFont>
     <p:embeddedFont>
       <p:font typeface="Poppins Light" panose="00000400000000000000" pitchFamily="2" charset="0"/>
-      <p:regular r:id="rId24"/>
-      <p:italic r:id="rId25"/>
+      <p:regular r:id="rId30"/>
+      <p:italic r:id="rId31"/>
     </p:embeddedFont>
   </p:embeddedFontLst>
   <p:defaultTextStyle>
@@ -11159,6 +11165,1751 @@
       </p:grpSpPr>
       <p:sp>
         <p:nvSpPr>
+          <p:cNvPr id="5" name="Título 4">
+            <a:extLst>
+              <a:ext uri="{FF2B5EF4-FFF2-40B4-BE49-F238E27FC236}">
+                <a16:creationId xmlns:a16="http://schemas.microsoft.com/office/drawing/2014/main" id="{5DC841AD-A50F-498A-BC63-3C68D84A2962}"/>
+              </a:ext>
+            </a:extLst>
+          </p:cNvPr>
+          <p:cNvSpPr>
+            <a:spLocks noGrp="1"/>
+          </p:cNvSpPr>
+          <p:nvPr>
+            <p:ph type="title"/>
+          </p:nvPr>
+        </p:nvSpPr>
+        <p:spPr/>
+        <p:txBody>
+          <a:bodyPr>
+            <a:normAutofit fontScale="90000"/>
+          </a:bodyPr>
+          <a:lstStyle/>
+          <a:p>
+            <a:r>
+              <a:rPr lang="pt-BR" dirty="0"/>
+              <a:t>Líderes Globais em Inovação em 2019</a:t>
+            </a:r>
+          </a:p>
+        </p:txBody>
+      </p:sp>
+      <p:sp>
+        <p:nvSpPr>
+          <p:cNvPr id="13" name="Espaço Reservado para Texto 12">
+            <a:extLst>
+              <a:ext uri="{FF2B5EF4-FFF2-40B4-BE49-F238E27FC236}">
+                <a16:creationId xmlns:a16="http://schemas.microsoft.com/office/drawing/2014/main" id="{C9CD8A97-EC2C-40A6-8D21-F3B7BA1B2F43}"/>
+              </a:ext>
+            </a:extLst>
+          </p:cNvPr>
+          <p:cNvSpPr>
+            <a:spLocks noGrp="1"/>
+          </p:cNvSpPr>
+          <p:nvPr>
+            <p:ph type="body" sz="quarter" idx="13"/>
+          </p:nvPr>
+        </p:nvSpPr>
+        <p:spPr/>
+        <p:txBody>
+          <a:bodyPr>
+            <a:normAutofit fontScale="92500" lnSpcReduction="10000"/>
+          </a:bodyPr>
+          <a:lstStyle/>
+          <a:p>
+            <a:r>
+              <a:rPr lang="pt-BR" dirty="0"/>
+              <a:t>As 3 principais economias da inovação por região</a:t>
+            </a:r>
+          </a:p>
+          <a:p>
+            <a:endParaRPr lang="pt-BR" dirty="0"/>
+          </a:p>
+        </p:txBody>
+      </p:sp>
+      <p:pic>
+        <p:nvPicPr>
+          <p:cNvPr id="15" name="Espaço Reservado para Conteúdo 14" descr="Uma imagem contendo texto, screenshot&#10;&#10;Descrição gerada automaticamente">
+            <a:extLst>
+              <a:ext uri="{FF2B5EF4-FFF2-40B4-BE49-F238E27FC236}">
+                <a16:creationId xmlns:a16="http://schemas.microsoft.com/office/drawing/2014/main" id="{769D3350-7D76-4708-AB44-DC043D584D1E}"/>
+              </a:ext>
+            </a:extLst>
+          </p:cNvPr>
+          <p:cNvPicPr>
+            <a:picLocks noGrp="1" noChangeAspect="1"/>
+          </p:cNvPicPr>
+          <p:nvPr>
+            <p:ph idx="1"/>
+          </p:nvPr>
+        </p:nvPicPr>
+        <p:blipFill>
+          <a:blip r:embed="rId2" cstate="print">
+            <a:extLst>
+              <a:ext uri="{28A0092B-C50C-407E-A947-70E740481C1C}">
+                <a14:useLocalDpi xmlns:a14="http://schemas.microsoft.com/office/drawing/2010/main" val="0"/>
+              </a:ext>
+            </a:extLst>
+          </a:blip>
+          <a:stretch>
+            <a:fillRect/>
+          </a:stretch>
+        </p:blipFill>
+        <p:spPr>
+          <a:xfrm>
+            <a:off x="1957963" y="1838325"/>
+            <a:ext cx="5837673" cy="4562475"/>
+          </a:xfrm>
+          <a:prstGeom prst="rect">
+            <a:avLst/>
+          </a:prstGeom>
+        </p:spPr>
+      </p:pic>
+    </p:spTree>
+    <p:extLst>
+      <p:ext uri="{BB962C8B-B14F-4D97-AF65-F5344CB8AC3E}">
+        <p14:creationId xmlns:p14="http://schemas.microsoft.com/office/powerpoint/2010/main" val="160532716"/>
+      </p:ext>
+    </p:extLst>
+  </p:cSld>
+  <p:clrMapOvr>
+    <a:masterClrMapping/>
+  </p:clrMapOvr>
+</p:sld>
+</file>
+
+<file path=ppt/slides/slide14.xml><?xml version="1.0" encoding="utf-8"?>
+<p:sld xmlns:a="http://schemas.openxmlformats.org/drawingml/2006/main" xmlns:r="http://schemas.openxmlformats.org/officeDocument/2006/relationships" xmlns:p="http://schemas.openxmlformats.org/presentationml/2006/main">
+  <p:cSld>
+    <p:spTree>
+      <p:nvGrpSpPr>
+        <p:cNvPr id="1" name=""/>
+        <p:cNvGrpSpPr/>
+        <p:nvPr/>
+      </p:nvGrpSpPr>
+      <p:grpSpPr>
+        <a:xfrm>
+          <a:off x="0" y="0"/>
+          <a:ext cx="0" cy="0"/>
+          <a:chOff x="0" y="0"/>
+          <a:chExt cx="0" cy="0"/>
+        </a:xfrm>
+      </p:grpSpPr>
+      <p:sp>
+        <p:nvSpPr>
+          <p:cNvPr id="2" name="Título 1">
+            <a:extLst>
+              <a:ext uri="{FF2B5EF4-FFF2-40B4-BE49-F238E27FC236}">
+                <a16:creationId xmlns:a16="http://schemas.microsoft.com/office/drawing/2014/main" id="{E0C65614-D626-41D3-80FC-3DF9256618ED}"/>
+              </a:ext>
+            </a:extLst>
+          </p:cNvPr>
+          <p:cNvSpPr>
+            <a:spLocks noGrp="1"/>
+          </p:cNvSpPr>
+          <p:nvPr>
+            <p:ph type="title"/>
+          </p:nvPr>
+        </p:nvSpPr>
+        <p:spPr/>
+        <p:txBody>
+          <a:bodyPr>
+            <a:normAutofit fontScale="90000"/>
+          </a:bodyPr>
+          <a:lstStyle/>
+          <a:p>
+            <a:r>
+              <a:rPr lang="pt-BR" dirty="0"/>
+              <a:t>Líderes Globais em Inovação em 2019</a:t>
+            </a:r>
+          </a:p>
+        </p:txBody>
+      </p:sp>
+      <p:sp>
+        <p:nvSpPr>
+          <p:cNvPr id="4" name="Espaço Reservado para Texto 3">
+            <a:extLst>
+              <a:ext uri="{FF2B5EF4-FFF2-40B4-BE49-F238E27FC236}">
+                <a16:creationId xmlns:a16="http://schemas.microsoft.com/office/drawing/2014/main" id="{E0B6A380-3D54-4A98-95FE-0611BB8420AB}"/>
+              </a:ext>
+            </a:extLst>
+          </p:cNvPr>
+          <p:cNvSpPr>
+            <a:spLocks noGrp="1"/>
+          </p:cNvSpPr>
+          <p:nvPr>
+            <p:ph type="body" sz="quarter" idx="13"/>
+          </p:nvPr>
+        </p:nvSpPr>
+        <p:spPr/>
+        <p:txBody>
+          <a:bodyPr>
+            <a:normAutofit fontScale="77500" lnSpcReduction="20000"/>
+          </a:bodyPr>
+          <a:lstStyle/>
+          <a:p>
+            <a:r>
+              <a:rPr lang="pt-BR" dirty="0"/>
+              <a:t>As 3 principais economias da inovação por grupo de renda</a:t>
+            </a:r>
+          </a:p>
+        </p:txBody>
+      </p:sp>
+      <p:pic>
+        <p:nvPicPr>
+          <p:cNvPr id="12" name="Espaço Reservado para Conteúdo 8" descr="Uma imagem contendo screenshot, texto&#10;&#10;Descrição gerada automaticamente">
+            <a:extLst>
+              <a:ext uri="{FF2B5EF4-FFF2-40B4-BE49-F238E27FC236}">
+                <a16:creationId xmlns:a16="http://schemas.microsoft.com/office/drawing/2014/main" id="{836198E5-6803-46F9-8F5F-66A3B4899A95}"/>
+              </a:ext>
+            </a:extLst>
+          </p:cNvPr>
+          <p:cNvPicPr>
+            <a:picLocks noGrp="1" noChangeAspect="1"/>
+          </p:cNvPicPr>
+          <p:nvPr>
+            <p:ph idx="1"/>
+          </p:nvPr>
+        </p:nvPicPr>
+        <p:blipFill>
+          <a:blip r:embed="rId2" cstate="print">
+            <a:extLst>
+              <a:ext uri="{28A0092B-C50C-407E-A947-70E740481C1C}">
+                <a14:useLocalDpi xmlns:a14="http://schemas.microsoft.com/office/drawing/2010/main" val="0"/>
+              </a:ext>
+            </a:extLst>
+          </a:blip>
+          <a:stretch>
+            <a:fillRect/>
+          </a:stretch>
+        </p:blipFill>
+        <p:spPr>
+          <a:xfrm>
+            <a:off x="533400" y="3164211"/>
+            <a:ext cx="8686800" cy="1910702"/>
+          </a:xfrm>
+        </p:spPr>
+      </p:pic>
+    </p:spTree>
+    <p:extLst>
+      <p:ext uri="{BB962C8B-B14F-4D97-AF65-F5344CB8AC3E}">
+        <p14:creationId xmlns:p14="http://schemas.microsoft.com/office/powerpoint/2010/main" val="2751033370"/>
+      </p:ext>
+    </p:extLst>
+  </p:cSld>
+  <p:clrMapOvr>
+    <a:masterClrMapping/>
+  </p:clrMapOvr>
+</p:sld>
+</file>
+
+<file path=ppt/slides/slide15.xml><?xml version="1.0" encoding="utf-8"?>
+<p:sld xmlns:a="http://schemas.openxmlformats.org/drawingml/2006/main" xmlns:r="http://schemas.openxmlformats.org/officeDocument/2006/relationships" xmlns:p="http://schemas.openxmlformats.org/presentationml/2006/main">
+  <p:cSld>
+    <p:spTree>
+      <p:nvGrpSpPr>
+        <p:cNvPr id="1" name=""/>
+        <p:cNvGrpSpPr/>
+        <p:nvPr/>
+      </p:nvGrpSpPr>
+      <p:grpSpPr>
+        <a:xfrm>
+          <a:off x="0" y="0"/>
+          <a:ext cx="0" cy="0"/>
+          <a:chOff x="0" y="0"/>
+          <a:chExt cx="0" cy="0"/>
+        </a:xfrm>
+      </p:grpSpPr>
+      <p:sp>
+        <p:nvSpPr>
+          <p:cNvPr id="2" name="Título 1">
+            <a:extLst>
+              <a:ext uri="{FF2B5EF4-FFF2-40B4-BE49-F238E27FC236}">
+                <a16:creationId xmlns:a16="http://schemas.microsoft.com/office/drawing/2014/main" id="{B888B434-FCB7-4AB0-A1BA-8C1742AB75F6}"/>
+              </a:ext>
+            </a:extLst>
+          </p:cNvPr>
+          <p:cNvSpPr>
+            <a:spLocks noGrp="1"/>
+          </p:cNvSpPr>
+          <p:nvPr>
+            <p:ph type="title" idx="4294967295"/>
+          </p:nvPr>
+        </p:nvSpPr>
+        <p:spPr>
+          <a:xfrm>
+            <a:off x="533400" y="1981200"/>
+            <a:ext cx="3048000" cy="3505200"/>
+          </a:xfrm>
+        </p:spPr>
+        <p:txBody>
+          <a:bodyPr>
+            <a:normAutofit fontScale="90000"/>
+          </a:bodyPr>
+          <a:lstStyle/>
+          <a:p>
+            <a:r>
+              <a:rPr lang="pt-BR" sz="3600" dirty="0"/>
+              <a:t>Proporções por região e por economia das despesas empresariais mundiais 2017</a:t>
+            </a:r>
+          </a:p>
+        </p:txBody>
+      </p:sp>
+      <p:pic>
+        <p:nvPicPr>
+          <p:cNvPr id="12" name="Espaço Reservado para Conteúdo 8">
+            <a:extLst>
+              <a:ext uri="{FF2B5EF4-FFF2-40B4-BE49-F238E27FC236}">
+                <a16:creationId xmlns:a16="http://schemas.microsoft.com/office/drawing/2014/main" id="{5E905184-88AF-42C7-8F6E-E6E884CCB192}"/>
+              </a:ext>
+            </a:extLst>
+          </p:cNvPr>
+          <p:cNvPicPr>
+            <a:picLocks noGrp="1" noChangeAspect="1"/>
+          </p:cNvPicPr>
+          <p:nvPr>
+            <p:ph idx="4294967295"/>
+          </p:nvPr>
+        </p:nvPicPr>
+        <p:blipFill>
+          <a:blip r:embed="rId2" cstate="print">
+            <a:extLst>
+              <a:ext uri="{28A0092B-C50C-407E-A947-70E740481C1C}">
+                <a14:useLocalDpi xmlns:a14="http://schemas.microsoft.com/office/drawing/2010/main" val="0"/>
+              </a:ext>
+            </a:extLst>
+          </a:blip>
+          <a:stretch>
+            <a:fillRect/>
+          </a:stretch>
+        </p:blipFill>
+        <p:spPr>
+          <a:xfrm>
+            <a:off x="3733800" y="364331"/>
+            <a:ext cx="5730875" cy="6738937"/>
+          </a:xfrm>
+        </p:spPr>
+      </p:pic>
+    </p:spTree>
+    <p:extLst>
+      <p:ext uri="{BB962C8B-B14F-4D97-AF65-F5344CB8AC3E}">
+        <p14:creationId xmlns:p14="http://schemas.microsoft.com/office/powerpoint/2010/main" val="2643616671"/>
+      </p:ext>
+    </p:extLst>
+  </p:cSld>
+  <p:clrMapOvr>
+    <a:masterClrMapping/>
+  </p:clrMapOvr>
+</p:sld>
+</file>
+
+<file path=ppt/slides/slide16.xml><?xml version="1.0" encoding="utf-8"?>
+<p:sld xmlns:a="http://schemas.openxmlformats.org/drawingml/2006/main" xmlns:r="http://schemas.openxmlformats.org/officeDocument/2006/relationships" xmlns:p="http://schemas.openxmlformats.org/presentationml/2006/main">
+  <p:cSld>
+    <p:spTree>
+      <p:nvGrpSpPr>
+        <p:cNvPr id="1" name=""/>
+        <p:cNvGrpSpPr/>
+        <p:nvPr/>
+      </p:nvGrpSpPr>
+      <p:grpSpPr>
+        <a:xfrm>
+          <a:off x="0" y="0"/>
+          <a:ext cx="0" cy="0"/>
+          <a:chOff x="0" y="0"/>
+          <a:chExt cx="0" cy="0"/>
+        </a:xfrm>
+      </p:grpSpPr>
+      <p:sp>
+        <p:nvSpPr>
+          <p:cNvPr id="7" name="Título 6">
+            <a:extLst>
+              <a:ext uri="{FF2B5EF4-FFF2-40B4-BE49-F238E27FC236}">
+                <a16:creationId xmlns:a16="http://schemas.microsoft.com/office/drawing/2014/main" id="{41D52E72-CD7A-4E4A-A4AF-088BB61CFB87}"/>
+              </a:ext>
+            </a:extLst>
+          </p:cNvPr>
+          <p:cNvSpPr>
+            <a:spLocks noGrp="1"/>
+          </p:cNvSpPr>
+          <p:nvPr>
+            <p:ph type="title"/>
+          </p:nvPr>
+        </p:nvSpPr>
+        <p:spPr/>
+        <p:txBody>
+          <a:bodyPr>
+            <a:normAutofit fontScale="90000"/>
+          </a:bodyPr>
+          <a:lstStyle/>
+          <a:p>
+            <a:r>
+              <a:rPr lang="pt-BR" dirty="0"/>
+              <a:t>Desempenho em inovação em diferentes níveis de renda - 2019</a:t>
+            </a:r>
+          </a:p>
+        </p:txBody>
+      </p:sp>
+      <p:pic>
+        <p:nvPicPr>
+          <p:cNvPr id="14" name="Espaço Reservado para Conteúdo 13" descr="Tela de computador com texto preto sobre fundo branco&#10;&#10;Descrição gerada automaticamente">
+            <a:extLst>
+              <a:ext uri="{FF2B5EF4-FFF2-40B4-BE49-F238E27FC236}">
+                <a16:creationId xmlns:a16="http://schemas.microsoft.com/office/drawing/2014/main" id="{3AF8DA1A-2B74-4D20-ACDA-1C131D3E459D}"/>
+              </a:ext>
+            </a:extLst>
+          </p:cNvPr>
+          <p:cNvPicPr>
+            <a:picLocks noGrp="1" noChangeAspect="1"/>
+          </p:cNvPicPr>
+          <p:nvPr>
+            <p:ph idx="1"/>
+          </p:nvPr>
+        </p:nvPicPr>
+        <p:blipFill>
+          <a:blip r:embed="rId2" cstate="print">
+            <a:extLst>
+              <a:ext uri="{28A0092B-C50C-407E-A947-70E740481C1C}">
+                <a14:useLocalDpi xmlns:a14="http://schemas.microsoft.com/office/drawing/2010/main" val="0"/>
+              </a:ext>
+            </a:extLst>
+          </a:blip>
+          <a:stretch>
+            <a:fillRect/>
+          </a:stretch>
+        </p:blipFill>
+        <p:spPr>
+          <a:xfrm>
+            <a:off x="533400" y="1893368"/>
+            <a:ext cx="8686800" cy="4452388"/>
+          </a:xfrm>
+        </p:spPr>
+      </p:pic>
+      <p:sp>
+        <p:nvSpPr>
+          <p:cNvPr id="16" name="CaixaDeTexto 15">
+            <a:extLst>
+              <a:ext uri="{FF2B5EF4-FFF2-40B4-BE49-F238E27FC236}">
+                <a16:creationId xmlns:a16="http://schemas.microsoft.com/office/drawing/2014/main" id="{D362E478-0360-474D-B22D-D15A87FC737E}"/>
+              </a:ext>
+            </a:extLst>
+          </p:cNvPr>
+          <p:cNvSpPr txBox="1"/>
+          <p:nvPr/>
+        </p:nvSpPr>
+        <p:spPr>
+          <a:xfrm>
+            <a:off x="1842259" y="6534400"/>
+            <a:ext cx="2819400" cy="430887"/>
+          </a:xfrm>
+          <a:prstGeom prst="rect">
+            <a:avLst/>
+          </a:prstGeom>
+          <a:noFill/>
+        </p:spPr>
+        <p:txBody>
+          <a:bodyPr wrap="square">
+            <a:spAutoFit/>
+          </a:bodyPr>
+          <a:lstStyle/>
+          <a:p>
+            <a:r>
+              <a:rPr lang="pt-BR" sz="1100" i="0" u="none" strike="noStrike" baseline="0" dirty="0">
+                <a:solidFill>
+                  <a:srgbClr val="48709C"/>
+                </a:solidFill>
+                <a:latin typeface="Poppins" panose="00000500000000000000" pitchFamily="2" charset="0"/>
+                <a:cs typeface="Poppins" panose="00000500000000000000" pitchFamily="2" charset="0"/>
+              </a:rPr>
+              <a:t>Acima das expectativas em relação ao nível de desenvolvimento</a:t>
+            </a:r>
+            <a:endParaRPr lang="pt-BR" sz="1100" dirty="0">
+              <a:solidFill>
+                <a:srgbClr val="48709C"/>
+              </a:solidFill>
+              <a:latin typeface="Poppins" panose="00000500000000000000" pitchFamily="2" charset="0"/>
+              <a:cs typeface="Poppins" panose="00000500000000000000" pitchFamily="2" charset="0"/>
+            </a:endParaRPr>
+          </a:p>
+        </p:txBody>
+      </p:sp>
+      <p:sp>
+        <p:nvSpPr>
+          <p:cNvPr id="18" name="CaixaDeTexto 17">
+            <a:extLst>
+              <a:ext uri="{FF2B5EF4-FFF2-40B4-BE49-F238E27FC236}">
+                <a16:creationId xmlns:a16="http://schemas.microsoft.com/office/drawing/2014/main" id="{894C0AF1-D09D-4DC2-8F52-6BFF271068F2}"/>
+              </a:ext>
+            </a:extLst>
+          </p:cNvPr>
+          <p:cNvSpPr txBox="1"/>
+          <p:nvPr/>
+        </p:nvSpPr>
+        <p:spPr>
+          <a:xfrm>
+            <a:off x="5165469" y="6534400"/>
+            <a:ext cx="3200400" cy="430887"/>
+          </a:xfrm>
+          <a:prstGeom prst="rect">
+            <a:avLst/>
+          </a:prstGeom>
+          <a:noFill/>
+        </p:spPr>
+        <p:txBody>
+          <a:bodyPr wrap="square">
+            <a:spAutoFit/>
+          </a:bodyPr>
+          <a:lstStyle/>
+          <a:p>
+            <a:r>
+              <a:rPr lang="pt-BR" sz="1100" i="0" u="none" strike="noStrike" baseline="0" dirty="0">
+                <a:solidFill>
+                  <a:srgbClr val="B8548E"/>
+                </a:solidFill>
+                <a:latin typeface="Poppins" panose="00000500000000000000" pitchFamily="2" charset="0"/>
+                <a:cs typeface="Poppins" panose="00000500000000000000" pitchFamily="2" charset="0"/>
+              </a:rPr>
+              <a:t>De acordo com as expectativas em relação ao nível de desenvolvimento</a:t>
+            </a:r>
+            <a:endParaRPr lang="pt-BR" sz="1100" dirty="0">
+              <a:solidFill>
+                <a:srgbClr val="B8548E"/>
+              </a:solidFill>
+              <a:latin typeface="Poppins" panose="00000500000000000000" pitchFamily="2" charset="0"/>
+              <a:cs typeface="Poppins" panose="00000500000000000000" pitchFamily="2" charset="0"/>
+            </a:endParaRPr>
+          </a:p>
+        </p:txBody>
+      </p:sp>
+      <p:sp>
+        <p:nvSpPr>
+          <p:cNvPr id="19" name="Elipse 18">
+            <a:extLst>
+              <a:ext uri="{FF2B5EF4-FFF2-40B4-BE49-F238E27FC236}">
+                <a16:creationId xmlns:a16="http://schemas.microsoft.com/office/drawing/2014/main" id="{7096D830-CC54-45D9-A70B-F9B4F39C8369}"/>
+              </a:ext>
+            </a:extLst>
+          </p:cNvPr>
+          <p:cNvSpPr/>
+          <p:nvPr/>
+        </p:nvSpPr>
+        <p:spPr>
+          <a:xfrm>
+            <a:off x="1411691" y="6569843"/>
+            <a:ext cx="360000" cy="360000"/>
+          </a:xfrm>
+          <a:prstGeom prst="ellipse">
+            <a:avLst/>
+          </a:prstGeom>
+          <a:solidFill>
+            <a:srgbClr val="48709C"/>
+          </a:solidFill>
+          <a:ln>
+            <a:noFill/>
+          </a:ln>
+        </p:spPr>
+        <p:style>
+          <a:lnRef idx="2">
+            <a:schemeClr val="accent1">
+              <a:shade val="50000"/>
+            </a:schemeClr>
+          </a:lnRef>
+          <a:fillRef idx="1">
+            <a:schemeClr val="accent1"/>
+          </a:fillRef>
+          <a:effectRef idx="0">
+            <a:schemeClr val="accent1"/>
+          </a:effectRef>
+          <a:fontRef idx="minor">
+            <a:schemeClr val="lt1"/>
+          </a:fontRef>
+        </p:style>
+        <p:txBody>
+          <a:bodyPr rtlCol="0" anchor="ctr"/>
+          <a:lstStyle/>
+          <a:p>
+            <a:pPr algn="ctr"/>
+            <a:endParaRPr lang="pt-BR" dirty="0"/>
+          </a:p>
+        </p:txBody>
+      </p:sp>
+      <p:sp>
+        <p:nvSpPr>
+          <p:cNvPr id="21" name="Elipse 20">
+            <a:extLst>
+              <a:ext uri="{FF2B5EF4-FFF2-40B4-BE49-F238E27FC236}">
+                <a16:creationId xmlns:a16="http://schemas.microsoft.com/office/drawing/2014/main" id="{859BE020-88F6-4A0D-B773-67845288C8E5}"/>
+              </a:ext>
+            </a:extLst>
+          </p:cNvPr>
+          <p:cNvSpPr/>
+          <p:nvPr/>
+        </p:nvSpPr>
+        <p:spPr>
+          <a:xfrm>
+            <a:off x="4733564" y="6569843"/>
+            <a:ext cx="360000" cy="360000"/>
+          </a:xfrm>
+          <a:prstGeom prst="ellipse">
+            <a:avLst/>
+          </a:prstGeom>
+          <a:solidFill>
+            <a:srgbClr val="B8548E"/>
+          </a:solidFill>
+          <a:ln>
+            <a:noFill/>
+          </a:ln>
+        </p:spPr>
+        <p:style>
+          <a:lnRef idx="2">
+            <a:schemeClr val="accent1">
+              <a:shade val="50000"/>
+            </a:schemeClr>
+          </a:lnRef>
+          <a:fillRef idx="1">
+            <a:schemeClr val="accent1"/>
+          </a:fillRef>
+          <a:effectRef idx="0">
+            <a:schemeClr val="accent1"/>
+          </a:effectRef>
+          <a:fontRef idx="minor">
+            <a:schemeClr val="lt1"/>
+          </a:fontRef>
+        </p:style>
+        <p:txBody>
+          <a:bodyPr rtlCol="0" anchor="ctr"/>
+          <a:lstStyle/>
+          <a:p>
+            <a:pPr algn="ctr"/>
+            <a:endParaRPr lang="pt-BR"/>
+          </a:p>
+        </p:txBody>
+      </p:sp>
+    </p:spTree>
+    <p:extLst>
+      <p:ext uri="{BB962C8B-B14F-4D97-AF65-F5344CB8AC3E}">
+        <p14:creationId xmlns:p14="http://schemas.microsoft.com/office/powerpoint/2010/main" val="2717485871"/>
+      </p:ext>
+    </p:extLst>
+  </p:cSld>
+  <p:clrMapOvr>
+    <a:masterClrMapping/>
+  </p:clrMapOvr>
+</p:sld>
+</file>
+
+<file path=ppt/slides/slide17.xml><?xml version="1.0" encoding="utf-8"?>
+<p:sld xmlns:a="http://schemas.openxmlformats.org/drawingml/2006/main" xmlns:r="http://schemas.openxmlformats.org/officeDocument/2006/relationships" xmlns:p="http://schemas.openxmlformats.org/presentationml/2006/main">
+  <p:cSld>
+    <p:spTree>
+      <p:nvGrpSpPr>
+        <p:cNvPr id="1" name=""/>
+        <p:cNvGrpSpPr/>
+        <p:nvPr/>
+      </p:nvGrpSpPr>
+      <p:grpSpPr>
+        <a:xfrm>
+          <a:off x="0" y="0"/>
+          <a:ext cx="0" cy="0"/>
+          <a:chOff x="0" y="0"/>
+          <a:chExt cx="0" cy="0"/>
+        </a:xfrm>
+      </p:grpSpPr>
+      <p:sp>
+        <p:nvSpPr>
+          <p:cNvPr id="2" name="Título 1">
+            <a:extLst>
+              <a:ext uri="{FF2B5EF4-FFF2-40B4-BE49-F238E27FC236}">
+                <a16:creationId xmlns:a16="http://schemas.microsoft.com/office/drawing/2014/main" id="{EA29FF54-393D-4F5B-9810-1E601A88CDCE}"/>
+              </a:ext>
+            </a:extLst>
+          </p:cNvPr>
+          <p:cNvSpPr>
+            <a:spLocks noGrp="1"/>
+          </p:cNvSpPr>
+          <p:nvPr>
+            <p:ph type="title"/>
+          </p:nvPr>
+        </p:nvSpPr>
+        <p:spPr/>
+        <p:txBody>
+          <a:bodyPr>
+            <a:noAutofit/>
+          </a:bodyPr>
+          <a:lstStyle/>
+          <a:p>
+            <a:r>
+              <a:rPr lang="pt-BR" sz="3200" dirty="0"/>
+              <a:t>10 universidades mais bem classificadas em economias de renda média</a:t>
+            </a:r>
+          </a:p>
+        </p:txBody>
+      </p:sp>
+      <p:graphicFrame>
+        <p:nvGraphicFramePr>
+          <p:cNvPr id="5" name="Tabela 5">
+            <a:extLst>
+              <a:ext uri="{FF2B5EF4-FFF2-40B4-BE49-F238E27FC236}">
+                <a16:creationId xmlns:a16="http://schemas.microsoft.com/office/drawing/2014/main" id="{008F0F53-9FD8-4DF5-BA54-FFAF40BF3407}"/>
+              </a:ext>
+            </a:extLst>
+          </p:cNvPr>
+          <p:cNvGraphicFramePr>
+            <a:graphicFrameLocks noGrp="1"/>
+          </p:cNvGraphicFramePr>
+          <p:nvPr>
+            <p:ph idx="1"/>
+            <p:extLst>
+              <p:ext uri="{D42A27DB-BD31-4B8C-83A1-F6EECF244321}">
+                <p14:modId xmlns:p14="http://schemas.microsoft.com/office/powerpoint/2010/main" val="3556625611"/>
+              </p:ext>
+            </p:extLst>
+          </p:nvPr>
+        </p:nvGraphicFramePr>
+        <p:xfrm>
+          <a:off x="533400" y="1838325"/>
+          <a:ext cx="8686800" cy="4079240"/>
+        </p:xfrm>
+        <a:graphic>
+          <a:graphicData uri="http://schemas.openxmlformats.org/drawingml/2006/table">
+            <a:tbl>
+              <a:tblPr firstRow="1" bandRow="1">
+                <a:tableStyleId>{5C22544A-7EE6-4342-B048-85BDC9FD1C3A}</a:tableStyleId>
+              </a:tblPr>
+              <a:tblGrid>
+                <a:gridCol w="2133600">
+                  <a:extLst>
+                    <a:ext uri="{9D8B030D-6E8A-4147-A177-3AD203B41FA5}">
+                      <a16:colId xmlns:a16="http://schemas.microsoft.com/office/drawing/2014/main" val="4217003267"/>
+                    </a:ext>
+                  </a:extLst>
+                </a:gridCol>
+                <a:gridCol w="5334000">
+                  <a:extLst>
+                    <a:ext uri="{9D8B030D-6E8A-4147-A177-3AD203B41FA5}">
+                      <a16:colId xmlns:a16="http://schemas.microsoft.com/office/drawing/2014/main" val="3472894039"/>
+                    </a:ext>
+                  </a:extLst>
+                </a:gridCol>
+                <a:gridCol w="1219200">
+                  <a:extLst>
+                    <a:ext uri="{9D8B030D-6E8A-4147-A177-3AD203B41FA5}">
+                      <a16:colId xmlns:a16="http://schemas.microsoft.com/office/drawing/2014/main" val="843674483"/>
+                    </a:ext>
+                  </a:extLst>
+                </a:gridCol>
+              </a:tblGrid>
+              <a:tr h="370840">
+                <a:tc>
+                  <a:txBody>
+                    <a:bodyPr/>
+                    <a:lstStyle/>
+                    <a:p>
+                      <a:r>
+                        <a:rPr lang="pt-BR" sz="1800" b="0" i="0" u="none" strike="noStrike" kern="1200" baseline="0" dirty="0">
+                          <a:solidFill>
+                            <a:schemeClr val="lt1"/>
+                          </a:solidFill>
+                          <a:latin typeface="+mn-lt"/>
+                          <a:ea typeface="+mn-ea"/>
+                          <a:cs typeface="+mn-cs"/>
+                        </a:rPr>
+                        <a:t>Localização</a:t>
+                      </a:r>
+                      <a:endParaRPr lang="pt-BR" sz="1800" dirty="0"/>
+                    </a:p>
+                  </a:txBody>
+                  <a:tcPr/>
+                </a:tc>
+                <a:tc>
+                  <a:txBody>
+                    <a:bodyPr/>
+                    <a:lstStyle/>
+                    <a:p>
+                      <a:r>
+                        <a:rPr lang="pt-BR" sz="1800" b="0" i="0" u="none" strike="noStrike" kern="1200" baseline="0" dirty="0">
+                          <a:solidFill>
+                            <a:schemeClr val="lt1"/>
+                          </a:solidFill>
+                          <a:latin typeface="+mn-lt"/>
+                          <a:ea typeface="+mn-ea"/>
+                          <a:cs typeface="+mn-cs"/>
+                        </a:rPr>
+                        <a:t>Universidade</a:t>
+                      </a:r>
+                      <a:endParaRPr lang="pt-BR" sz="1800" dirty="0"/>
+                    </a:p>
+                  </a:txBody>
+                  <a:tcPr/>
+                </a:tc>
+                <a:tc>
+                  <a:txBody>
+                    <a:bodyPr/>
+                    <a:lstStyle/>
+                    <a:p>
+                      <a:r>
+                        <a:rPr lang="pt-BR" sz="1800" b="0" i="0" u="none" strike="noStrike" kern="1200" baseline="0" dirty="0">
+                          <a:solidFill>
+                            <a:schemeClr val="lt1"/>
+                          </a:solidFill>
+                          <a:latin typeface="+mn-lt"/>
+                          <a:ea typeface="+mn-ea"/>
+                          <a:cs typeface="+mn-cs"/>
+                        </a:rPr>
+                        <a:t>Pontuação</a:t>
+                      </a:r>
+                      <a:endParaRPr lang="pt-BR" sz="1800" dirty="0"/>
+                    </a:p>
+                  </a:txBody>
+                  <a:tcPr/>
+                </a:tc>
+                <a:extLst>
+                  <a:ext uri="{0D108BD9-81ED-4DB2-BD59-A6C34878D82A}">
+                    <a16:rowId xmlns:a16="http://schemas.microsoft.com/office/drawing/2014/main" val="1696126229"/>
+                  </a:ext>
+                </a:extLst>
+              </a:tr>
+              <a:tr h="370840">
+                <a:tc>
+                  <a:txBody>
+                    <a:bodyPr/>
+                    <a:lstStyle/>
+                    <a:p>
+                      <a:r>
+                        <a:rPr lang="pt-BR" sz="1800" b="0" i="0" u="none" strike="noStrike" kern="1200" baseline="0" dirty="0">
+                          <a:solidFill>
+                            <a:schemeClr val="dk1"/>
+                          </a:solidFill>
+                          <a:latin typeface="+mn-lt"/>
+                          <a:ea typeface="+mn-ea"/>
+                          <a:cs typeface="+mn-cs"/>
+                        </a:rPr>
+                        <a:t>China</a:t>
+                      </a:r>
+                      <a:endParaRPr lang="pt-BR" sz="1800" dirty="0"/>
+                    </a:p>
+                  </a:txBody>
+                  <a:tcPr/>
+                </a:tc>
+                <a:tc>
+                  <a:txBody>
+                    <a:bodyPr/>
+                    <a:lstStyle/>
+                    <a:p>
+                      <a:r>
+                        <a:rPr lang="pt-BR" sz="1800" b="0" i="0" u="none" strike="noStrike" kern="1200" baseline="0" dirty="0">
+                          <a:solidFill>
+                            <a:schemeClr val="dk1"/>
+                          </a:solidFill>
+                          <a:latin typeface="+mn-lt"/>
+                          <a:ea typeface="+mn-ea"/>
+                          <a:cs typeface="+mn-cs"/>
+                        </a:rPr>
+                        <a:t>Universidade de </a:t>
+                      </a:r>
+                      <a:r>
+                        <a:rPr lang="pt-BR" sz="1800" b="0" i="0" u="none" strike="noStrike" kern="1200" baseline="0" dirty="0" err="1">
+                          <a:solidFill>
+                            <a:schemeClr val="dk1"/>
+                          </a:solidFill>
+                          <a:latin typeface="+mn-lt"/>
+                          <a:ea typeface="+mn-ea"/>
+                          <a:cs typeface="+mn-cs"/>
+                        </a:rPr>
+                        <a:t>Tsinghua</a:t>
+                      </a:r>
+                      <a:endParaRPr lang="pt-BR" sz="1800" b="0" i="0" u="none" strike="noStrike" kern="1200" baseline="0" dirty="0">
+                        <a:solidFill>
+                          <a:schemeClr val="dk1"/>
+                        </a:solidFill>
+                        <a:latin typeface="+mn-lt"/>
+                        <a:ea typeface="+mn-ea"/>
+                        <a:cs typeface="+mn-cs"/>
+                      </a:endParaRPr>
+                    </a:p>
+                  </a:txBody>
+                  <a:tcPr/>
+                </a:tc>
+                <a:tc>
+                  <a:txBody>
+                    <a:bodyPr/>
+                    <a:lstStyle/>
+                    <a:p>
+                      <a:pPr algn="r"/>
+                      <a:r>
+                        <a:rPr lang="pt-BR" sz="1800" b="0" i="0" u="none" strike="noStrike" kern="1200" baseline="0" dirty="0">
+                          <a:solidFill>
+                            <a:schemeClr val="dk1"/>
+                          </a:solidFill>
+                          <a:latin typeface="+mn-lt"/>
+                          <a:ea typeface="+mn-ea"/>
+                          <a:cs typeface="+mn-cs"/>
+                        </a:rPr>
+                        <a:t>87,2</a:t>
+                      </a:r>
+                      <a:endParaRPr lang="pt-BR" sz="1800" dirty="0"/>
+                    </a:p>
+                  </a:txBody>
+                  <a:tcPr/>
+                </a:tc>
+                <a:extLst>
+                  <a:ext uri="{0D108BD9-81ED-4DB2-BD59-A6C34878D82A}">
+                    <a16:rowId xmlns:a16="http://schemas.microsoft.com/office/drawing/2014/main" val="1241758123"/>
+                  </a:ext>
+                </a:extLst>
+              </a:tr>
+              <a:tr h="370840">
+                <a:tc>
+                  <a:txBody>
+                    <a:bodyPr/>
+                    <a:lstStyle/>
+                    <a:p>
+                      <a:r>
+                        <a:rPr lang="pt-BR" sz="1800" b="0" i="0" u="none" strike="noStrike" kern="1200" baseline="0" dirty="0">
+                          <a:solidFill>
+                            <a:schemeClr val="dk1"/>
+                          </a:solidFill>
+                          <a:latin typeface="+mn-lt"/>
+                          <a:ea typeface="+mn-ea"/>
+                          <a:cs typeface="+mn-cs"/>
+                        </a:rPr>
+                        <a:t>China</a:t>
+                      </a:r>
+                      <a:endParaRPr lang="pt-BR" sz="1800" dirty="0"/>
+                    </a:p>
+                  </a:txBody>
+                  <a:tcPr/>
+                </a:tc>
+                <a:tc>
+                  <a:txBody>
+                    <a:bodyPr/>
+                    <a:lstStyle/>
+                    <a:p>
+                      <a:r>
+                        <a:rPr lang="pt-BR" sz="1800" b="0" i="0" u="none" strike="noStrike" kern="1200" baseline="0" dirty="0">
+                          <a:solidFill>
+                            <a:schemeClr val="dk1"/>
+                          </a:solidFill>
+                          <a:latin typeface="+mn-lt"/>
+                          <a:ea typeface="+mn-ea"/>
+                          <a:cs typeface="+mn-cs"/>
+                        </a:rPr>
+                        <a:t>Universidade de Pequim</a:t>
+                      </a:r>
+                      <a:endParaRPr lang="pt-BR" sz="1800" dirty="0"/>
+                    </a:p>
+                  </a:txBody>
+                  <a:tcPr/>
+                </a:tc>
+                <a:tc>
+                  <a:txBody>
+                    <a:bodyPr/>
+                    <a:lstStyle/>
+                    <a:p>
+                      <a:pPr algn="r"/>
+                      <a:r>
+                        <a:rPr lang="pt-BR" sz="1800" b="0" i="0" u="none" strike="noStrike" kern="1200" baseline="0" dirty="0">
+                          <a:solidFill>
+                            <a:schemeClr val="dk1"/>
+                          </a:solidFill>
+                          <a:latin typeface="+mn-lt"/>
+                          <a:ea typeface="+mn-ea"/>
+                          <a:cs typeface="+mn-cs"/>
+                        </a:rPr>
+                        <a:t>82,6</a:t>
+                      </a:r>
+                      <a:endParaRPr lang="pt-BR" sz="1800" dirty="0"/>
+                    </a:p>
+                  </a:txBody>
+                  <a:tcPr/>
+                </a:tc>
+                <a:extLst>
+                  <a:ext uri="{0D108BD9-81ED-4DB2-BD59-A6C34878D82A}">
+                    <a16:rowId xmlns:a16="http://schemas.microsoft.com/office/drawing/2014/main" val="1111525409"/>
+                  </a:ext>
+                </a:extLst>
+              </a:tr>
+              <a:tr h="370840">
+                <a:tc>
+                  <a:txBody>
+                    <a:bodyPr/>
+                    <a:lstStyle/>
+                    <a:p>
+                      <a:r>
+                        <a:rPr lang="pt-BR" sz="1800" b="0" i="0" u="none" strike="noStrike" kern="1200" baseline="0" dirty="0">
+                          <a:solidFill>
+                            <a:schemeClr val="dk1"/>
+                          </a:solidFill>
+                          <a:latin typeface="+mn-lt"/>
+                          <a:ea typeface="+mn-ea"/>
+                          <a:cs typeface="+mn-cs"/>
+                        </a:rPr>
+                        <a:t>China</a:t>
+                      </a:r>
+                      <a:endParaRPr lang="pt-BR" sz="1800" dirty="0"/>
+                    </a:p>
+                  </a:txBody>
+                  <a:tcPr/>
+                </a:tc>
+                <a:tc>
+                  <a:txBody>
+                    <a:bodyPr/>
+                    <a:lstStyle/>
+                    <a:p>
+                      <a:r>
+                        <a:rPr lang="pt-BR" sz="1800" b="0" i="0" u="none" strike="noStrike" kern="1200" baseline="0" dirty="0">
+                          <a:solidFill>
+                            <a:schemeClr val="dk1"/>
+                          </a:solidFill>
+                          <a:latin typeface="+mn-lt"/>
+                          <a:ea typeface="+mn-ea"/>
+                          <a:cs typeface="+mn-cs"/>
+                        </a:rPr>
+                        <a:t>Universidade de </a:t>
+                      </a:r>
+                      <a:r>
+                        <a:rPr lang="pt-BR" sz="1800" b="0" i="0" u="none" strike="noStrike" kern="1200" baseline="0" dirty="0" err="1">
+                          <a:solidFill>
+                            <a:schemeClr val="dk1"/>
+                          </a:solidFill>
+                          <a:latin typeface="+mn-lt"/>
+                          <a:ea typeface="+mn-ea"/>
+                          <a:cs typeface="+mn-cs"/>
+                        </a:rPr>
+                        <a:t>Fudan</a:t>
+                      </a:r>
+                      <a:endParaRPr lang="pt-BR" sz="1800" dirty="0"/>
+                    </a:p>
+                  </a:txBody>
+                  <a:tcPr/>
+                </a:tc>
+                <a:tc>
+                  <a:txBody>
+                    <a:bodyPr/>
+                    <a:lstStyle/>
+                    <a:p>
+                      <a:pPr algn="r"/>
+                      <a:r>
+                        <a:rPr lang="pt-BR" sz="1800" b="0" i="0" u="none" strike="noStrike" kern="1200" baseline="0" dirty="0">
+                          <a:solidFill>
+                            <a:schemeClr val="dk1"/>
+                          </a:solidFill>
+                          <a:latin typeface="+mn-lt"/>
+                          <a:ea typeface="+mn-ea"/>
+                          <a:cs typeface="+mn-cs"/>
+                        </a:rPr>
+                        <a:t>77,6</a:t>
+                      </a:r>
+                      <a:endParaRPr lang="pt-BR" sz="1800" dirty="0"/>
+                    </a:p>
+                  </a:txBody>
+                  <a:tcPr/>
+                </a:tc>
+                <a:extLst>
+                  <a:ext uri="{0D108BD9-81ED-4DB2-BD59-A6C34878D82A}">
+                    <a16:rowId xmlns:a16="http://schemas.microsoft.com/office/drawing/2014/main" val="1824253543"/>
+                  </a:ext>
+                </a:extLst>
+              </a:tr>
+              <a:tr h="370840">
+                <a:tc>
+                  <a:txBody>
+                    <a:bodyPr/>
+                    <a:lstStyle/>
+                    <a:p>
+                      <a:r>
+                        <a:rPr lang="pt-BR" sz="1800" b="0" i="0" u="none" strike="noStrike" kern="1200" baseline="0" dirty="0">
+                          <a:solidFill>
+                            <a:schemeClr val="dk1"/>
+                          </a:solidFill>
+                          <a:latin typeface="+mn-lt"/>
+                          <a:ea typeface="+mn-ea"/>
+                          <a:cs typeface="+mn-cs"/>
+                        </a:rPr>
+                        <a:t>Malásia</a:t>
+                      </a:r>
+                      <a:endParaRPr lang="pt-BR" sz="1800" dirty="0"/>
+                    </a:p>
+                  </a:txBody>
+                  <a:tcPr/>
+                </a:tc>
+                <a:tc>
+                  <a:txBody>
+                    <a:bodyPr/>
+                    <a:lstStyle/>
+                    <a:p>
+                      <a:r>
+                        <a:rPr lang="pt-BR" sz="1800" b="0" i="0" u="none" strike="noStrike" kern="1200" baseline="0" dirty="0" err="1">
+                          <a:solidFill>
+                            <a:schemeClr val="dk1"/>
+                          </a:solidFill>
+                          <a:latin typeface="+mn-lt"/>
+                          <a:ea typeface="+mn-ea"/>
+                          <a:cs typeface="+mn-cs"/>
+                        </a:rPr>
+                        <a:t>Universiti</a:t>
+                      </a:r>
+                      <a:r>
+                        <a:rPr lang="pt-BR" sz="1800" b="0" i="0" u="none" strike="noStrike" kern="1200" baseline="0" dirty="0">
+                          <a:solidFill>
+                            <a:schemeClr val="dk1"/>
+                          </a:solidFill>
+                          <a:latin typeface="+mn-lt"/>
+                          <a:ea typeface="+mn-ea"/>
+                          <a:cs typeface="+mn-cs"/>
+                        </a:rPr>
+                        <a:t> </a:t>
+                      </a:r>
+                      <a:r>
+                        <a:rPr lang="pt-BR" sz="1800" b="0" i="0" u="none" strike="noStrike" kern="1200" baseline="0" dirty="0" err="1">
+                          <a:solidFill>
+                            <a:schemeClr val="dk1"/>
+                          </a:solidFill>
+                          <a:latin typeface="+mn-lt"/>
+                          <a:ea typeface="+mn-ea"/>
+                          <a:cs typeface="+mn-cs"/>
+                        </a:rPr>
+                        <a:t>Malaya</a:t>
+                      </a:r>
+                      <a:r>
+                        <a:rPr lang="pt-BR" sz="1800" b="0" i="0" u="none" strike="noStrike" kern="1200" baseline="0" dirty="0">
+                          <a:solidFill>
+                            <a:schemeClr val="dk1"/>
+                          </a:solidFill>
+                          <a:latin typeface="+mn-lt"/>
+                          <a:ea typeface="+mn-ea"/>
+                          <a:cs typeface="+mn-cs"/>
+                        </a:rPr>
+                        <a:t> (UM)</a:t>
+                      </a:r>
+                      <a:endParaRPr lang="pt-BR" sz="1800" dirty="0"/>
+                    </a:p>
+                  </a:txBody>
+                  <a:tcPr/>
+                </a:tc>
+                <a:tc>
+                  <a:txBody>
+                    <a:bodyPr/>
+                    <a:lstStyle/>
+                    <a:p>
+                      <a:pPr algn="r"/>
+                      <a:r>
+                        <a:rPr lang="pt-BR" sz="1800" b="0" i="0" u="none" strike="noStrike" kern="1200" baseline="0" dirty="0">
+                          <a:solidFill>
+                            <a:schemeClr val="dk1"/>
+                          </a:solidFill>
+                          <a:latin typeface="+mn-lt"/>
+                          <a:ea typeface="+mn-ea"/>
+                          <a:cs typeface="+mn-cs"/>
+                        </a:rPr>
+                        <a:t>62,6</a:t>
+                      </a:r>
+                      <a:endParaRPr lang="pt-BR" sz="1800" dirty="0"/>
+                    </a:p>
+                  </a:txBody>
+                  <a:tcPr/>
+                </a:tc>
+                <a:extLst>
+                  <a:ext uri="{0D108BD9-81ED-4DB2-BD59-A6C34878D82A}">
+                    <a16:rowId xmlns:a16="http://schemas.microsoft.com/office/drawing/2014/main" val="3739936730"/>
+                  </a:ext>
+                </a:extLst>
+              </a:tr>
+              <a:tr h="370840">
+                <a:tc>
+                  <a:txBody>
+                    <a:bodyPr/>
+                    <a:lstStyle/>
+                    <a:p>
+                      <a:r>
+                        <a:rPr lang="pt-BR" sz="1800" b="0" i="0" u="none" strike="noStrike" kern="1200" baseline="0" dirty="0">
+                          <a:solidFill>
+                            <a:schemeClr val="dk1"/>
+                          </a:solidFill>
+                          <a:latin typeface="+mn-lt"/>
+                          <a:ea typeface="+mn-ea"/>
+                          <a:cs typeface="+mn-cs"/>
+                        </a:rPr>
+                        <a:t>Federação da Rússia</a:t>
+                      </a:r>
+                      <a:endParaRPr lang="pt-BR" sz="1800" dirty="0"/>
+                    </a:p>
+                  </a:txBody>
+                  <a:tcPr/>
+                </a:tc>
+                <a:tc>
+                  <a:txBody>
+                    <a:bodyPr/>
+                    <a:lstStyle/>
+                    <a:p>
+                      <a:r>
+                        <a:rPr lang="pt-BR" sz="1800" b="0" i="0" u="none" strike="noStrike" kern="1200" baseline="0" dirty="0">
+                          <a:solidFill>
+                            <a:schemeClr val="dk1"/>
+                          </a:solidFill>
+                          <a:latin typeface="+mn-lt"/>
+                          <a:ea typeface="+mn-ea"/>
+                          <a:cs typeface="+mn-cs"/>
+                        </a:rPr>
+                        <a:t>Universidade Estadual de Moscou </a:t>
+                      </a:r>
+                      <a:r>
+                        <a:rPr lang="pt-BR" sz="1800" b="0" i="0" u="none" strike="noStrike" kern="1200" baseline="0" dirty="0" err="1">
+                          <a:solidFill>
+                            <a:schemeClr val="dk1"/>
+                          </a:solidFill>
+                          <a:latin typeface="+mn-lt"/>
+                          <a:ea typeface="+mn-ea"/>
+                          <a:cs typeface="+mn-cs"/>
+                        </a:rPr>
+                        <a:t>Lomonosov</a:t>
+                      </a:r>
+                      <a:endParaRPr lang="pt-BR" sz="1800" dirty="0"/>
+                    </a:p>
+                  </a:txBody>
+                  <a:tcPr/>
+                </a:tc>
+                <a:tc>
+                  <a:txBody>
+                    <a:bodyPr/>
+                    <a:lstStyle/>
+                    <a:p>
+                      <a:pPr algn="r"/>
+                      <a:r>
+                        <a:rPr lang="pt-BR" sz="1800" b="0" i="0" u="none" strike="noStrike" kern="1200" baseline="0" dirty="0">
+                          <a:solidFill>
+                            <a:schemeClr val="dk1"/>
+                          </a:solidFill>
+                          <a:latin typeface="+mn-lt"/>
+                          <a:ea typeface="+mn-ea"/>
+                          <a:cs typeface="+mn-cs"/>
+                        </a:rPr>
+                        <a:t>62,3</a:t>
+                      </a:r>
+                      <a:endParaRPr lang="pt-BR" sz="1800" dirty="0"/>
+                    </a:p>
+                  </a:txBody>
+                  <a:tcPr/>
+                </a:tc>
+                <a:extLst>
+                  <a:ext uri="{0D108BD9-81ED-4DB2-BD59-A6C34878D82A}">
+                    <a16:rowId xmlns:a16="http://schemas.microsoft.com/office/drawing/2014/main" val="1891403128"/>
+                  </a:ext>
+                </a:extLst>
+              </a:tr>
+              <a:tr h="370840">
+                <a:tc>
+                  <a:txBody>
+                    <a:bodyPr/>
+                    <a:lstStyle/>
+                    <a:p>
+                      <a:r>
+                        <a:rPr lang="pt-BR" sz="1800" b="0" i="0" u="none" strike="noStrike" kern="1200" baseline="0" dirty="0">
+                          <a:solidFill>
+                            <a:schemeClr val="dk1"/>
+                          </a:solidFill>
+                          <a:latin typeface="+mn-lt"/>
+                          <a:ea typeface="+mn-ea"/>
+                          <a:cs typeface="+mn-cs"/>
+                        </a:rPr>
+                        <a:t>México</a:t>
+                      </a:r>
+                      <a:endParaRPr lang="pt-BR" sz="1800" dirty="0"/>
+                    </a:p>
+                  </a:txBody>
+                  <a:tcPr/>
+                </a:tc>
+                <a:tc>
+                  <a:txBody>
+                    <a:bodyPr/>
+                    <a:lstStyle/>
+                    <a:p>
+                      <a:r>
+                        <a:rPr lang="pt-BR" sz="1800" b="0" i="0" u="none" strike="noStrike" kern="1200" baseline="0" dirty="0">
+                          <a:solidFill>
+                            <a:schemeClr val="dk1"/>
+                          </a:solidFill>
+                          <a:latin typeface="+mn-lt"/>
+                          <a:ea typeface="+mn-ea"/>
+                          <a:cs typeface="+mn-cs"/>
+                        </a:rPr>
+                        <a:t>Universidade Nacional Autônoma do México (UNAM)</a:t>
+                      </a:r>
+                      <a:endParaRPr lang="pt-BR" sz="1800" dirty="0"/>
+                    </a:p>
+                  </a:txBody>
+                  <a:tcPr/>
+                </a:tc>
+                <a:tc>
+                  <a:txBody>
+                    <a:bodyPr/>
+                    <a:lstStyle/>
+                    <a:p>
+                      <a:pPr algn="r"/>
+                      <a:r>
+                        <a:rPr lang="pt-BR" sz="1800" b="0" i="0" u="none" strike="noStrike" kern="1200" baseline="0" dirty="0">
+                          <a:solidFill>
+                            <a:schemeClr val="dk1"/>
+                          </a:solidFill>
+                          <a:latin typeface="+mn-lt"/>
+                          <a:ea typeface="+mn-ea"/>
+                          <a:cs typeface="+mn-cs"/>
+                        </a:rPr>
+                        <a:t>56,8</a:t>
+                      </a:r>
+                      <a:endParaRPr lang="pt-BR" sz="1800" dirty="0"/>
+                    </a:p>
+                  </a:txBody>
+                  <a:tcPr/>
+                </a:tc>
+                <a:extLst>
+                  <a:ext uri="{0D108BD9-81ED-4DB2-BD59-A6C34878D82A}">
+                    <a16:rowId xmlns:a16="http://schemas.microsoft.com/office/drawing/2014/main" val="956538992"/>
+                  </a:ext>
+                </a:extLst>
+              </a:tr>
+              <a:tr h="370840">
+                <a:tc>
+                  <a:txBody>
+                    <a:bodyPr/>
+                    <a:lstStyle/>
+                    <a:p>
+                      <a:r>
+                        <a:rPr lang="pt-BR" sz="1800" b="0" i="0" u="none" strike="noStrike" kern="1200" baseline="0" dirty="0">
+                          <a:solidFill>
+                            <a:schemeClr val="dk1"/>
+                          </a:solidFill>
+                          <a:latin typeface="+mn-lt"/>
+                          <a:ea typeface="+mn-ea"/>
+                          <a:cs typeface="+mn-cs"/>
+                        </a:rPr>
+                        <a:t>Brasil</a:t>
+                      </a:r>
+                      <a:endParaRPr lang="pt-BR" sz="1800" dirty="0"/>
+                    </a:p>
+                  </a:txBody>
+                  <a:tcPr/>
+                </a:tc>
+                <a:tc>
+                  <a:txBody>
+                    <a:bodyPr/>
+                    <a:lstStyle/>
+                    <a:p>
+                      <a:r>
+                        <a:rPr lang="pt-BR" sz="1800" b="0" i="0" u="none" strike="noStrike" kern="1200" baseline="0" dirty="0">
+                          <a:solidFill>
+                            <a:schemeClr val="dk1"/>
+                          </a:solidFill>
+                          <a:latin typeface="+mn-lt"/>
+                          <a:ea typeface="+mn-ea"/>
+                          <a:cs typeface="+mn-cs"/>
+                        </a:rPr>
+                        <a:t>Universidade de São Paulo (USP)</a:t>
+                      </a:r>
+                      <a:endParaRPr lang="pt-BR" sz="1800" dirty="0"/>
+                    </a:p>
+                  </a:txBody>
+                  <a:tcPr/>
+                </a:tc>
+                <a:tc>
+                  <a:txBody>
+                    <a:bodyPr/>
+                    <a:lstStyle/>
+                    <a:p>
+                      <a:pPr algn="r"/>
+                      <a:r>
+                        <a:rPr lang="pt-BR" sz="1800" b="0" i="0" u="none" strike="noStrike" kern="1200" baseline="0" dirty="0">
+                          <a:solidFill>
+                            <a:schemeClr val="dk1"/>
+                          </a:solidFill>
+                          <a:latin typeface="+mn-lt"/>
+                          <a:ea typeface="+mn-ea"/>
+                          <a:cs typeface="+mn-cs"/>
+                        </a:rPr>
+                        <a:t>55,5</a:t>
+                      </a:r>
+                      <a:endParaRPr lang="pt-BR" sz="1800" dirty="0"/>
+                    </a:p>
+                  </a:txBody>
+                  <a:tcPr/>
+                </a:tc>
+                <a:extLst>
+                  <a:ext uri="{0D108BD9-81ED-4DB2-BD59-A6C34878D82A}">
+                    <a16:rowId xmlns:a16="http://schemas.microsoft.com/office/drawing/2014/main" val="85335842"/>
+                  </a:ext>
+                </a:extLst>
+              </a:tr>
+              <a:tr h="370840">
+                <a:tc>
+                  <a:txBody>
+                    <a:bodyPr/>
+                    <a:lstStyle/>
+                    <a:p>
+                      <a:r>
+                        <a:rPr lang="pt-BR" sz="1800" b="0" i="0" u="none" strike="noStrike" kern="1200" baseline="0" dirty="0">
+                          <a:solidFill>
+                            <a:schemeClr val="dk1"/>
+                          </a:solidFill>
+                          <a:latin typeface="+mn-lt"/>
+                          <a:ea typeface="+mn-ea"/>
+                          <a:cs typeface="+mn-cs"/>
+                        </a:rPr>
+                        <a:t>Índia</a:t>
+                      </a:r>
+                      <a:endParaRPr lang="pt-BR" sz="1800" dirty="0"/>
+                    </a:p>
+                  </a:txBody>
+                  <a:tcPr/>
+                </a:tc>
+                <a:tc>
+                  <a:txBody>
+                    <a:bodyPr/>
+                    <a:lstStyle/>
+                    <a:p>
+                      <a:r>
+                        <a:rPr lang="pt-BR" sz="1800" b="0" i="0" u="none" strike="noStrike" kern="1200" baseline="0" dirty="0">
+                          <a:solidFill>
+                            <a:schemeClr val="dk1"/>
+                          </a:solidFill>
+                          <a:latin typeface="+mn-lt"/>
+                          <a:ea typeface="+mn-ea"/>
+                          <a:cs typeface="+mn-cs"/>
+                        </a:rPr>
+                        <a:t>Instituto Indiano de Tecnologia de Bombaim (IITB) </a:t>
+                      </a:r>
+                      <a:endParaRPr lang="pt-BR" sz="1800" dirty="0"/>
+                    </a:p>
+                  </a:txBody>
+                  <a:tcPr/>
+                </a:tc>
+                <a:tc>
+                  <a:txBody>
+                    <a:bodyPr/>
+                    <a:lstStyle/>
+                    <a:p>
+                      <a:pPr algn="r"/>
+                      <a:r>
+                        <a:rPr lang="pt-BR" sz="1800" b="0" i="0" u="none" strike="noStrike" kern="1200" baseline="0" dirty="0">
+                          <a:solidFill>
+                            <a:schemeClr val="dk1"/>
+                          </a:solidFill>
+                          <a:latin typeface="+mn-lt"/>
+                          <a:ea typeface="+mn-ea"/>
+                          <a:cs typeface="+mn-cs"/>
+                        </a:rPr>
+                        <a:t>48,2</a:t>
+                      </a:r>
+                      <a:endParaRPr lang="pt-BR" sz="1800" dirty="0"/>
+                    </a:p>
+                  </a:txBody>
+                  <a:tcPr/>
+                </a:tc>
+                <a:extLst>
+                  <a:ext uri="{0D108BD9-81ED-4DB2-BD59-A6C34878D82A}">
+                    <a16:rowId xmlns:a16="http://schemas.microsoft.com/office/drawing/2014/main" val="2086496288"/>
+                  </a:ext>
+                </a:extLst>
+              </a:tr>
+              <a:tr h="370840">
+                <a:tc>
+                  <a:txBody>
+                    <a:bodyPr/>
+                    <a:lstStyle/>
+                    <a:p>
+                      <a:r>
+                        <a:rPr lang="pt-BR" sz="1800" b="0" i="0" u="none" strike="noStrike" kern="1200" baseline="0" dirty="0">
+                          <a:solidFill>
+                            <a:schemeClr val="dk1"/>
+                          </a:solidFill>
+                          <a:latin typeface="+mn-lt"/>
+                          <a:ea typeface="+mn-ea"/>
+                          <a:cs typeface="+mn-cs"/>
+                        </a:rPr>
+                        <a:t>Índia</a:t>
+                      </a:r>
+                      <a:endParaRPr lang="pt-BR" sz="1800" dirty="0"/>
+                    </a:p>
+                  </a:txBody>
+                  <a:tcPr/>
+                </a:tc>
+                <a:tc>
+                  <a:txBody>
+                    <a:bodyPr/>
+                    <a:lstStyle/>
+                    <a:p>
+                      <a:r>
+                        <a:rPr lang="pt-BR" sz="1800" b="0" i="0" u="none" strike="noStrike" kern="1200" baseline="0" dirty="0">
+                          <a:solidFill>
+                            <a:schemeClr val="dk1"/>
+                          </a:solidFill>
+                          <a:latin typeface="+mn-lt"/>
+                          <a:ea typeface="+mn-ea"/>
+                          <a:cs typeface="+mn-cs"/>
+                        </a:rPr>
+                        <a:t>Instituto Indiano de Ciência de Bangalore (IISC) </a:t>
+                      </a:r>
+                      <a:endParaRPr lang="pt-BR" sz="1800" dirty="0"/>
+                    </a:p>
+                  </a:txBody>
+                  <a:tcPr/>
+                </a:tc>
+                <a:tc>
+                  <a:txBody>
+                    <a:bodyPr/>
+                    <a:lstStyle/>
+                    <a:p>
+                      <a:pPr algn="r"/>
+                      <a:r>
+                        <a:rPr lang="pt-BR" sz="1800" b="0" i="0" u="none" strike="noStrike" kern="1200" baseline="0" dirty="0">
+                          <a:solidFill>
+                            <a:schemeClr val="dk1"/>
+                          </a:solidFill>
+                          <a:latin typeface="+mn-lt"/>
+                          <a:ea typeface="+mn-ea"/>
+                          <a:cs typeface="+mn-cs"/>
+                        </a:rPr>
+                        <a:t>47,1</a:t>
+                      </a:r>
+                      <a:endParaRPr lang="pt-BR" sz="1800" dirty="0"/>
+                    </a:p>
+                  </a:txBody>
+                  <a:tcPr/>
+                </a:tc>
+                <a:extLst>
+                  <a:ext uri="{0D108BD9-81ED-4DB2-BD59-A6C34878D82A}">
+                    <a16:rowId xmlns:a16="http://schemas.microsoft.com/office/drawing/2014/main" val="710024213"/>
+                  </a:ext>
+                </a:extLst>
+              </a:tr>
+              <a:tr h="370840">
+                <a:tc>
+                  <a:txBody>
+                    <a:bodyPr/>
+                    <a:lstStyle/>
+                    <a:p>
+                      <a:r>
+                        <a:rPr lang="pt-BR" sz="1800" b="0" i="0" u="none" strike="noStrike" kern="1200" baseline="0" dirty="0">
+                          <a:solidFill>
+                            <a:schemeClr val="dk1"/>
+                          </a:solidFill>
+                          <a:latin typeface="+mn-lt"/>
+                          <a:ea typeface="+mn-ea"/>
+                          <a:cs typeface="+mn-cs"/>
+                        </a:rPr>
+                        <a:t>Índia</a:t>
+                      </a:r>
+                      <a:endParaRPr lang="pt-BR" sz="1800" dirty="0"/>
+                    </a:p>
+                  </a:txBody>
+                  <a:tcPr/>
+                </a:tc>
+                <a:tc>
+                  <a:txBody>
+                    <a:bodyPr/>
+                    <a:lstStyle/>
+                    <a:p>
+                      <a:r>
+                        <a:rPr lang="pt-BR" sz="1800" b="0" i="0" u="none" strike="noStrike" kern="1200" baseline="0" dirty="0">
+                          <a:solidFill>
+                            <a:schemeClr val="dk1"/>
+                          </a:solidFill>
+                          <a:latin typeface="+mn-lt"/>
+                          <a:ea typeface="+mn-ea"/>
+                          <a:cs typeface="+mn-cs"/>
+                        </a:rPr>
+                        <a:t>Instituto Indiano de Tecnologia de Nova Déli (IITD) </a:t>
+                      </a:r>
+                      <a:endParaRPr lang="pt-BR" sz="1800" dirty="0"/>
+                    </a:p>
+                  </a:txBody>
+                  <a:tcPr/>
+                </a:tc>
+                <a:tc>
+                  <a:txBody>
+                    <a:bodyPr/>
+                    <a:lstStyle/>
+                    <a:p>
+                      <a:pPr algn="r"/>
+                      <a:r>
+                        <a:rPr lang="pt-BR" sz="1800" b="0" i="0" u="none" strike="noStrike" kern="1200" baseline="0" dirty="0">
+                          <a:solidFill>
+                            <a:schemeClr val="dk1"/>
+                          </a:solidFill>
+                          <a:latin typeface="+mn-lt"/>
+                          <a:ea typeface="+mn-ea"/>
+                          <a:cs typeface="+mn-cs"/>
+                        </a:rPr>
+                        <a:t>46,6</a:t>
+                      </a:r>
+                      <a:endParaRPr lang="pt-BR" sz="1800" dirty="0"/>
+                    </a:p>
+                  </a:txBody>
+                  <a:tcPr/>
+                </a:tc>
+                <a:extLst>
+                  <a:ext uri="{0D108BD9-81ED-4DB2-BD59-A6C34878D82A}">
+                    <a16:rowId xmlns:a16="http://schemas.microsoft.com/office/drawing/2014/main" val="1554020242"/>
+                  </a:ext>
+                </a:extLst>
+              </a:tr>
+            </a:tbl>
+          </a:graphicData>
+        </a:graphic>
+      </p:graphicFrame>
+    </p:spTree>
+    <p:extLst>
+      <p:ext uri="{BB962C8B-B14F-4D97-AF65-F5344CB8AC3E}">
+        <p14:creationId xmlns:p14="http://schemas.microsoft.com/office/powerpoint/2010/main" val="990005224"/>
+      </p:ext>
+    </p:extLst>
+  </p:cSld>
+  <p:clrMapOvr>
+    <a:masterClrMapping/>
+  </p:clrMapOvr>
+</p:sld>
+</file>
+
+<file path=ppt/slides/slide18.xml><?xml version="1.0" encoding="utf-8"?>
+<p:sld xmlns:a="http://schemas.openxmlformats.org/drawingml/2006/main" xmlns:r="http://schemas.openxmlformats.org/officeDocument/2006/relationships" xmlns:p="http://schemas.openxmlformats.org/presentationml/2006/main">
+  <p:cSld>
+    <p:spTree>
+      <p:nvGrpSpPr>
+        <p:cNvPr id="1" name=""/>
+        <p:cNvGrpSpPr/>
+        <p:nvPr/>
+      </p:nvGrpSpPr>
+      <p:grpSpPr>
+        <a:xfrm>
+          <a:off x="0" y="0"/>
+          <a:ext cx="0" cy="0"/>
+          <a:chOff x="0" y="0"/>
+          <a:chExt cx="0" cy="0"/>
+        </a:xfrm>
+      </p:grpSpPr>
+      <p:sp>
+        <p:nvSpPr>
+          <p:cNvPr id="2" name="Título 1">
+            <a:extLst>
+              <a:ext uri="{FF2B5EF4-FFF2-40B4-BE49-F238E27FC236}">
+                <a16:creationId xmlns:a16="http://schemas.microsoft.com/office/drawing/2014/main" id="{BB39F4BA-0D13-482F-9C6E-58347D3C9BF4}"/>
+              </a:ext>
+            </a:extLst>
+          </p:cNvPr>
+          <p:cNvSpPr>
+            <a:spLocks noGrp="1"/>
+          </p:cNvSpPr>
+          <p:nvPr>
+            <p:ph type="title"/>
+          </p:nvPr>
+        </p:nvSpPr>
+        <p:spPr/>
+        <p:txBody>
+          <a:bodyPr>
+            <a:noAutofit/>
+          </a:bodyPr>
+          <a:lstStyle/>
+          <a:p>
+            <a:r>
+              <a:rPr lang="pt-BR" sz="2800" dirty="0"/>
+              <a:t>Indicadores de qualidade de inovação: 10 principais economias de renda elevada e média - 2019</a:t>
+            </a:r>
+          </a:p>
+        </p:txBody>
+      </p:sp>
+      <p:sp>
+        <p:nvSpPr>
+          <p:cNvPr id="7" name="Espaço Reservado para Texto 6">
+            <a:extLst>
+              <a:ext uri="{FF2B5EF4-FFF2-40B4-BE49-F238E27FC236}">
+                <a16:creationId xmlns:a16="http://schemas.microsoft.com/office/drawing/2014/main" id="{028921C2-0F9A-4238-8725-D9C57CB5652F}"/>
+              </a:ext>
+            </a:extLst>
+          </p:cNvPr>
+          <p:cNvSpPr>
+            <a:spLocks noGrp="1"/>
+          </p:cNvSpPr>
+          <p:nvPr>
+            <p:ph type="body" sz="quarter" idx="13"/>
+          </p:nvPr>
+        </p:nvSpPr>
+        <p:spPr/>
+        <p:txBody>
+          <a:bodyPr/>
+          <a:lstStyle/>
+          <a:p>
+            <a:r>
+              <a:rPr lang="pt-BR" dirty="0"/>
+              <a:t>Economias de renda média</a:t>
+            </a:r>
+          </a:p>
+        </p:txBody>
+      </p:sp>
+      <p:pic>
+        <p:nvPicPr>
+          <p:cNvPr id="12" name="Espaço Reservado para Conteúdo 8" descr="Tela de celular com texto preto sobre fundo branco&#10;&#10;Descrição gerada automaticamente">
+            <a:extLst>
+              <a:ext uri="{FF2B5EF4-FFF2-40B4-BE49-F238E27FC236}">
+                <a16:creationId xmlns:a16="http://schemas.microsoft.com/office/drawing/2014/main" id="{9BE25869-AD03-4376-81AD-60675FC679BC}"/>
+              </a:ext>
+            </a:extLst>
+          </p:cNvPr>
+          <p:cNvPicPr>
+            <a:picLocks noGrp="1" noChangeAspect="1"/>
+          </p:cNvPicPr>
+          <p:nvPr>
+            <p:ph idx="1"/>
+          </p:nvPr>
+        </p:nvPicPr>
+        <p:blipFill>
+          <a:blip r:embed="rId2" cstate="print">
+            <a:extLst>
+              <a:ext uri="{28A0092B-C50C-407E-A947-70E740481C1C}">
+                <a14:useLocalDpi xmlns:a14="http://schemas.microsoft.com/office/drawing/2010/main" val="0"/>
+              </a:ext>
+            </a:extLst>
+          </a:blip>
+          <a:stretch>
+            <a:fillRect/>
+          </a:stretch>
+        </p:blipFill>
+        <p:spPr>
+          <a:xfrm>
+            <a:off x="1132828" y="1838325"/>
+            <a:ext cx="7487944" cy="4562475"/>
+          </a:xfrm>
+        </p:spPr>
+      </p:pic>
+    </p:spTree>
+    <p:extLst>
+      <p:ext uri="{BB962C8B-B14F-4D97-AF65-F5344CB8AC3E}">
+        <p14:creationId xmlns:p14="http://schemas.microsoft.com/office/powerpoint/2010/main" val="3646596493"/>
+      </p:ext>
+    </p:extLst>
+  </p:cSld>
+  <p:clrMapOvr>
+    <a:masterClrMapping/>
+  </p:clrMapOvr>
+</p:sld>
+</file>
+
+<file path=ppt/slides/slide19.xml><?xml version="1.0" encoding="utf-8"?>
+<p:sld xmlns:a="http://schemas.openxmlformats.org/drawingml/2006/main" xmlns:r="http://schemas.openxmlformats.org/officeDocument/2006/relationships" xmlns:p="http://schemas.openxmlformats.org/presentationml/2006/main">
+  <p:cSld>
+    <p:spTree>
+      <p:nvGrpSpPr>
+        <p:cNvPr id="1" name=""/>
+        <p:cNvGrpSpPr/>
+        <p:nvPr/>
+      </p:nvGrpSpPr>
+      <p:grpSpPr>
+        <a:xfrm>
+          <a:off x="0" y="0"/>
+          <a:ext cx="0" cy="0"/>
+          <a:chOff x="0" y="0"/>
+          <a:chExt cx="0" cy="0"/>
+        </a:xfrm>
+      </p:grpSpPr>
+      <p:sp>
+        <p:nvSpPr>
           <p:cNvPr id="2" name="Título 1">
             <a:extLst>
               <a:ext uri="{FF2B5EF4-FFF2-40B4-BE49-F238E27FC236}">

</xml_diff>

<commit_message>
Até a página 21
</commit_message>
<xml_diff>
--- a/apresentacao-sbg-2020.pptx
+++ b/apresentacao-sbg-2020.pptx
@@ -23,33 +23,34 @@
     <p:sldId id="286" r:id="rId17"/>
     <p:sldId id="287" r:id="rId18"/>
     <p:sldId id="288" r:id="rId19"/>
-    <p:sldId id="282" r:id="rId20"/>
+    <p:sldId id="289" r:id="rId20"/>
+    <p:sldId id="282" r:id="rId21"/>
   </p:sldIdLst>
   <p:sldSz cx="9753600" cy="7315200"/>
   <p:notesSz cx="6858000" cy="9144000"/>
   <p:embeddedFontLst>
     <p:embeddedFont>
       <p:font typeface="Calibri" panose="020F0502020204030204" pitchFamily="34" charset="0"/>
-      <p:regular r:id="rId21"/>
-      <p:bold r:id="rId22"/>
-      <p:italic r:id="rId23"/>
-      <p:boldItalic r:id="rId24"/>
+      <p:regular r:id="rId22"/>
+      <p:bold r:id="rId23"/>
+      <p:italic r:id="rId24"/>
+      <p:boldItalic r:id="rId25"/>
     </p:embeddedFont>
     <p:embeddedFont>
       <p:font typeface="Josefin Sans Regular Bold" panose="020B0604020202020204" charset="0"/>
-      <p:regular r:id="rId25"/>
+      <p:regular r:id="rId26"/>
     </p:embeddedFont>
     <p:embeddedFont>
       <p:font typeface="Poppins" panose="00000500000000000000" pitchFamily="2" charset="0"/>
-      <p:regular r:id="rId26"/>
-      <p:bold r:id="rId27"/>
-      <p:italic r:id="rId28"/>
-      <p:boldItalic r:id="rId29"/>
+      <p:regular r:id="rId27"/>
+      <p:bold r:id="rId28"/>
+      <p:italic r:id="rId29"/>
+      <p:boldItalic r:id="rId30"/>
     </p:embeddedFont>
     <p:embeddedFont>
       <p:font typeface="Poppins Light" panose="00000400000000000000" pitchFamily="2" charset="0"/>
-      <p:regular r:id="rId30"/>
-      <p:italic r:id="rId31"/>
+      <p:regular r:id="rId31"/>
+      <p:italic r:id="rId32"/>
     </p:embeddedFont>
   </p:embeddedFontLst>
   <p:defaultTextStyle>
@@ -12913,7 +12914,7 @@
           <p:cNvPr id="2" name="Título 1">
             <a:extLst>
               <a:ext uri="{FF2B5EF4-FFF2-40B4-BE49-F238E27FC236}">
-                <a16:creationId xmlns:a16="http://schemas.microsoft.com/office/drawing/2014/main" id="{3438147E-AC69-42F8-8FAF-747C320F62BE}"/>
+                <a16:creationId xmlns:a16="http://schemas.microsoft.com/office/drawing/2014/main" id="{219DFD83-3C16-44E4-B9CE-4B7CE8856E3F}"/>
               </a:ext>
             </a:extLst>
           </p:cNvPr>
@@ -12926,26 +12927,2148 @@
         </p:nvSpPr>
         <p:spPr/>
         <p:txBody>
-          <a:bodyPr/>
+          <a:bodyPr>
+            <a:noAutofit/>
+          </a:bodyPr>
           <a:lstStyle/>
           <a:p>
             <a:r>
-              <a:rPr lang="pt-BR" sz="1800" b="1" dirty="0">
-                <a:effectLst/>
-                <a:latin typeface="Calibri" panose="020F0502020204030204" pitchFamily="34" charset="0"/>
-                <a:ea typeface="Calibri" panose="020F0502020204030204" pitchFamily="34" charset="0"/>
-                <a:cs typeface="Times New Roman" panose="02020603050405020304" pitchFamily="18" charset="0"/>
-              </a:rPr>
-              <a:t>Indicadores Nacionais de Ciência e Tecnologia e Inovação 2019</a:t>
+              <a:rPr lang="pt-BR" sz="2600" dirty="0"/>
+              <a:t>Principal cluster de economias ou regiões transfronteiriças entre os 50 mais importantes - 2019</a:t>
             </a:r>
-            <a:endParaRPr lang="pt-BR" dirty="0"/>
           </a:p>
         </p:txBody>
       </p:sp>
+      <p:graphicFrame>
+        <p:nvGraphicFramePr>
+          <p:cNvPr id="13" name="Espaço Reservado para Conteúdo 12">
+            <a:extLst>
+              <a:ext uri="{FF2B5EF4-FFF2-40B4-BE49-F238E27FC236}">
+                <a16:creationId xmlns:a16="http://schemas.microsoft.com/office/drawing/2014/main" id="{6B30771C-A425-452C-98E4-387DB7557511}"/>
+              </a:ext>
+            </a:extLst>
+          </p:cNvPr>
+          <p:cNvGraphicFramePr>
+            <a:graphicFrameLocks noGrp="1"/>
+          </p:cNvGraphicFramePr>
+          <p:nvPr>
+            <p:ph idx="1"/>
+            <p:extLst>
+              <p:ext uri="{D42A27DB-BD31-4B8C-83A1-F6EECF244321}">
+                <p14:modId xmlns:p14="http://schemas.microsoft.com/office/powerpoint/2010/main" val="130115055"/>
+              </p:ext>
+            </p:extLst>
+          </p:nvPr>
+        </p:nvGraphicFramePr>
+        <p:xfrm>
+          <a:off x="1479278" y="1934754"/>
+          <a:ext cx="6795045" cy="4846292"/>
+        </p:xfrm>
+        <a:graphic>
+          <a:graphicData uri="http://schemas.openxmlformats.org/drawingml/2006/table">
+            <a:tbl>
+              <a:tblPr firstRow="1" firstCol="1" bandRow="1">
+                <a:tableStyleId>{5C22544A-7EE6-4342-B048-85BDC9FD1C3A}</a:tableStyleId>
+              </a:tblPr>
+              <a:tblGrid>
+                <a:gridCol w="882922">
+                  <a:extLst>
+                    <a:ext uri="{9D8B030D-6E8A-4147-A177-3AD203B41FA5}">
+                      <a16:colId xmlns:a16="http://schemas.microsoft.com/office/drawing/2014/main" val="3279378572"/>
+                    </a:ext>
+                  </a:extLst>
+                </a:gridCol>
+                <a:gridCol w="3646574">
+                  <a:extLst>
+                    <a:ext uri="{9D8B030D-6E8A-4147-A177-3AD203B41FA5}">
+                      <a16:colId xmlns:a16="http://schemas.microsoft.com/office/drawing/2014/main" val="543386224"/>
+                    </a:ext>
+                  </a:extLst>
+                </a:gridCol>
+                <a:gridCol w="2265549">
+                  <a:extLst>
+                    <a:ext uri="{9D8B030D-6E8A-4147-A177-3AD203B41FA5}">
+                      <a16:colId xmlns:a16="http://schemas.microsoft.com/office/drawing/2014/main" val="3710249960"/>
+                    </a:ext>
+                  </a:extLst>
+                </a:gridCol>
+              </a:tblGrid>
+              <a:tr h="220286">
+                <a:tc>
+                  <a:txBody>
+                    <a:bodyPr/>
+                    <a:lstStyle/>
+                    <a:p>
+                      <a:pPr>
+                        <a:lnSpc>
+                          <a:spcPct val="107000"/>
+                        </a:lnSpc>
+                        <a:spcAft>
+                          <a:spcPts val="800"/>
+                        </a:spcAft>
+                      </a:pPr>
+                      <a:r>
+                        <a:rPr lang="pt-BR" sz="1400">
+                          <a:effectLst/>
+                        </a:rPr>
+                        <a:t>Posição</a:t>
+                      </a:r>
+                      <a:endParaRPr lang="pt-BR" sz="1400">
+                        <a:effectLst/>
+                        <a:latin typeface="Calibri" panose="020F0502020204030204" pitchFamily="34" charset="0"/>
+                        <a:ea typeface="Calibri" panose="020F0502020204030204" pitchFamily="34" charset="0"/>
+                        <a:cs typeface="Times New Roman" panose="02020603050405020304" pitchFamily="18" charset="0"/>
+                      </a:endParaRPr>
+                    </a:p>
+                  </a:txBody>
+                  <a:tcPr marL="86399" marR="86399" marT="0" marB="0"/>
+                </a:tc>
+                <a:tc>
+                  <a:txBody>
+                    <a:bodyPr/>
+                    <a:lstStyle/>
+                    <a:p>
+                      <a:pPr>
+                        <a:lnSpc>
+                          <a:spcPct val="107000"/>
+                        </a:lnSpc>
+                        <a:spcAft>
+                          <a:spcPts val="800"/>
+                        </a:spcAft>
+                      </a:pPr>
+                      <a:r>
+                        <a:rPr lang="pt-BR" sz="1400">
+                          <a:effectLst/>
+                        </a:rPr>
+                        <a:t>Nome do cluster</a:t>
+                      </a:r>
+                      <a:endParaRPr lang="pt-BR" sz="1400">
+                        <a:effectLst/>
+                        <a:latin typeface="Calibri" panose="020F0502020204030204" pitchFamily="34" charset="0"/>
+                        <a:ea typeface="Calibri" panose="020F0502020204030204" pitchFamily="34" charset="0"/>
+                        <a:cs typeface="Times New Roman" panose="02020603050405020304" pitchFamily="18" charset="0"/>
+                      </a:endParaRPr>
+                    </a:p>
+                  </a:txBody>
+                  <a:tcPr marL="86399" marR="86399" marT="0" marB="0"/>
+                </a:tc>
+                <a:tc>
+                  <a:txBody>
+                    <a:bodyPr/>
+                    <a:lstStyle/>
+                    <a:p>
+                      <a:pPr>
+                        <a:lnSpc>
+                          <a:spcPct val="107000"/>
+                        </a:lnSpc>
+                        <a:spcAft>
+                          <a:spcPts val="800"/>
+                        </a:spcAft>
+                      </a:pPr>
+                      <a:r>
+                        <a:rPr lang="pt-BR" sz="1400">
+                          <a:effectLst/>
+                        </a:rPr>
+                        <a:t>Economia(s)</a:t>
+                      </a:r>
+                      <a:endParaRPr lang="pt-BR" sz="1400">
+                        <a:effectLst/>
+                        <a:latin typeface="Calibri" panose="020F0502020204030204" pitchFamily="34" charset="0"/>
+                        <a:ea typeface="Calibri" panose="020F0502020204030204" pitchFamily="34" charset="0"/>
+                        <a:cs typeface="Times New Roman" panose="02020603050405020304" pitchFamily="18" charset="0"/>
+                      </a:endParaRPr>
+                    </a:p>
+                  </a:txBody>
+                  <a:tcPr marL="86399" marR="86399" marT="0" marB="0"/>
+                </a:tc>
+                <a:extLst>
+                  <a:ext uri="{0D108BD9-81ED-4DB2-BD59-A6C34878D82A}">
+                    <a16:rowId xmlns:a16="http://schemas.microsoft.com/office/drawing/2014/main" val="4122226194"/>
+                  </a:ext>
+                </a:extLst>
+              </a:tr>
+              <a:tr h="220286">
+                <a:tc>
+                  <a:txBody>
+                    <a:bodyPr/>
+                    <a:lstStyle/>
+                    <a:p>
+                      <a:pPr>
+                        <a:lnSpc>
+                          <a:spcPct val="107000"/>
+                        </a:lnSpc>
+                        <a:spcAft>
+                          <a:spcPts val="800"/>
+                        </a:spcAft>
+                      </a:pPr>
+                      <a:r>
+                        <a:rPr lang="pt-BR" sz="1400">
+                          <a:effectLst/>
+                        </a:rPr>
+                        <a:t>1</a:t>
+                      </a:r>
+                      <a:endParaRPr lang="pt-BR" sz="1400">
+                        <a:effectLst/>
+                        <a:latin typeface="Calibri" panose="020F0502020204030204" pitchFamily="34" charset="0"/>
+                        <a:ea typeface="Calibri" panose="020F0502020204030204" pitchFamily="34" charset="0"/>
+                        <a:cs typeface="Times New Roman" panose="02020603050405020304" pitchFamily="18" charset="0"/>
+                      </a:endParaRPr>
+                    </a:p>
+                  </a:txBody>
+                  <a:tcPr marL="86399" marR="86399" marT="0" marB="0"/>
+                </a:tc>
+                <a:tc>
+                  <a:txBody>
+                    <a:bodyPr/>
+                    <a:lstStyle/>
+                    <a:p>
+                      <a:pPr>
+                        <a:lnSpc>
+                          <a:spcPct val="107000"/>
+                        </a:lnSpc>
+                        <a:spcAft>
+                          <a:spcPts val="800"/>
+                        </a:spcAft>
+                      </a:pPr>
+                      <a:r>
+                        <a:rPr lang="pt-BR" sz="1400">
+                          <a:effectLst/>
+                        </a:rPr>
+                        <a:t> Tóquio-Yokohama</a:t>
+                      </a:r>
+                      <a:endParaRPr lang="pt-BR" sz="1400">
+                        <a:effectLst/>
+                        <a:latin typeface="Calibri" panose="020F0502020204030204" pitchFamily="34" charset="0"/>
+                        <a:ea typeface="Calibri" panose="020F0502020204030204" pitchFamily="34" charset="0"/>
+                        <a:cs typeface="Times New Roman" panose="02020603050405020304" pitchFamily="18" charset="0"/>
+                      </a:endParaRPr>
+                    </a:p>
+                  </a:txBody>
+                  <a:tcPr marL="86399" marR="86399" marT="0" marB="0"/>
+                </a:tc>
+                <a:tc>
+                  <a:txBody>
+                    <a:bodyPr/>
+                    <a:lstStyle/>
+                    <a:p>
+                      <a:pPr>
+                        <a:lnSpc>
+                          <a:spcPct val="107000"/>
+                        </a:lnSpc>
+                        <a:spcAft>
+                          <a:spcPts val="800"/>
+                        </a:spcAft>
+                      </a:pPr>
+                      <a:r>
+                        <a:rPr lang="pt-BR" sz="1400">
+                          <a:effectLst/>
+                        </a:rPr>
+                        <a:t> JP</a:t>
+                      </a:r>
+                      <a:endParaRPr lang="pt-BR" sz="1400">
+                        <a:effectLst/>
+                        <a:latin typeface="Calibri" panose="020F0502020204030204" pitchFamily="34" charset="0"/>
+                        <a:ea typeface="Calibri" panose="020F0502020204030204" pitchFamily="34" charset="0"/>
+                        <a:cs typeface="Times New Roman" panose="02020603050405020304" pitchFamily="18" charset="0"/>
+                      </a:endParaRPr>
+                    </a:p>
+                  </a:txBody>
+                  <a:tcPr marL="86399" marR="86399" marT="0" marB="0"/>
+                </a:tc>
+                <a:extLst>
+                  <a:ext uri="{0D108BD9-81ED-4DB2-BD59-A6C34878D82A}">
+                    <a16:rowId xmlns:a16="http://schemas.microsoft.com/office/drawing/2014/main" val="1209567012"/>
+                  </a:ext>
+                </a:extLst>
+              </a:tr>
+              <a:tr h="220286">
+                <a:tc>
+                  <a:txBody>
+                    <a:bodyPr/>
+                    <a:lstStyle/>
+                    <a:p>
+                      <a:pPr>
+                        <a:lnSpc>
+                          <a:spcPct val="107000"/>
+                        </a:lnSpc>
+                        <a:spcAft>
+                          <a:spcPts val="800"/>
+                        </a:spcAft>
+                      </a:pPr>
+                      <a:r>
+                        <a:rPr lang="pt-BR" sz="1400">
+                          <a:effectLst/>
+                        </a:rPr>
+                        <a:t>2</a:t>
+                      </a:r>
+                      <a:endParaRPr lang="pt-BR" sz="1400">
+                        <a:effectLst/>
+                        <a:latin typeface="Calibri" panose="020F0502020204030204" pitchFamily="34" charset="0"/>
+                        <a:ea typeface="Calibri" panose="020F0502020204030204" pitchFamily="34" charset="0"/>
+                        <a:cs typeface="Times New Roman" panose="02020603050405020304" pitchFamily="18" charset="0"/>
+                      </a:endParaRPr>
+                    </a:p>
+                  </a:txBody>
+                  <a:tcPr marL="86399" marR="86399" marT="0" marB="0"/>
+                </a:tc>
+                <a:tc>
+                  <a:txBody>
+                    <a:bodyPr/>
+                    <a:lstStyle/>
+                    <a:p>
+                      <a:pPr>
+                        <a:lnSpc>
+                          <a:spcPct val="107000"/>
+                        </a:lnSpc>
+                        <a:spcAft>
+                          <a:spcPts val="800"/>
+                        </a:spcAft>
+                      </a:pPr>
+                      <a:r>
+                        <a:rPr lang="pt-BR" sz="1400" dirty="0">
+                          <a:effectLst/>
+                        </a:rPr>
+                        <a:t> Shenzhen-Hong Kong </a:t>
+                      </a:r>
+                      <a:endParaRPr lang="pt-BR" sz="1400" dirty="0">
+                        <a:effectLst/>
+                        <a:latin typeface="Calibri" panose="020F0502020204030204" pitchFamily="34" charset="0"/>
+                        <a:ea typeface="Calibri" panose="020F0502020204030204" pitchFamily="34" charset="0"/>
+                        <a:cs typeface="Times New Roman" panose="02020603050405020304" pitchFamily="18" charset="0"/>
+                      </a:endParaRPr>
+                    </a:p>
+                  </a:txBody>
+                  <a:tcPr marL="86399" marR="86399" marT="0" marB="0"/>
+                </a:tc>
+                <a:tc>
+                  <a:txBody>
+                    <a:bodyPr/>
+                    <a:lstStyle/>
+                    <a:p>
+                      <a:pPr>
+                        <a:lnSpc>
+                          <a:spcPct val="107000"/>
+                        </a:lnSpc>
+                        <a:spcAft>
+                          <a:spcPts val="800"/>
+                        </a:spcAft>
+                      </a:pPr>
+                      <a:r>
+                        <a:rPr lang="pt-BR" sz="1400">
+                          <a:effectLst/>
+                        </a:rPr>
+                        <a:t>CN/HK</a:t>
+                      </a:r>
+                      <a:endParaRPr lang="pt-BR" sz="1400">
+                        <a:effectLst/>
+                        <a:latin typeface="Calibri" panose="020F0502020204030204" pitchFamily="34" charset="0"/>
+                        <a:ea typeface="Calibri" panose="020F0502020204030204" pitchFamily="34" charset="0"/>
+                        <a:cs typeface="Times New Roman" panose="02020603050405020304" pitchFamily="18" charset="0"/>
+                      </a:endParaRPr>
+                    </a:p>
+                  </a:txBody>
+                  <a:tcPr marL="86399" marR="86399" marT="0" marB="0"/>
+                </a:tc>
+                <a:extLst>
+                  <a:ext uri="{0D108BD9-81ED-4DB2-BD59-A6C34878D82A}">
+                    <a16:rowId xmlns:a16="http://schemas.microsoft.com/office/drawing/2014/main" val="3135434748"/>
+                  </a:ext>
+                </a:extLst>
+              </a:tr>
+              <a:tr h="220286">
+                <a:tc>
+                  <a:txBody>
+                    <a:bodyPr/>
+                    <a:lstStyle/>
+                    <a:p>
+                      <a:pPr>
+                        <a:lnSpc>
+                          <a:spcPct val="107000"/>
+                        </a:lnSpc>
+                        <a:spcAft>
+                          <a:spcPts val="800"/>
+                        </a:spcAft>
+                      </a:pPr>
+                      <a:r>
+                        <a:rPr lang="pt-BR" sz="1400">
+                          <a:effectLst/>
+                        </a:rPr>
+                        <a:t>3</a:t>
+                      </a:r>
+                      <a:endParaRPr lang="pt-BR" sz="1400">
+                        <a:effectLst/>
+                        <a:latin typeface="Calibri" panose="020F0502020204030204" pitchFamily="34" charset="0"/>
+                        <a:ea typeface="Calibri" panose="020F0502020204030204" pitchFamily="34" charset="0"/>
+                        <a:cs typeface="Times New Roman" panose="02020603050405020304" pitchFamily="18" charset="0"/>
+                      </a:endParaRPr>
+                    </a:p>
+                  </a:txBody>
+                  <a:tcPr marL="86399" marR="86399" marT="0" marB="0"/>
+                </a:tc>
+                <a:tc>
+                  <a:txBody>
+                    <a:bodyPr/>
+                    <a:lstStyle/>
+                    <a:p>
+                      <a:pPr>
+                        <a:lnSpc>
+                          <a:spcPct val="107000"/>
+                        </a:lnSpc>
+                        <a:spcAft>
+                          <a:spcPts val="800"/>
+                        </a:spcAft>
+                      </a:pPr>
+                      <a:r>
+                        <a:rPr lang="pt-BR" sz="1400">
+                          <a:effectLst/>
+                        </a:rPr>
+                        <a:t> Seul </a:t>
+                      </a:r>
+                      <a:endParaRPr lang="pt-BR" sz="1400">
+                        <a:effectLst/>
+                        <a:latin typeface="Calibri" panose="020F0502020204030204" pitchFamily="34" charset="0"/>
+                        <a:ea typeface="Calibri" panose="020F0502020204030204" pitchFamily="34" charset="0"/>
+                        <a:cs typeface="Times New Roman" panose="02020603050405020304" pitchFamily="18" charset="0"/>
+                      </a:endParaRPr>
+                    </a:p>
+                  </a:txBody>
+                  <a:tcPr marL="86399" marR="86399" marT="0" marB="0"/>
+                </a:tc>
+                <a:tc>
+                  <a:txBody>
+                    <a:bodyPr/>
+                    <a:lstStyle/>
+                    <a:p>
+                      <a:pPr>
+                        <a:lnSpc>
+                          <a:spcPct val="107000"/>
+                        </a:lnSpc>
+                        <a:spcAft>
+                          <a:spcPts val="800"/>
+                        </a:spcAft>
+                      </a:pPr>
+                      <a:r>
+                        <a:rPr lang="pt-BR" sz="1400">
+                          <a:effectLst/>
+                        </a:rPr>
+                        <a:t>KR</a:t>
+                      </a:r>
+                      <a:endParaRPr lang="pt-BR" sz="1400">
+                        <a:effectLst/>
+                        <a:latin typeface="Calibri" panose="020F0502020204030204" pitchFamily="34" charset="0"/>
+                        <a:ea typeface="Calibri" panose="020F0502020204030204" pitchFamily="34" charset="0"/>
+                        <a:cs typeface="Times New Roman" panose="02020603050405020304" pitchFamily="18" charset="0"/>
+                      </a:endParaRPr>
+                    </a:p>
+                  </a:txBody>
+                  <a:tcPr marL="86399" marR="86399" marT="0" marB="0"/>
+                </a:tc>
+                <a:extLst>
+                  <a:ext uri="{0D108BD9-81ED-4DB2-BD59-A6C34878D82A}">
+                    <a16:rowId xmlns:a16="http://schemas.microsoft.com/office/drawing/2014/main" val="342147870"/>
+                  </a:ext>
+                </a:extLst>
+              </a:tr>
+              <a:tr h="220286">
+                <a:tc>
+                  <a:txBody>
+                    <a:bodyPr/>
+                    <a:lstStyle/>
+                    <a:p>
+                      <a:pPr>
+                        <a:lnSpc>
+                          <a:spcPct val="107000"/>
+                        </a:lnSpc>
+                        <a:spcAft>
+                          <a:spcPts val="800"/>
+                        </a:spcAft>
+                      </a:pPr>
+                      <a:r>
+                        <a:rPr lang="pt-BR" sz="1400">
+                          <a:effectLst/>
+                        </a:rPr>
+                        <a:t>4</a:t>
+                      </a:r>
+                      <a:endParaRPr lang="pt-BR" sz="1400">
+                        <a:effectLst/>
+                        <a:latin typeface="Calibri" panose="020F0502020204030204" pitchFamily="34" charset="0"/>
+                        <a:ea typeface="Calibri" panose="020F0502020204030204" pitchFamily="34" charset="0"/>
+                        <a:cs typeface="Times New Roman" panose="02020603050405020304" pitchFamily="18" charset="0"/>
+                      </a:endParaRPr>
+                    </a:p>
+                  </a:txBody>
+                  <a:tcPr marL="86399" marR="86399" marT="0" marB="0"/>
+                </a:tc>
+                <a:tc>
+                  <a:txBody>
+                    <a:bodyPr/>
+                    <a:lstStyle/>
+                    <a:p>
+                      <a:pPr>
+                        <a:lnSpc>
+                          <a:spcPct val="107000"/>
+                        </a:lnSpc>
+                        <a:spcAft>
+                          <a:spcPts val="800"/>
+                        </a:spcAft>
+                      </a:pPr>
+                      <a:r>
+                        <a:rPr lang="pt-BR" sz="1400">
+                          <a:effectLst/>
+                        </a:rPr>
+                        <a:t> Pequim </a:t>
+                      </a:r>
+                      <a:endParaRPr lang="pt-BR" sz="1400">
+                        <a:effectLst/>
+                        <a:latin typeface="Calibri" panose="020F0502020204030204" pitchFamily="34" charset="0"/>
+                        <a:ea typeface="Calibri" panose="020F0502020204030204" pitchFamily="34" charset="0"/>
+                        <a:cs typeface="Times New Roman" panose="02020603050405020304" pitchFamily="18" charset="0"/>
+                      </a:endParaRPr>
+                    </a:p>
+                  </a:txBody>
+                  <a:tcPr marL="86399" marR="86399" marT="0" marB="0"/>
+                </a:tc>
+                <a:tc>
+                  <a:txBody>
+                    <a:bodyPr/>
+                    <a:lstStyle/>
+                    <a:p>
+                      <a:pPr>
+                        <a:lnSpc>
+                          <a:spcPct val="107000"/>
+                        </a:lnSpc>
+                        <a:spcAft>
+                          <a:spcPts val="800"/>
+                        </a:spcAft>
+                      </a:pPr>
+                      <a:r>
+                        <a:rPr lang="pt-BR" sz="1400">
+                          <a:effectLst/>
+                        </a:rPr>
+                        <a:t>CN</a:t>
+                      </a:r>
+                      <a:endParaRPr lang="pt-BR" sz="1400">
+                        <a:effectLst/>
+                        <a:latin typeface="Calibri" panose="020F0502020204030204" pitchFamily="34" charset="0"/>
+                        <a:ea typeface="Calibri" panose="020F0502020204030204" pitchFamily="34" charset="0"/>
+                        <a:cs typeface="Times New Roman" panose="02020603050405020304" pitchFamily="18" charset="0"/>
+                      </a:endParaRPr>
+                    </a:p>
+                  </a:txBody>
+                  <a:tcPr marL="86399" marR="86399" marT="0" marB="0"/>
+                </a:tc>
+                <a:extLst>
+                  <a:ext uri="{0D108BD9-81ED-4DB2-BD59-A6C34878D82A}">
+                    <a16:rowId xmlns:a16="http://schemas.microsoft.com/office/drawing/2014/main" val="699820225"/>
+                  </a:ext>
+                </a:extLst>
+              </a:tr>
+              <a:tr h="220286">
+                <a:tc>
+                  <a:txBody>
+                    <a:bodyPr/>
+                    <a:lstStyle/>
+                    <a:p>
+                      <a:pPr>
+                        <a:lnSpc>
+                          <a:spcPct val="107000"/>
+                        </a:lnSpc>
+                        <a:spcAft>
+                          <a:spcPts val="800"/>
+                        </a:spcAft>
+                      </a:pPr>
+                      <a:r>
+                        <a:rPr lang="pt-BR" sz="1400">
+                          <a:effectLst/>
+                        </a:rPr>
+                        <a:t>5</a:t>
+                      </a:r>
+                      <a:endParaRPr lang="pt-BR" sz="1400">
+                        <a:effectLst/>
+                        <a:latin typeface="Calibri" panose="020F0502020204030204" pitchFamily="34" charset="0"/>
+                        <a:ea typeface="Calibri" panose="020F0502020204030204" pitchFamily="34" charset="0"/>
+                        <a:cs typeface="Times New Roman" panose="02020603050405020304" pitchFamily="18" charset="0"/>
+                      </a:endParaRPr>
+                    </a:p>
+                  </a:txBody>
+                  <a:tcPr marL="86399" marR="86399" marT="0" marB="0"/>
+                </a:tc>
+                <a:tc>
+                  <a:txBody>
+                    <a:bodyPr/>
+                    <a:lstStyle/>
+                    <a:p>
+                      <a:pPr>
+                        <a:lnSpc>
+                          <a:spcPct val="107000"/>
+                        </a:lnSpc>
+                        <a:spcAft>
+                          <a:spcPts val="800"/>
+                        </a:spcAft>
+                      </a:pPr>
+                      <a:r>
+                        <a:rPr lang="pt-BR" sz="1400">
+                          <a:effectLst/>
+                        </a:rPr>
+                        <a:t> São José-São Francisco </a:t>
+                      </a:r>
+                      <a:endParaRPr lang="pt-BR" sz="1400">
+                        <a:effectLst/>
+                        <a:latin typeface="Calibri" panose="020F0502020204030204" pitchFamily="34" charset="0"/>
+                        <a:ea typeface="Calibri" panose="020F0502020204030204" pitchFamily="34" charset="0"/>
+                        <a:cs typeface="Times New Roman" panose="02020603050405020304" pitchFamily="18" charset="0"/>
+                      </a:endParaRPr>
+                    </a:p>
+                  </a:txBody>
+                  <a:tcPr marL="86399" marR="86399" marT="0" marB="0"/>
+                </a:tc>
+                <a:tc>
+                  <a:txBody>
+                    <a:bodyPr/>
+                    <a:lstStyle/>
+                    <a:p>
+                      <a:pPr>
+                        <a:lnSpc>
+                          <a:spcPct val="107000"/>
+                        </a:lnSpc>
+                        <a:spcAft>
+                          <a:spcPts val="800"/>
+                        </a:spcAft>
+                      </a:pPr>
+                      <a:r>
+                        <a:rPr lang="pt-BR" sz="1400">
+                          <a:effectLst/>
+                        </a:rPr>
+                        <a:t>CA US</a:t>
+                      </a:r>
+                      <a:endParaRPr lang="pt-BR" sz="1400">
+                        <a:effectLst/>
+                        <a:latin typeface="Calibri" panose="020F0502020204030204" pitchFamily="34" charset="0"/>
+                        <a:ea typeface="Calibri" panose="020F0502020204030204" pitchFamily="34" charset="0"/>
+                        <a:cs typeface="Times New Roman" panose="02020603050405020304" pitchFamily="18" charset="0"/>
+                      </a:endParaRPr>
+                    </a:p>
+                  </a:txBody>
+                  <a:tcPr marL="86399" marR="86399" marT="0" marB="0"/>
+                </a:tc>
+                <a:extLst>
+                  <a:ext uri="{0D108BD9-81ED-4DB2-BD59-A6C34878D82A}">
+                    <a16:rowId xmlns:a16="http://schemas.microsoft.com/office/drawing/2014/main" val="3033673832"/>
+                  </a:ext>
+                </a:extLst>
+              </a:tr>
+              <a:tr h="220286">
+                <a:tc>
+                  <a:txBody>
+                    <a:bodyPr/>
+                    <a:lstStyle/>
+                    <a:p>
+                      <a:pPr>
+                        <a:lnSpc>
+                          <a:spcPct val="107000"/>
+                        </a:lnSpc>
+                        <a:spcAft>
+                          <a:spcPts val="800"/>
+                        </a:spcAft>
+                      </a:pPr>
+                      <a:r>
+                        <a:rPr lang="pt-BR" sz="1400">
+                          <a:effectLst/>
+                        </a:rPr>
+                        <a:t>9</a:t>
+                      </a:r>
+                      <a:endParaRPr lang="pt-BR" sz="1400">
+                        <a:effectLst/>
+                        <a:latin typeface="Calibri" panose="020F0502020204030204" pitchFamily="34" charset="0"/>
+                        <a:ea typeface="Calibri" panose="020F0502020204030204" pitchFamily="34" charset="0"/>
+                        <a:cs typeface="Times New Roman" panose="02020603050405020304" pitchFamily="18" charset="0"/>
+                      </a:endParaRPr>
+                    </a:p>
+                  </a:txBody>
+                  <a:tcPr marL="86399" marR="86399" marT="0" marB="0"/>
+                </a:tc>
+                <a:tc>
+                  <a:txBody>
+                    <a:bodyPr/>
+                    <a:lstStyle/>
+                    <a:p>
+                      <a:pPr>
+                        <a:lnSpc>
+                          <a:spcPct val="107000"/>
+                        </a:lnSpc>
+                        <a:spcAft>
+                          <a:spcPts val="800"/>
+                        </a:spcAft>
+                      </a:pPr>
+                      <a:r>
+                        <a:rPr lang="pt-BR" sz="1400">
+                          <a:effectLst/>
+                        </a:rPr>
+                        <a:t> Paris </a:t>
+                      </a:r>
+                      <a:endParaRPr lang="pt-BR" sz="1400">
+                        <a:effectLst/>
+                        <a:latin typeface="Calibri" panose="020F0502020204030204" pitchFamily="34" charset="0"/>
+                        <a:ea typeface="Calibri" panose="020F0502020204030204" pitchFamily="34" charset="0"/>
+                        <a:cs typeface="Times New Roman" panose="02020603050405020304" pitchFamily="18" charset="0"/>
+                      </a:endParaRPr>
+                    </a:p>
+                  </a:txBody>
+                  <a:tcPr marL="86399" marR="86399" marT="0" marB="0"/>
+                </a:tc>
+                <a:tc>
+                  <a:txBody>
+                    <a:bodyPr/>
+                    <a:lstStyle/>
+                    <a:p>
+                      <a:pPr>
+                        <a:lnSpc>
+                          <a:spcPct val="107000"/>
+                        </a:lnSpc>
+                        <a:spcAft>
+                          <a:spcPts val="800"/>
+                        </a:spcAft>
+                      </a:pPr>
+                      <a:r>
+                        <a:rPr lang="pt-BR" sz="1400">
+                          <a:effectLst/>
+                        </a:rPr>
+                        <a:t>FR</a:t>
+                      </a:r>
+                      <a:endParaRPr lang="pt-BR" sz="1400">
+                        <a:effectLst/>
+                        <a:latin typeface="Calibri" panose="020F0502020204030204" pitchFamily="34" charset="0"/>
+                        <a:ea typeface="Calibri" panose="020F0502020204030204" pitchFamily="34" charset="0"/>
+                        <a:cs typeface="Times New Roman" panose="02020603050405020304" pitchFamily="18" charset="0"/>
+                      </a:endParaRPr>
+                    </a:p>
+                  </a:txBody>
+                  <a:tcPr marL="86399" marR="86399" marT="0" marB="0"/>
+                </a:tc>
+                <a:extLst>
+                  <a:ext uri="{0D108BD9-81ED-4DB2-BD59-A6C34878D82A}">
+                    <a16:rowId xmlns:a16="http://schemas.microsoft.com/office/drawing/2014/main" val="1195105166"/>
+                  </a:ext>
+                </a:extLst>
+              </a:tr>
+              <a:tr h="220286">
+                <a:tc>
+                  <a:txBody>
+                    <a:bodyPr/>
+                    <a:lstStyle/>
+                    <a:p>
+                      <a:pPr>
+                        <a:lnSpc>
+                          <a:spcPct val="107000"/>
+                        </a:lnSpc>
+                        <a:spcAft>
+                          <a:spcPts val="800"/>
+                        </a:spcAft>
+                      </a:pPr>
+                      <a:r>
+                        <a:rPr lang="pt-BR" sz="1400">
+                          <a:effectLst/>
+                        </a:rPr>
+                        <a:t>15</a:t>
+                      </a:r>
+                      <a:endParaRPr lang="pt-BR" sz="1400">
+                        <a:effectLst/>
+                        <a:latin typeface="Calibri" panose="020F0502020204030204" pitchFamily="34" charset="0"/>
+                        <a:ea typeface="Calibri" panose="020F0502020204030204" pitchFamily="34" charset="0"/>
+                        <a:cs typeface="Times New Roman" panose="02020603050405020304" pitchFamily="18" charset="0"/>
+                      </a:endParaRPr>
+                    </a:p>
+                  </a:txBody>
+                  <a:tcPr marL="86399" marR="86399" marT="0" marB="0"/>
+                </a:tc>
+                <a:tc>
+                  <a:txBody>
+                    <a:bodyPr/>
+                    <a:lstStyle/>
+                    <a:p>
+                      <a:pPr>
+                        <a:lnSpc>
+                          <a:spcPct val="107000"/>
+                        </a:lnSpc>
+                        <a:spcAft>
+                          <a:spcPts val="800"/>
+                        </a:spcAft>
+                      </a:pPr>
+                      <a:r>
+                        <a:rPr lang="pt-BR" sz="1400">
+                          <a:effectLst/>
+                        </a:rPr>
+                        <a:t> Londres </a:t>
+                      </a:r>
+                      <a:endParaRPr lang="pt-BR" sz="1400">
+                        <a:effectLst/>
+                        <a:latin typeface="Calibri" panose="020F0502020204030204" pitchFamily="34" charset="0"/>
+                        <a:ea typeface="Calibri" panose="020F0502020204030204" pitchFamily="34" charset="0"/>
+                        <a:cs typeface="Times New Roman" panose="02020603050405020304" pitchFamily="18" charset="0"/>
+                      </a:endParaRPr>
+                    </a:p>
+                  </a:txBody>
+                  <a:tcPr marL="86399" marR="86399" marT="0" marB="0"/>
+                </a:tc>
+                <a:tc>
+                  <a:txBody>
+                    <a:bodyPr/>
+                    <a:lstStyle/>
+                    <a:p>
+                      <a:pPr>
+                        <a:lnSpc>
+                          <a:spcPct val="107000"/>
+                        </a:lnSpc>
+                        <a:spcAft>
+                          <a:spcPts val="800"/>
+                        </a:spcAft>
+                      </a:pPr>
+                      <a:r>
+                        <a:rPr lang="pt-BR" sz="1400">
+                          <a:effectLst/>
+                        </a:rPr>
+                        <a:t>GB</a:t>
+                      </a:r>
+                      <a:endParaRPr lang="pt-BR" sz="1400">
+                        <a:effectLst/>
+                        <a:latin typeface="Calibri" panose="020F0502020204030204" pitchFamily="34" charset="0"/>
+                        <a:ea typeface="Calibri" panose="020F0502020204030204" pitchFamily="34" charset="0"/>
+                        <a:cs typeface="Times New Roman" panose="02020603050405020304" pitchFamily="18" charset="0"/>
+                      </a:endParaRPr>
+                    </a:p>
+                  </a:txBody>
+                  <a:tcPr marL="86399" marR="86399" marT="0" marB="0"/>
+                </a:tc>
+                <a:extLst>
+                  <a:ext uri="{0D108BD9-81ED-4DB2-BD59-A6C34878D82A}">
+                    <a16:rowId xmlns:a16="http://schemas.microsoft.com/office/drawing/2014/main" val="1047993297"/>
+                  </a:ext>
+                </a:extLst>
+              </a:tr>
+              <a:tr h="220286">
+                <a:tc>
+                  <a:txBody>
+                    <a:bodyPr/>
+                    <a:lstStyle/>
+                    <a:p>
+                      <a:pPr>
+                        <a:lnSpc>
+                          <a:spcPct val="107000"/>
+                        </a:lnSpc>
+                        <a:spcAft>
+                          <a:spcPts val="800"/>
+                        </a:spcAft>
+                      </a:pPr>
+                      <a:r>
+                        <a:rPr lang="pt-BR" sz="1400">
+                          <a:effectLst/>
+                        </a:rPr>
+                        <a:t>18</a:t>
+                      </a:r>
+                      <a:endParaRPr lang="pt-BR" sz="1400">
+                        <a:effectLst/>
+                        <a:latin typeface="Calibri" panose="020F0502020204030204" pitchFamily="34" charset="0"/>
+                        <a:ea typeface="Calibri" panose="020F0502020204030204" pitchFamily="34" charset="0"/>
+                        <a:cs typeface="Times New Roman" panose="02020603050405020304" pitchFamily="18" charset="0"/>
+                      </a:endParaRPr>
+                    </a:p>
+                  </a:txBody>
+                  <a:tcPr marL="86399" marR="86399" marT="0" marB="0"/>
+                </a:tc>
+                <a:tc>
+                  <a:txBody>
+                    <a:bodyPr/>
+                    <a:lstStyle/>
+                    <a:p>
+                      <a:pPr>
+                        <a:lnSpc>
+                          <a:spcPct val="107000"/>
+                        </a:lnSpc>
+                        <a:spcAft>
+                          <a:spcPts val="800"/>
+                        </a:spcAft>
+                      </a:pPr>
+                      <a:r>
+                        <a:rPr lang="pt-BR" sz="1400">
+                          <a:effectLst/>
+                        </a:rPr>
+                        <a:t> Amsterdã-Roterdã </a:t>
+                      </a:r>
+                      <a:endParaRPr lang="pt-BR" sz="1400">
+                        <a:effectLst/>
+                        <a:latin typeface="Calibri" panose="020F0502020204030204" pitchFamily="34" charset="0"/>
+                        <a:ea typeface="Calibri" panose="020F0502020204030204" pitchFamily="34" charset="0"/>
+                        <a:cs typeface="Times New Roman" panose="02020603050405020304" pitchFamily="18" charset="0"/>
+                      </a:endParaRPr>
+                    </a:p>
+                  </a:txBody>
+                  <a:tcPr marL="86399" marR="86399" marT="0" marB="0"/>
+                </a:tc>
+                <a:tc>
+                  <a:txBody>
+                    <a:bodyPr/>
+                    <a:lstStyle/>
+                    <a:p>
+                      <a:pPr>
+                        <a:lnSpc>
+                          <a:spcPct val="107000"/>
+                        </a:lnSpc>
+                        <a:spcAft>
+                          <a:spcPts val="800"/>
+                        </a:spcAft>
+                      </a:pPr>
+                      <a:r>
+                        <a:rPr lang="pt-BR" sz="1400">
+                          <a:effectLst/>
+                        </a:rPr>
+                        <a:t>NL</a:t>
+                      </a:r>
+                      <a:endParaRPr lang="pt-BR" sz="1400">
+                        <a:effectLst/>
+                        <a:latin typeface="Calibri" panose="020F0502020204030204" pitchFamily="34" charset="0"/>
+                        <a:ea typeface="Calibri" panose="020F0502020204030204" pitchFamily="34" charset="0"/>
+                        <a:cs typeface="Times New Roman" panose="02020603050405020304" pitchFamily="18" charset="0"/>
+                      </a:endParaRPr>
+                    </a:p>
+                  </a:txBody>
+                  <a:tcPr marL="86399" marR="86399" marT="0" marB="0"/>
+                </a:tc>
+                <a:extLst>
+                  <a:ext uri="{0D108BD9-81ED-4DB2-BD59-A6C34878D82A}">
+                    <a16:rowId xmlns:a16="http://schemas.microsoft.com/office/drawing/2014/main" val="2750308513"/>
+                  </a:ext>
+                </a:extLst>
+              </a:tr>
+              <a:tr h="220286">
+                <a:tc>
+                  <a:txBody>
+                    <a:bodyPr/>
+                    <a:lstStyle/>
+                    <a:p>
+                      <a:pPr>
+                        <a:lnSpc>
+                          <a:spcPct val="107000"/>
+                        </a:lnSpc>
+                        <a:spcAft>
+                          <a:spcPts val="800"/>
+                        </a:spcAft>
+                      </a:pPr>
+                      <a:r>
+                        <a:rPr lang="pt-BR" sz="1400">
+                          <a:effectLst/>
+                        </a:rPr>
+                        <a:t>20</a:t>
+                      </a:r>
+                      <a:endParaRPr lang="pt-BR" sz="1400">
+                        <a:effectLst/>
+                        <a:latin typeface="Calibri" panose="020F0502020204030204" pitchFamily="34" charset="0"/>
+                        <a:ea typeface="Calibri" panose="020F0502020204030204" pitchFamily="34" charset="0"/>
+                        <a:cs typeface="Times New Roman" panose="02020603050405020304" pitchFamily="18" charset="0"/>
+                      </a:endParaRPr>
+                    </a:p>
+                  </a:txBody>
+                  <a:tcPr marL="86399" marR="86399" marT="0" marB="0"/>
+                </a:tc>
+                <a:tc>
+                  <a:txBody>
+                    <a:bodyPr/>
+                    <a:lstStyle/>
+                    <a:p>
+                      <a:pPr>
+                        <a:lnSpc>
+                          <a:spcPct val="107000"/>
+                        </a:lnSpc>
+                        <a:spcAft>
+                          <a:spcPts val="800"/>
+                        </a:spcAft>
+                      </a:pPr>
+                      <a:r>
+                        <a:rPr lang="pt-BR" sz="1400">
+                          <a:effectLst/>
+                        </a:rPr>
+                        <a:t> Colônia </a:t>
+                      </a:r>
+                      <a:endParaRPr lang="pt-BR" sz="1400">
+                        <a:effectLst/>
+                        <a:latin typeface="Calibri" panose="020F0502020204030204" pitchFamily="34" charset="0"/>
+                        <a:ea typeface="Calibri" panose="020F0502020204030204" pitchFamily="34" charset="0"/>
+                        <a:cs typeface="Times New Roman" panose="02020603050405020304" pitchFamily="18" charset="0"/>
+                      </a:endParaRPr>
+                    </a:p>
+                  </a:txBody>
+                  <a:tcPr marL="86399" marR="86399" marT="0" marB="0"/>
+                </a:tc>
+                <a:tc>
+                  <a:txBody>
+                    <a:bodyPr/>
+                    <a:lstStyle/>
+                    <a:p>
+                      <a:pPr>
+                        <a:lnSpc>
+                          <a:spcPct val="107000"/>
+                        </a:lnSpc>
+                        <a:spcAft>
+                          <a:spcPts val="800"/>
+                        </a:spcAft>
+                      </a:pPr>
+                      <a:r>
+                        <a:rPr lang="pt-BR" sz="1400">
+                          <a:effectLst/>
+                        </a:rPr>
+                        <a:t>DE</a:t>
+                      </a:r>
+                      <a:endParaRPr lang="pt-BR" sz="1400">
+                        <a:effectLst/>
+                        <a:latin typeface="Calibri" panose="020F0502020204030204" pitchFamily="34" charset="0"/>
+                        <a:ea typeface="Calibri" panose="020F0502020204030204" pitchFamily="34" charset="0"/>
+                        <a:cs typeface="Times New Roman" panose="02020603050405020304" pitchFamily="18" charset="0"/>
+                      </a:endParaRPr>
+                    </a:p>
+                  </a:txBody>
+                  <a:tcPr marL="86399" marR="86399" marT="0" marB="0"/>
+                </a:tc>
+                <a:extLst>
+                  <a:ext uri="{0D108BD9-81ED-4DB2-BD59-A6C34878D82A}">
+                    <a16:rowId xmlns:a16="http://schemas.microsoft.com/office/drawing/2014/main" val="3868053545"/>
+                  </a:ext>
+                </a:extLst>
+              </a:tr>
+              <a:tr h="220286">
+                <a:tc>
+                  <a:txBody>
+                    <a:bodyPr/>
+                    <a:lstStyle/>
+                    <a:p>
+                      <a:pPr>
+                        <a:lnSpc>
+                          <a:spcPct val="107000"/>
+                        </a:lnSpc>
+                        <a:spcAft>
+                          <a:spcPts val="800"/>
+                        </a:spcAft>
+                      </a:pPr>
+                      <a:r>
+                        <a:rPr lang="pt-BR" sz="1400">
+                          <a:effectLst/>
+                        </a:rPr>
+                        <a:t>23</a:t>
+                      </a:r>
+                      <a:endParaRPr lang="pt-BR" sz="1400">
+                        <a:effectLst/>
+                        <a:latin typeface="Calibri" panose="020F0502020204030204" pitchFamily="34" charset="0"/>
+                        <a:ea typeface="Calibri" panose="020F0502020204030204" pitchFamily="34" charset="0"/>
+                        <a:cs typeface="Times New Roman" panose="02020603050405020304" pitchFamily="18" charset="0"/>
+                      </a:endParaRPr>
+                    </a:p>
+                  </a:txBody>
+                  <a:tcPr marL="86399" marR="86399" marT="0" marB="0"/>
+                </a:tc>
+                <a:tc>
+                  <a:txBody>
+                    <a:bodyPr/>
+                    <a:lstStyle/>
+                    <a:p>
+                      <a:pPr>
+                        <a:lnSpc>
+                          <a:spcPct val="107000"/>
+                        </a:lnSpc>
+                        <a:spcAft>
+                          <a:spcPts val="800"/>
+                        </a:spcAft>
+                      </a:pPr>
+                      <a:r>
+                        <a:rPr lang="pt-BR" sz="1400">
+                          <a:effectLst/>
+                        </a:rPr>
+                        <a:t> Tel Aviv-Jerusalém </a:t>
+                      </a:r>
+                      <a:endParaRPr lang="pt-BR" sz="1400">
+                        <a:effectLst/>
+                        <a:latin typeface="Calibri" panose="020F0502020204030204" pitchFamily="34" charset="0"/>
+                        <a:ea typeface="Calibri" panose="020F0502020204030204" pitchFamily="34" charset="0"/>
+                        <a:cs typeface="Times New Roman" panose="02020603050405020304" pitchFamily="18" charset="0"/>
+                      </a:endParaRPr>
+                    </a:p>
+                  </a:txBody>
+                  <a:tcPr marL="86399" marR="86399" marT="0" marB="0"/>
+                </a:tc>
+                <a:tc>
+                  <a:txBody>
+                    <a:bodyPr/>
+                    <a:lstStyle/>
+                    <a:p>
+                      <a:pPr>
+                        <a:lnSpc>
+                          <a:spcPct val="107000"/>
+                        </a:lnSpc>
+                        <a:spcAft>
+                          <a:spcPts val="800"/>
+                        </a:spcAft>
+                      </a:pPr>
+                      <a:r>
+                        <a:rPr lang="pt-BR" sz="1400">
+                          <a:effectLst/>
+                        </a:rPr>
+                        <a:t>IL</a:t>
+                      </a:r>
+                      <a:endParaRPr lang="pt-BR" sz="1400">
+                        <a:effectLst/>
+                        <a:latin typeface="Calibri" panose="020F0502020204030204" pitchFamily="34" charset="0"/>
+                        <a:ea typeface="Calibri" panose="020F0502020204030204" pitchFamily="34" charset="0"/>
+                        <a:cs typeface="Times New Roman" panose="02020603050405020304" pitchFamily="18" charset="0"/>
+                      </a:endParaRPr>
+                    </a:p>
+                  </a:txBody>
+                  <a:tcPr marL="86399" marR="86399" marT="0" marB="0"/>
+                </a:tc>
+                <a:extLst>
+                  <a:ext uri="{0D108BD9-81ED-4DB2-BD59-A6C34878D82A}">
+                    <a16:rowId xmlns:a16="http://schemas.microsoft.com/office/drawing/2014/main" val="497968183"/>
+                  </a:ext>
+                </a:extLst>
+              </a:tr>
+              <a:tr h="220286">
+                <a:tc>
+                  <a:txBody>
+                    <a:bodyPr/>
+                    <a:lstStyle/>
+                    <a:p>
+                      <a:pPr>
+                        <a:lnSpc>
+                          <a:spcPct val="107000"/>
+                        </a:lnSpc>
+                        <a:spcAft>
+                          <a:spcPts val="800"/>
+                        </a:spcAft>
+                      </a:pPr>
+                      <a:r>
+                        <a:rPr lang="pt-BR" sz="1400">
+                          <a:effectLst/>
+                        </a:rPr>
+                        <a:t>28</a:t>
+                      </a:r>
+                      <a:endParaRPr lang="pt-BR" sz="1400">
+                        <a:effectLst/>
+                        <a:latin typeface="Calibri" panose="020F0502020204030204" pitchFamily="34" charset="0"/>
+                        <a:ea typeface="Calibri" panose="020F0502020204030204" pitchFamily="34" charset="0"/>
+                        <a:cs typeface="Times New Roman" panose="02020603050405020304" pitchFamily="18" charset="0"/>
+                      </a:endParaRPr>
+                    </a:p>
+                  </a:txBody>
+                  <a:tcPr marL="86399" marR="86399" marT="0" marB="0"/>
+                </a:tc>
+                <a:tc>
+                  <a:txBody>
+                    <a:bodyPr/>
+                    <a:lstStyle/>
+                    <a:p>
+                      <a:pPr>
+                        <a:lnSpc>
+                          <a:spcPct val="107000"/>
+                        </a:lnSpc>
+                        <a:spcAft>
+                          <a:spcPts val="800"/>
+                        </a:spcAft>
+                      </a:pPr>
+                      <a:r>
+                        <a:rPr lang="pt-BR" sz="1400">
+                          <a:effectLst/>
+                        </a:rPr>
+                        <a:t> Cingapura </a:t>
+                      </a:r>
+                      <a:endParaRPr lang="pt-BR" sz="1400">
+                        <a:effectLst/>
+                        <a:latin typeface="Calibri" panose="020F0502020204030204" pitchFamily="34" charset="0"/>
+                        <a:ea typeface="Calibri" panose="020F0502020204030204" pitchFamily="34" charset="0"/>
+                        <a:cs typeface="Times New Roman" panose="02020603050405020304" pitchFamily="18" charset="0"/>
+                      </a:endParaRPr>
+                    </a:p>
+                  </a:txBody>
+                  <a:tcPr marL="86399" marR="86399" marT="0" marB="0"/>
+                </a:tc>
+                <a:tc>
+                  <a:txBody>
+                    <a:bodyPr/>
+                    <a:lstStyle/>
+                    <a:p>
+                      <a:pPr>
+                        <a:lnSpc>
+                          <a:spcPct val="107000"/>
+                        </a:lnSpc>
+                        <a:spcAft>
+                          <a:spcPts val="800"/>
+                        </a:spcAft>
+                      </a:pPr>
+                      <a:r>
+                        <a:rPr lang="pt-BR" sz="1400">
+                          <a:effectLst/>
+                        </a:rPr>
+                        <a:t>SG</a:t>
+                      </a:r>
+                      <a:endParaRPr lang="pt-BR" sz="1400">
+                        <a:effectLst/>
+                        <a:latin typeface="Calibri" panose="020F0502020204030204" pitchFamily="34" charset="0"/>
+                        <a:ea typeface="Calibri" panose="020F0502020204030204" pitchFamily="34" charset="0"/>
+                        <a:cs typeface="Times New Roman" panose="02020603050405020304" pitchFamily="18" charset="0"/>
+                      </a:endParaRPr>
+                    </a:p>
+                  </a:txBody>
+                  <a:tcPr marL="86399" marR="86399" marT="0" marB="0"/>
+                </a:tc>
+                <a:extLst>
+                  <a:ext uri="{0D108BD9-81ED-4DB2-BD59-A6C34878D82A}">
+                    <a16:rowId xmlns:a16="http://schemas.microsoft.com/office/drawing/2014/main" val="183043304"/>
+                  </a:ext>
+                </a:extLst>
+              </a:tr>
+              <a:tr h="220286">
+                <a:tc>
+                  <a:txBody>
+                    <a:bodyPr/>
+                    <a:lstStyle/>
+                    <a:p>
+                      <a:pPr>
+                        <a:lnSpc>
+                          <a:spcPct val="107000"/>
+                        </a:lnSpc>
+                        <a:spcAft>
+                          <a:spcPts val="800"/>
+                        </a:spcAft>
+                      </a:pPr>
+                      <a:r>
+                        <a:rPr lang="pt-BR" sz="1400">
+                          <a:effectLst/>
+                        </a:rPr>
+                        <a:t>31</a:t>
+                      </a:r>
+                      <a:endParaRPr lang="pt-BR" sz="1400">
+                        <a:effectLst/>
+                        <a:latin typeface="Calibri" panose="020F0502020204030204" pitchFamily="34" charset="0"/>
+                        <a:ea typeface="Calibri" panose="020F0502020204030204" pitchFamily="34" charset="0"/>
+                        <a:cs typeface="Times New Roman" panose="02020603050405020304" pitchFamily="18" charset="0"/>
+                      </a:endParaRPr>
+                    </a:p>
+                  </a:txBody>
+                  <a:tcPr marL="86399" marR="86399" marT="0" marB="0"/>
+                </a:tc>
+                <a:tc>
+                  <a:txBody>
+                    <a:bodyPr/>
+                    <a:lstStyle/>
+                    <a:p>
+                      <a:pPr>
+                        <a:lnSpc>
+                          <a:spcPct val="107000"/>
+                        </a:lnSpc>
+                        <a:spcAft>
+                          <a:spcPts val="800"/>
+                        </a:spcAft>
+                      </a:pPr>
+                      <a:r>
+                        <a:rPr lang="pt-BR" sz="1400">
+                          <a:effectLst/>
+                        </a:rPr>
+                        <a:t> Eindhoven </a:t>
+                      </a:r>
+                      <a:endParaRPr lang="pt-BR" sz="1400">
+                        <a:effectLst/>
+                        <a:latin typeface="Calibri" panose="020F0502020204030204" pitchFamily="34" charset="0"/>
+                        <a:ea typeface="Calibri" panose="020F0502020204030204" pitchFamily="34" charset="0"/>
+                        <a:cs typeface="Times New Roman" panose="02020603050405020304" pitchFamily="18" charset="0"/>
+                      </a:endParaRPr>
+                    </a:p>
+                  </a:txBody>
+                  <a:tcPr marL="86399" marR="86399" marT="0" marB="0"/>
+                </a:tc>
+                <a:tc>
+                  <a:txBody>
+                    <a:bodyPr/>
+                    <a:lstStyle/>
+                    <a:p>
+                      <a:pPr>
+                        <a:lnSpc>
+                          <a:spcPct val="107000"/>
+                        </a:lnSpc>
+                        <a:spcAft>
+                          <a:spcPts val="800"/>
+                        </a:spcAft>
+                      </a:pPr>
+                      <a:r>
+                        <a:rPr lang="pt-BR" sz="1400">
+                          <a:effectLst/>
+                        </a:rPr>
+                        <a:t>BE/NL</a:t>
+                      </a:r>
+                      <a:endParaRPr lang="pt-BR" sz="1400">
+                        <a:effectLst/>
+                        <a:latin typeface="Calibri" panose="020F0502020204030204" pitchFamily="34" charset="0"/>
+                        <a:ea typeface="Calibri" panose="020F0502020204030204" pitchFamily="34" charset="0"/>
+                        <a:cs typeface="Times New Roman" panose="02020603050405020304" pitchFamily="18" charset="0"/>
+                      </a:endParaRPr>
+                    </a:p>
+                  </a:txBody>
+                  <a:tcPr marL="86399" marR="86399" marT="0" marB="0"/>
+                </a:tc>
+                <a:extLst>
+                  <a:ext uri="{0D108BD9-81ED-4DB2-BD59-A6C34878D82A}">
+                    <a16:rowId xmlns:a16="http://schemas.microsoft.com/office/drawing/2014/main" val="1936036851"/>
+                  </a:ext>
+                </a:extLst>
+              </a:tr>
+              <a:tr h="220286">
+                <a:tc>
+                  <a:txBody>
+                    <a:bodyPr/>
+                    <a:lstStyle/>
+                    <a:p>
+                      <a:pPr>
+                        <a:lnSpc>
+                          <a:spcPct val="107000"/>
+                        </a:lnSpc>
+                        <a:spcAft>
+                          <a:spcPts val="800"/>
+                        </a:spcAft>
+                      </a:pPr>
+                      <a:r>
+                        <a:rPr lang="pt-BR" sz="1400">
+                          <a:effectLst/>
+                        </a:rPr>
+                        <a:t>32</a:t>
+                      </a:r>
+                      <a:endParaRPr lang="pt-BR" sz="1400">
+                        <a:effectLst/>
+                        <a:latin typeface="Calibri" panose="020F0502020204030204" pitchFamily="34" charset="0"/>
+                        <a:ea typeface="Calibri" panose="020F0502020204030204" pitchFamily="34" charset="0"/>
+                        <a:cs typeface="Times New Roman" panose="02020603050405020304" pitchFamily="18" charset="0"/>
+                      </a:endParaRPr>
+                    </a:p>
+                  </a:txBody>
+                  <a:tcPr marL="86399" marR="86399" marT="0" marB="0"/>
+                </a:tc>
+                <a:tc>
+                  <a:txBody>
+                    <a:bodyPr/>
+                    <a:lstStyle/>
+                    <a:p>
+                      <a:pPr>
+                        <a:lnSpc>
+                          <a:spcPct val="107000"/>
+                        </a:lnSpc>
+                        <a:spcAft>
+                          <a:spcPts val="800"/>
+                        </a:spcAft>
+                      </a:pPr>
+                      <a:r>
+                        <a:rPr lang="pt-BR" sz="1400">
+                          <a:effectLst/>
+                        </a:rPr>
+                        <a:t> Estocolmo </a:t>
+                      </a:r>
+                      <a:endParaRPr lang="pt-BR" sz="1400">
+                        <a:effectLst/>
+                        <a:latin typeface="Calibri" panose="020F0502020204030204" pitchFamily="34" charset="0"/>
+                        <a:ea typeface="Calibri" panose="020F0502020204030204" pitchFamily="34" charset="0"/>
+                        <a:cs typeface="Times New Roman" panose="02020603050405020304" pitchFamily="18" charset="0"/>
+                      </a:endParaRPr>
+                    </a:p>
+                  </a:txBody>
+                  <a:tcPr marL="86399" marR="86399" marT="0" marB="0"/>
+                </a:tc>
+                <a:tc>
+                  <a:txBody>
+                    <a:bodyPr/>
+                    <a:lstStyle/>
+                    <a:p>
+                      <a:pPr>
+                        <a:lnSpc>
+                          <a:spcPct val="107000"/>
+                        </a:lnSpc>
+                        <a:spcAft>
+                          <a:spcPts val="800"/>
+                        </a:spcAft>
+                      </a:pPr>
+                      <a:r>
+                        <a:rPr lang="pt-BR" sz="1400">
+                          <a:effectLst/>
+                        </a:rPr>
+                        <a:t>SE</a:t>
+                      </a:r>
+                      <a:endParaRPr lang="pt-BR" sz="1400">
+                        <a:effectLst/>
+                        <a:latin typeface="Calibri" panose="020F0502020204030204" pitchFamily="34" charset="0"/>
+                        <a:ea typeface="Calibri" panose="020F0502020204030204" pitchFamily="34" charset="0"/>
+                        <a:cs typeface="Times New Roman" panose="02020603050405020304" pitchFamily="18" charset="0"/>
+                      </a:endParaRPr>
+                    </a:p>
+                  </a:txBody>
+                  <a:tcPr marL="86399" marR="86399" marT="0" marB="0"/>
+                </a:tc>
+                <a:extLst>
+                  <a:ext uri="{0D108BD9-81ED-4DB2-BD59-A6C34878D82A}">
+                    <a16:rowId xmlns:a16="http://schemas.microsoft.com/office/drawing/2014/main" val="379911949"/>
+                  </a:ext>
+                </a:extLst>
+              </a:tr>
+              <a:tr h="220286">
+                <a:tc>
+                  <a:txBody>
+                    <a:bodyPr/>
+                    <a:lstStyle/>
+                    <a:p>
+                      <a:pPr>
+                        <a:lnSpc>
+                          <a:spcPct val="107000"/>
+                        </a:lnSpc>
+                        <a:spcAft>
+                          <a:spcPts val="800"/>
+                        </a:spcAft>
+                      </a:pPr>
+                      <a:r>
+                        <a:rPr lang="pt-BR" sz="1400">
+                          <a:effectLst/>
+                        </a:rPr>
+                        <a:t>33</a:t>
+                      </a:r>
+                      <a:endParaRPr lang="pt-BR" sz="1400">
+                        <a:effectLst/>
+                        <a:latin typeface="Calibri" panose="020F0502020204030204" pitchFamily="34" charset="0"/>
+                        <a:ea typeface="Calibri" panose="020F0502020204030204" pitchFamily="34" charset="0"/>
+                        <a:cs typeface="Times New Roman" panose="02020603050405020304" pitchFamily="18" charset="0"/>
+                      </a:endParaRPr>
+                    </a:p>
+                  </a:txBody>
+                  <a:tcPr marL="86399" marR="86399" marT="0" marB="0"/>
+                </a:tc>
+                <a:tc>
+                  <a:txBody>
+                    <a:bodyPr/>
+                    <a:lstStyle/>
+                    <a:p>
+                      <a:pPr>
+                        <a:lnSpc>
+                          <a:spcPct val="107000"/>
+                        </a:lnSpc>
+                        <a:spcAft>
+                          <a:spcPts val="800"/>
+                        </a:spcAft>
+                      </a:pPr>
+                      <a:r>
+                        <a:rPr lang="pt-BR" sz="1400">
+                          <a:effectLst/>
+                        </a:rPr>
+                        <a:t> Moscou </a:t>
+                      </a:r>
+                      <a:endParaRPr lang="pt-BR" sz="1400">
+                        <a:effectLst/>
+                        <a:latin typeface="Calibri" panose="020F0502020204030204" pitchFamily="34" charset="0"/>
+                        <a:ea typeface="Calibri" panose="020F0502020204030204" pitchFamily="34" charset="0"/>
+                        <a:cs typeface="Times New Roman" panose="02020603050405020304" pitchFamily="18" charset="0"/>
+                      </a:endParaRPr>
+                    </a:p>
+                  </a:txBody>
+                  <a:tcPr marL="86399" marR="86399" marT="0" marB="0"/>
+                </a:tc>
+                <a:tc>
+                  <a:txBody>
+                    <a:bodyPr/>
+                    <a:lstStyle/>
+                    <a:p>
+                      <a:pPr>
+                        <a:lnSpc>
+                          <a:spcPct val="107000"/>
+                        </a:lnSpc>
+                        <a:spcAft>
+                          <a:spcPts val="800"/>
+                        </a:spcAft>
+                      </a:pPr>
+                      <a:r>
+                        <a:rPr lang="pt-BR" sz="1400">
+                          <a:effectLst/>
+                        </a:rPr>
+                        <a:t>RU</a:t>
+                      </a:r>
+                      <a:endParaRPr lang="pt-BR" sz="1400">
+                        <a:effectLst/>
+                        <a:latin typeface="Calibri" panose="020F0502020204030204" pitchFamily="34" charset="0"/>
+                        <a:ea typeface="Calibri" panose="020F0502020204030204" pitchFamily="34" charset="0"/>
+                        <a:cs typeface="Times New Roman" panose="02020603050405020304" pitchFamily="18" charset="0"/>
+                      </a:endParaRPr>
+                    </a:p>
+                  </a:txBody>
+                  <a:tcPr marL="86399" marR="86399" marT="0" marB="0"/>
+                </a:tc>
+                <a:extLst>
+                  <a:ext uri="{0D108BD9-81ED-4DB2-BD59-A6C34878D82A}">
+                    <a16:rowId xmlns:a16="http://schemas.microsoft.com/office/drawing/2014/main" val="1966483599"/>
+                  </a:ext>
+                </a:extLst>
+              </a:tr>
+              <a:tr h="220286">
+                <a:tc>
+                  <a:txBody>
+                    <a:bodyPr/>
+                    <a:lstStyle/>
+                    <a:p>
+                      <a:pPr>
+                        <a:lnSpc>
+                          <a:spcPct val="107000"/>
+                        </a:lnSpc>
+                        <a:spcAft>
+                          <a:spcPts val="800"/>
+                        </a:spcAft>
+                      </a:pPr>
+                      <a:r>
+                        <a:rPr lang="pt-BR" sz="1400">
+                          <a:effectLst/>
+                        </a:rPr>
+                        <a:t>35</a:t>
+                      </a:r>
+                      <a:endParaRPr lang="pt-BR" sz="1400">
+                        <a:effectLst/>
+                        <a:latin typeface="Calibri" panose="020F0502020204030204" pitchFamily="34" charset="0"/>
+                        <a:ea typeface="Calibri" panose="020F0502020204030204" pitchFamily="34" charset="0"/>
+                        <a:cs typeface="Times New Roman" panose="02020603050405020304" pitchFamily="18" charset="0"/>
+                      </a:endParaRPr>
+                    </a:p>
+                  </a:txBody>
+                  <a:tcPr marL="86399" marR="86399" marT="0" marB="0"/>
+                </a:tc>
+                <a:tc>
+                  <a:txBody>
+                    <a:bodyPr/>
+                    <a:lstStyle/>
+                    <a:p>
+                      <a:pPr>
+                        <a:lnSpc>
+                          <a:spcPct val="107000"/>
+                        </a:lnSpc>
+                        <a:spcAft>
+                          <a:spcPts val="800"/>
+                        </a:spcAft>
+                      </a:pPr>
+                      <a:r>
+                        <a:rPr lang="pt-BR" sz="1400">
+                          <a:effectLst/>
+                        </a:rPr>
+                        <a:t> Melbourne </a:t>
+                      </a:r>
+                      <a:endParaRPr lang="pt-BR" sz="1400">
+                        <a:effectLst/>
+                        <a:latin typeface="Calibri" panose="020F0502020204030204" pitchFamily="34" charset="0"/>
+                        <a:ea typeface="Calibri" panose="020F0502020204030204" pitchFamily="34" charset="0"/>
+                        <a:cs typeface="Times New Roman" panose="02020603050405020304" pitchFamily="18" charset="0"/>
+                      </a:endParaRPr>
+                    </a:p>
+                  </a:txBody>
+                  <a:tcPr marL="86399" marR="86399" marT="0" marB="0"/>
+                </a:tc>
+                <a:tc>
+                  <a:txBody>
+                    <a:bodyPr/>
+                    <a:lstStyle/>
+                    <a:p>
+                      <a:pPr>
+                        <a:lnSpc>
+                          <a:spcPct val="107000"/>
+                        </a:lnSpc>
+                        <a:spcAft>
+                          <a:spcPts val="800"/>
+                        </a:spcAft>
+                      </a:pPr>
+                      <a:r>
+                        <a:rPr lang="pt-BR" sz="1400">
+                          <a:effectLst/>
+                        </a:rPr>
+                        <a:t>AU</a:t>
+                      </a:r>
+                      <a:endParaRPr lang="pt-BR" sz="1400">
+                        <a:effectLst/>
+                        <a:latin typeface="Calibri" panose="020F0502020204030204" pitchFamily="34" charset="0"/>
+                        <a:ea typeface="Calibri" panose="020F0502020204030204" pitchFamily="34" charset="0"/>
+                        <a:cs typeface="Times New Roman" panose="02020603050405020304" pitchFamily="18" charset="0"/>
+                      </a:endParaRPr>
+                    </a:p>
+                  </a:txBody>
+                  <a:tcPr marL="86399" marR="86399" marT="0" marB="0"/>
+                </a:tc>
+                <a:extLst>
+                  <a:ext uri="{0D108BD9-81ED-4DB2-BD59-A6C34878D82A}">
+                    <a16:rowId xmlns:a16="http://schemas.microsoft.com/office/drawing/2014/main" val="1009078190"/>
+                  </a:ext>
+                </a:extLst>
+              </a:tr>
+              <a:tr h="220286">
+                <a:tc>
+                  <a:txBody>
+                    <a:bodyPr/>
+                    <a:lstStyle/>
+                    <a:p>
+                      <a:pPr>
+                        <a:lnSpc>
+                          <a:spcPct val="107000"/>
+                        </a:lnSpc>
+                        <a:spcAft>
+                          <a:spcPts val="800"/>
+                        </a:spcAft>
+                      </a:pPr>
+                      <a:r>
+                        <a:rPr lang="pt-BR" sz="1400">
+                          <a:effectLst/>
+                        </a:rPr>
+                        <a:t>39</a:t>
+                      </a:r>
+                      <a:endParaRPr lang="pt-BR" sz="1400">
+                        <a:effectLst/>
+                        <a:latin typeface="Calibri" panose="020F0502020204030204" pitchFamily="34" charset="0"/>
+                        <a:ea typeface="Calibri" panose="020F0502020204030204" pitchFamily="34" charset="0"/>
+                        <a:cs typeface="Times New Roman" panose="02020603050405020304" pitchFamily="18" charset="0"/>
+                      </a:endParaRPr>
+                    </a:p>
+                  </a:txBody>
+                  <a:tcPr marL="86399" marR="86399" marT="0" marB="0"/>
+                </a:tc>
+                <a:tc>
+                  <a:txBody>
+                    <a:bodyPr/>
+                    <a:lstStyle/>
+                    <a:p>
+                      <a:pPr>
+                        <a:lnSpc>
+                          <a:spcPct val="107000"/>
+                        </a:lnSpc>
+                        <a:spcAft>
+                          <a:spcPts val="800"/>
+                        </a:spcAft>
+                      </a:pPr>
+                      <a:r>
+                        <a:rPr lang="pt-BR" sz="1400">
+                          <a:effectLst/>
+                        </a:rPr>
+                        <a:t> Toronto </a:t>
+                      </a:r>
+                      <a:endParaRPr lang="pt-BR" sz="1400">
+                        <a:effectLst/>
+                        <a:latin typeface="Calibri" panose="020F0502020204030204" pitchFamily="34" charset="0"/>
+                        <a:ea typeface="Calibri" panose="020F0502020204030204" pitchFamily="34" charset="0"/>
+                        <a:cs typeface="Times New Roman" panose="02020603050405020304" pitchFamily="18" charset="0"/>
+                      </a:endParaRPr>
+                    </a:p>
+                  </a:txBody>
+                  <a:tcPr marL="86399" marR="86399" marT="0" marB="0"/>
+                </a:tc>
+                <a:tc>
+                  <a:txBody>
+                    <a:bodyPr/>
+                    <a:lstStyle/>
+                    <a:p>
+                      <a:pPr>
+                        <a:lnSpc>
+                          <a:spcPct val="107000"/>
+                        </a:lnSpc>
+                        <a:spcAft>
+                          <a:spcPts val="800"/>
+                        </a:spcAft>
+                      </a:pPr>
+                      <a:r>
+                        <a:rPr lang="pt-BR" sz="1400">
+                          <a:effectLst/>
+                        </a:rPr>
+                        <a:t>ON CA</a:t>
+                      </a:r>
+                      <a:endParaRPr lang="pt-BR" sz="1400">
+                        <a:effectLst/>
+                        <a:latin typeface="Calibri" panose="020F0502020204030204" pitchFamily="34" charset="0"/>
+                        <a:ea typeface="Calibri" panose="020F0502020204030204" pitchFamily="34" charset="0"/>
+                        <a:cs typeface="Times New Roman" panose="02020603050405020304" pitchFamily="18" charset="0"/>
+                      </a:endParaRPr>
+                    </a:p>
+                  </a:txBody>
+                  <a:tcPr marL="86399" marR="86399" marT="0" marB="0"/>
+                </a:tc>
+                <a:extLst>
+                  <a:ext uri="{0D108BD9-81ED-4DB2-BD59-A6C34878D82A}">
+                    <a16:rowId xmlns:a16="http://schemas.microsoft.com/office/drawing/2014/main" val="1770842998"/>
+                  </a:ext>
+                </a:extLst>
+              </a:tr>
+              <a:tr h="220286">
+                <a:tc>
+                  <a:txBody>
+                    <a:bodyPr/>
+                    <a:lstStyle/>
+                    <a:p>
+                      <a:pPr>
+                        <a:lnSpc>
+                          <a:spcPct val="107000"/>
+                        </a:lnSpc>
+                        <a:spcAft>
+                          <a:spcPts val="800"/>
+                        </a:spcAft>
+                      </a:pPr>
+                      <a:r>
+                        <a:rPr lang="pt-BR" sz="1400">
+                          <a:effectLst/>
+                        </a:rPr>
+                        <a:t>40</a:t>
+                      </a:r>
+                      <a:endParaRPr lang="pt-BR" sz="1400">
+                        <a:effectLst/>
+                        <a:latin typeface="Calibri" panose="020F0502020204030204" pitchFamily="34" charset="0"/>
+                        <a:ea typeface="Calibri" panose="020F0502020204030204" pitchFamily="34" charset="0"/>
+                        <a:cs typeface="Times New Roman" panose="02020603050405020304" pitchFamily="18" charset="0"/>
+                      </a:endParaRPr>
+                    </a:p>
+                  </a:txBody>
+                  <a:tcPr marL="86399" marR="86399" marT="0" marB="0"/>
+                </a:tc>
+                <a:tc>
+                  <a:txBody>
+                    <a:bodyPr/>
+                    <a:lstStyle/>
+                    <a:p>
+                      <a:pPr>
+                        <a:lnSpc>
+                          <a:spcPct val="107000"/>
+                        </a:lnSpc>
+                        <a:spcAft>
+                          <a:spcPts val="800"/>
+                        </a:spcAft>
+                      </a:pPr>
+                      <a:r>
+                        <a:rPr lang="pt-BR" sz="1400">
+                          <a:effectLst/>
+                        </a:rPr>
+                        <a:t> Bruxelas </a:t>
+                      </a:r>
+                      <a:endParaRPr lang="pt-BR" sz="1400">
+                        <a:effectLst/>
+                        <a:latin typeface="Calibri" panose="020F0502020204030204" pitchFamily="34" charset="0"/>
+                        <a:ea typeface="Calibri" panose="020F0502020204030204" pitchFamily="34" charset="0"/>
+                        <a:cs typeface="Times New Roman" panose="02020603050405020304" pitchFamily="18" charset="0"/>
+                      </a:endParaRPr>
+                    </a:p>
+                  </a:txBody>
+                  <a:tcPr marL="86399" marR="86399" marT="0" marB="0"/>
+                </a:tc>
+                <a:tc>
+                  <a:txBody>
+                    <a:bodyPr/>
+                    <a:lstStyle/>
+                    <a:p>
+                      <a:pPr>
+                        <a:lnSpc>
+                          <a:spcPct val="107000"/>
+                        </a:lnSpc>
+                        <a:spcAft>
+                          <a:spcPts val="800"/>
+                        </a:spcAft>
+                      </a:pPr>
+                      <a:r>
+                        <a:rPr lang="pt-BR" sz="1400">
+                          <a:effectLst/>
+                        </a:rPr>
+                        <a:t>BE</a:t>
+                      </a:r>
+                      <a:endParaRPr lang="pt-BR" sz="1400">
+                        <a:effectLst/>
+                        <a:latin typeface="Calibri" panose="020F0502020204030204" pitchFamily="34" charset="0"/>
+                        <a:ea typeface="Calibri" panose="020F0502020204030204" pitchFamily="34" charset="0"/>
+                        <a:cs typeface="Times New Roman" panose="02020603050405020304" pitchFamily="18" charset="0"/>
+                      </a:endParaRPr>
+                    </a:p>
+                  </a:txBody>
+                  <a:tcPr marL="86399" marR="86399" marT="0" marB="0"/>
+                </a:tc>
+                <a:extLst>
+                  <a:ext uri="{0D108BD9-81ED-4DB2-BD59-A6C34878D82A}">
+                    <a16:rowId xmlns:a16="http://schemas.microsoft.com/office/drawing/2014/main" val="704744644"/>
+                  </a:ext>
+                </a:extLst>
+              </a:tr>
+              <a:tr h="220286">
+                <a:tc>
+                  <a:txBody>
+                    <a:bodyPr/>
+                    <a:lstStyle/>
+                    <a:p>
+                      <a:pPr>
+                        <a:lnSpc>
+                          <a:spcPct val="107000"/>
+                        </a:lnSpc>
+                        <a:spcAft>
+                          <a:spcPts val="800"/>
+                        </a:spcAft>
+                      </a:pPr>
+                      <a:r>
+                        <a:rPr lang="pt-BR" sz="1400">
+                          <a:effectLst/>
+                        </a:rPr>
+                        <a:t>42</a:t>
+                      </a:r>
+                      <a:endParaRPr lang="pt-BR" sz="1400">
+                        <a:effectLst/>
+                        <a:latin typeface="Calibri" panose="020F0502020204030204" pitchFamily="34" charset="0"/>
+                        <a:ea typeface="Calibri" panose="020F0502020204030204" pitchFamily="34" charset="0"/>
+                        <a:cs typeface="Times New Roman" panose="02020603050405020304" pitchFamily="18" charset="0"/>
+                      </a:endParaRPr>
+                    </a:p>
+                  </a:txBody>
+                  <a:tcPr marL="86399" marR="86399" marT="0" marB="0"/>
+                </a:tc>
+                <a:tc>
+                  <a:txBody>
+                    <a:bodyPr/>
+                    <a:lstStyle/>
+                    <a:p>
+                      <a:pPr>
+                        <a:lnSpc>
+                          <a:spcPct val="107000"/>
+                        </a:lnSpc>
+                        <a:spcAft>
+                          <a:spcPts val="800"/>
+                        </a:spcAft>
+                      </a:pPr>
+                      <a:r>
+                        <a:rPr lang="pt-BR" sz="1400">
+                          <a:effectLst/>
+                        </a:rPr>
+                        <a:t> Madri </a:t>
+                      </a:r>
+                      <a:endParaRPr lang="pt-BR" sz="1400">
+                        <a:effectLst/>
+                        <a:latin typeface="Calibri" panose="020F0502020204030204" pitchFamily="34" charset="0"/>
+                        <a:ea typeface="Calibri" panose="020F0502020204030204" pitchFamily="34" charset="0"/>
+                        <a:cs typeface="Times New Roman" panose="02020603050405020304" pitchFamily="18" charset="0"/>
+                      </a:endParaRPr>
+                    </a:p>
+                  </a:txBody>
+                  <a:tcPr marL="86399" marR="86399" marT="0" marB="0"/>
+                </a:tc>
+                <a:tc>
+                  <a:txBody>
+                    <a:bodyPr/>
+                    <a:lstStyle/>
+                    <a:p>
+                      <a:pPr>
+                        <a:lnSpc>
+                          <a:spcPct val="107000"/>
+                        </a:lnSpc>
+                        <a:spcAft>
+                          <a:spcPts val="800"/>
+                        </a:spcAft>
+                      </a:pPr>
+                      <a:r>
+                        <a:rPr lang="pt-BR" sz="1400">
+                          <a:effectLst/>
+                        </a:rPr>
+                        <a:t>ES</a:t>
+                      </a:r>
+                      <a:endParaRPr lang="pt-BR" sz="1400">
+                        <a:effectLst/>
+                        <a:latin typeface="Calibri" panose="020F0502020204030204" pitchFamily="34" charset="0"/>
+                        <a:ea typeface="Calibri" panose="020F0502020204030204" pitchFamily="34" charset="0"/>
+                        <a:cs typeface="Times New Roman" panose="02020603050405020304" pitchFamily="18" charset="0"/>
+                      </a:endParaRPr>
+                    </a:p>
+                  </a:txBody>
+                  <a:tcPr marL="86399" marR="86399" marT="0" marB="0"/>
+                </a:tc>
+                <a:extLst>
+                  <a:ext uri="{0D108BD9-81ED-4DB2-BD59-A6C34878D82A}">
+                    <a16:rowId xmlns:a16="http://schemas.microsoft.com/office/drawing/2014/main" val="802611642"/>
+                  </a:ext>
+                </a:extLst>
+              </a:tr>
+              <a:tr h="220286">
+                <a:tc>
+                  <a:txBody>
+                    <a:bodyPr/>
+                    <a:lstStyle/>
+                    <a:p>
+                      <a:pPr>
+                        <a:lnSpc>
+                          <a:spcPct val="107000"/>
+                        </a:lnSpc>
+                        <a:spcAft>
+                          <a:spcPts val="800"/>
+                        </a:spcAft>
+                      </a:pPr>
+                      <a:r>
+                        <a:rPr lang="pt-BR" sz="1400">
+                          <a:effectLst/>
+                        </a:rPr>
+                        <a:t>46</a:t>
+                      </a:r>
+                      <a:endParaRPr lang="pt-BR" sz="1400">
+                        <a:effectLst/>
+                        <a:latin typeface="Calibri" panose="020F0502020204030204" pitchFamily="34" charset="0"/>
+                        <a:ea typeface="Calibri" panose="020F0502020204030204" pitchFamily="34" charset="0"/>
+                        <a:cs typeface="Times New Roman" panose="02020603050405020304" pitchFamily="18" charset="0"/>
+                      </a:endParaRPr>
+                    </a:p>
+                  </a:txBody>
+                  <a:tcPr marL="86399" marR="86399" marT="0" marB="0"/>
+                </a:tc>
+                <a:tc>
+                  <a:txBody>
+                    <a:bodyPr/>
+                    <a:lstStyle/>
+                    <a:p>
+                      <a:pPr>
+                        <a:lnSpc>
+                          <a:spcPct val="107000"/>
+                        </a:lnSpc>
+                        <a:spcAft>
+                          <a:spcPts val="800"/>
+                        </a:spcAft>
+                      </a:pPr>
+                      <a:r>
+                        <a:rPr lang="pt-BR" sz="1400">
+                          <a:effectLst/>
+                        </a:rPr>
+                        <a:t> Teerã </a:t>
+                      </a:r>
+                      <a:endParaRPr lang="pt-BR" sz="1400">
+                        <a:effectLst/>
+                        <a:latin typeface="Calibri" panose="020F0502020204030204" pitchFamily="34" charset="0"/>
+                        <a:ea typeface="Calibri" panose="020F0502020204030204" pitchFamily="34" charset="0"/>
+                        <a:cs typeface="Times New Roman" panose="02020603050405020304" pitchFamily="18" charset="0"/>
+                      </a:endParaRPr>
+                    </a:p>
+                  </a:txBody>
+                  <a:tcPr marL="86399" marR="86399" marT="0" marB="0"/>
+                </a:tc>
+                <a:tc>
+                  <a:txBody>
+                    <a:bodyPr/>
+                    <a:lstStyle/>
+                    <a:p>
+                      <a:pPr>
+                        <a:lnSpc>
+                          <a:spcPct val="107000"/>
+                        </a:lnSpc>
+                        <a:spcAft>
+                          <a:spcPts val="800"/>
+                        </a:spcAft>
+                      </a:pPr>
+                      <a:r>
+                        <a:rPr lang="pt-BR" sz="1400">
+                          <a:effectLst/>
+                        </a:rPr>
+                        <a:t>IR</a:t>
+                      </a:r>
+                      <a:endParaRPr lang="pt-BR" sz="1400">
+                        <a:effectLst/>
+                        <a:latin typeface="Calibri" panose="020F0502020204030204" pitchFamily="34" charset="0"/>
+                        <a:ea typeface="Calibri" panose="020F0502020204030204" pitchFamily="34" charset="0"/>
+                        <a:cs typeface="Times New Roman" panose="02020603050405020304" pitchFamily="18" charset="0"/>
+                      </a:endParaRPr>
+                    </a:p>
+                  </a:txBody>
+                  <a:tcPr marL="86399" marR="86399" marT="0" marB="0"/>
+                </a:tc>
+                <a:extLst>
+                  <a:ext uri="{0D108BD9-81ED-4DB2-BD59-A6C34878D82A}">
+                    <a16:rowId xmlns:a16="http://schemas.microsoft.com/office/drawing/2014/main" val="3917792923"/>
+                  </a:ext>
+                </a:extLst>
+              </a:tr>
+              <a:tr h="220286">
+                <a:tc>
+                  <a:txBody>
+                    <a:bodyPr/>
+                    <a:lstStyle/>
+                    <a:p>
+                      <a:pPr>
+                        <a:lnSpc>
+                          <a:spcPct val="107000"/>
+                        </a:lnSpc>
+                        <a:spcAft>
+                          <a:spcPts val="800"/>
+                        </a:spcAft>
+                      </a:pPr>
+                      <a:r>
+                        <a:rPr lang="pt-BR" sz="1400">
+                          <a:effectLst/>
+                        </a:rPr>
+                        <a:t>48</a:t>
+                      </a:r>
+                      <a:endParaRPr lang="pt-BR" sz="1400">
+                        <a:effectLst/>
+                        <a:latin typeface="Calibri" panose="020F0502020204030204" pitchFamily="34" charset="0"/>
+                        <a:ea typeface="Calibri" panose="020F0502020204030204" pitchFamily="34" charset="0"/>
+                        <a:cs typeface="Times New Roman" panose="02020603050405020304" pitchFamily="18" charset="0"/>
+                      </a:endParaRPr>
+                    </a:p>
+                  </a:txBody>
+                  <a:tcPr marL="86399" marR="86399" marT="0" marB="0"/>
+                </a:tc>
+                <a:tc>
+                  <a:txBody>
+                    <a:bodyPr/>
+                    <a:lstStyle/>
+                    <a:p>
+                      <a:pPr>
+                        <a:lnSpc>
+                          <a:spcPct val="107000"/>
+                        </a:lnSpc>
+                        <a:spcAft>
+                          <a:spcPts val="800"/>
+                        </a:spcAft>
+                      </a:pPr>
+                      <a:r>
+                        <a:rPr lang="pt-BR" sz="1400">
+                          <a:effectLst/>
+                        </a:rPr>
+                        <a:t> Milão </a:t>
+                      </a:r>
+                      <a:endParaRPr lang="pt-BR" sz="1400">
+                        <a:effectLst/>
+                        <a:latin typeface="Calibri" panose="020F0502020204030204" pitchFamily="34" charset="0"/>
+                        <a:ea typeface="Calibri" panose="020F0502020204030204" pitchFamily="34" charset="0"/>
+                        <a:cs typeface="Times New Roman" panose="02020603050405020304" pitchFamily="18" charset="0"/>
+                      </a:endParaRPr>
+                    </a:p>
+                  </a:txBody>
+                  <a:tcPr marL="86399" marR="86399" marT="0" marB="0"/>
+                </a:tc>
+                <a:tc>
+                  <a:txBody>
+                    <a:bodyPr/>
+                    <a:lstStyle/>
+                    <a:p>
+                      <a:pPr>
+                        <a:lnSpc>
+                          <a:spcPct val="107000"/>
+                        </a:lnSpc>
+                        <a:spcAft>
+                          <a:spcPts val="800"/>
+                        </a:spcAft>
+                      </a:pPr>
+                      <a:r>
+                        <a:rPr lang="pt-BR" sz="1400">
+                          <a:effectLst/>
+                        </a:rPr>
+                        <a:t>IT</a:t>
+                      </a:r>
+                      <a:endParaRPr lang="pt-BR" sz="1400">
+                        <a:effectLst/>
+                        <a:latin typeface="Calibri" panose="020F0502020204030204" pitchFamily="34" charset="0"/>
+                        <a:ea typeface="Calibri" panose="020F0502020204030204" pitchFamily="34" charset="0"/>
+                        <a:cs typeface="Times New Roman" panose="02020603050405020304" pitchFamily="18" charset="0"/>
+                      </a:endParaRPr>
+                    </a:p>
+                  </a:txBody>
+                  <a:tcPr marL="86399" marR="86399" marT="0" marB="0"/>
+                </a:tc>
+                <a:extLst>
+                  <a:ext uri="{0D108BD9-81ED-4DB2-BD59-A6C34878D82A}">
+                    <a16:rowId xmlns:a16="http://schemas.microsoft.com/office/drawing/2014/main" val="4255268901"/>
+                  </a:ext>
+                </a:extLst>
+              </a:tr>
+              <a:tr h="220286">
+                <a:tc>
+                  <a:txBody>
+                    <a:bodyPr/>
+                    <a:lstStyle/>
+                    <a:p>
+                      <a:pPr>
+                        <a:lnSpc>
+                          <a:spcPct val="107000"/>
+                        </a:lnSpc>
+                        <a:spcAft>
+                          <a:spcPts val="800"/>
+                        </a:spcAft>
+                      </a:pPr>
+                      <a:r>
+                        <a:rPr lang="pt-BR" sz="1400">
+                          <a:effectLst/>
+                        </a:rPr>
+                        <a:t>50</a:t>
+                      </a:r>
+                      <a:endParaRPr lang="pt-BR" sz="1400">
+                        <a:effectLst/>
+                        <a:latin typeface="Calibri" panose="020F0502020204030204" pitchFamily="34" charset="0"/>
+                        <a:ea typeface="Calibri" panose="020F0502020204030204" pitchFamily="34" charset="0"/>
+                        <a:cs typeface="Times New Roman" panose="02020603050405020304" pitchFamily="18" charset="0"/>
+                      </a:endParaRPr>
+                    </a:p>
+                  </a:txBody>
+                  <a:tcPr marL="86399" marR="86399" marT="0" marB="0"/>
+                </a:tc>
+                <a:tc>
+                  <a:txBody>
+                    <a:bodyPr/>
+                    <a:lstStyle/>
+                    <a:p>
+                      <a:pPr>
+                        <a:lnSpc>
+                          <a:spcPct val="107000"/>
+                        </a:lnSpc>
+                        <a:spcAft>
+                          <a:spcPts val="800"/>
+                        </a:spcAft>
+                      </a:pPr>
+                      <a:r>
+                        <a:rPr lang="pt-BR" sz="1400">
+                          <a:effectLst/>
+                        </a:rPr>
+                        <a:t> Zurique </a:t>
+                      </a:r>
+                      <a:endParaRPr lang="pt-BR" sz="1400">
+                        <a:effectLst/>
+                        <a:latin typeface="Calibri" panose="020F0502020204030204" pitchFamily="34" charset="0"/>
+                        <a:ea typeface="Calibri" panose="020F0502020204030204" pitchFamily="34" charset="0"/>
+                        <a:cs typeface="Times New Roman" panose="02020603050405020304" pitchFamily="18" charset="0"/>
+                      </a:endParaRPr>
+                    </a:p>
+                  </a:txBody>
+                  <a:tcPr marL="86399" marR="86399" marT="0" marB="0"/>
+                </a:tc>
+                <a:tc>
+                  <a:txBody>
+                    <a:bodyPr/>
+                    <a:lstStyle/>
+                    <a:p>
+                      <a:pPr>
+                        <a:lnSpc>
+                          <a:spcPct val="107000"/>
+                        </a:lnSpc>
+                        <a:spcAft>
+                          <a:spcPts val="800"/>
+                        </a:spcAft>
+                      </a:pPr>
+                      <a:r>
+                        <a:rPr lang="pt-BR" sz="1400" dirty="0">
+                          <a:effectLst/>
+                        </a:rPr>
+                        <a:t>CH/DE</a:t>
+                      </a:r>
+                      <a:endParaRPr lang="pt-BR" sz="1400" dirty="0">
+                        <a:effectLst/>
+                        <a:latin typeface="Calibri" panose="020F0502020204030204" pitchFamily="34" charset="0"/>
+                        <a:ea typeface="Calibri" panose="020F0502020204030204" pitchFamily="34" charset="0"/>
+                        <a:cs typeface="Times New Roman" panose="02020603050405020304" pitchFamily="18" charset="0"/>
+                      </a:endParaRPr>
+                    </a:p>
+                  </a:txBody>
+                  <a:tcPr marL="86399" marR="86399" marT="0" marB="0"/>
+                </a:tc>
+                <a:extLst>
+                  <a:ext uri="{0D108BD9-81ED-4DB2-BD59-A6C34878D82A}">
+                    <a16:rowId xmlns:a16="http://schemas.microsoft.com/office/drawing/2014/main" val="3324768410"/>
+                  </a:ext>
+                </a:extLst>
+              </a:tr>
+            </a:tbl>
+          </a:graphicData>
+        </a:graphic>
+      </p:graphicFrame>
     </p:spTree>
     <p:extLst>
       <p:ext uri="{BB962C8B-B14F-4D97-AF65-F5344CB8AC3E}">
-        <p14:creationId xmlns:p14="http://schemas.microsoft.com/office/powerpoint/2010/main" val="1387175423"/>
+        <p14:creationId xmlns:p14="http://schemas.microsoft.com/office/powerpoint/2010/main" val="651522141"/>
       </p:ext>
     </p:extLst>
   </p:cSld>
@@ -13253,6 +15376,70 @@
     <p:extLst>
       <p:ext uri="{BB962C8B-B14F-4D97-AF65-F5344CB8AC3E}">
         <p14:creationId xmlns:p14="http://schemas.microsoft.com/office/powerpoint/2010/main" val="362361806"/>
+      </p:ext>
+    </p:extLst>
+  </p:cSld>
+  <p:clrMapOvr>
+    <a:masterClrMapping/>
+  </p:clrMapOvr>
+</p:sld>
+</file>
+
+<file path=ppt/slides/slide20.xml><?xml version="1.0" encoding="utf-8"?>
+<p:sld xmlns:a="http://schemas.openxmlformats.org/drawingml/2006/main" xmlns:r="http://schemas.openxmlformats.org/officeDocument/2006/relationships" xmlns:p="http://schemas.openxmlformats.org/presentationml/2006/main">
+  <p:cSld>
+    <p:spTree>
+      <p:nvGrpSpPr>
+        <p:cNvPr id="1" name=""/>
+        <p:cNvGrpSpPr/>
+        <p:nvPr/>
+      </p:nvGrpSpPr>
+      <p:grpSpPr>
+        <a:xfrm>
+          <a:off x="0" y="0"/>
+          <a:ext cx="0" cy="0"/>
+          <a:chOff x="0" y="0"/>
+          <a:chExt cx="0" cy="0"/>
+        </a:xfrm>
+      </p:grpSpPr>
+      <p:sp>
+        <p:nvSpPr>
+          <p:cNvPr id="2" name="Título 1">
+            <a:extLst>
+              <a:ext uri="{FF2B5EF4-FFF2-40B4-BE49-F238E27FC236}">
+                <a16:creationId xmlns:a16="http://schemas.microsoft.com/office/drawing/2014/main" id="{3438147E-AC69-42F8-8FAF-747C320F62BE}"/>
+              </a:ext>
+            </a:extLst>
+          </p:cNvPr>
+          <p:cNvSpPr>
+            <a:spLocks noGrp="1"/>
+          </p:cNvSpPr>
+          <p:nvPr>
+            <p:ph type="title"/>
+          </p:nvPr>
+        </p:nvSpPr>
+        <p:spPr/>
+        <p:txBody>
+          <a:bodyPr/>
+          <a:lstStyle/>
+          <a:p>
+            <a:r>
+              <a:rPr lang="pt-BR" sz="1800" b="1" dirty="0">
+                <a:effectLst/>
+                <a:latin typeface="Calibri" panose="020F0502020204030204" pitchFamily="34" charset="0"/>
+                <a:ea typeface="Calibri" panose="020F0502020204030204" pitchFamily="34" charset="0"/>
+                <a:cs typeface="Times New Roman" panose="02020603050405020304" pitchFamily="18" charset="0"/>
+              </a:rPr>
+              <a:t>Indicadores Nacionais de Ciência e Tecnologia e Inovação 2019</a:t>
+            </a:r>
+            <a:endParaRPr lang="pt-BR" dirty="0"/>
+          </a:p>
+        </p:txBody>
+      </p:sp>
+    </p:spTree>
+    <p:extLst>
+      <p:ext uri="{BB962C8B-B14F-4D97-AF65-F5344CB8AC3E}">
+        <p14:creationId xmlns:p14="http://schemas.microsoft.com/office/powerpoint/2010/main" val="1387175423"/>
       </p:ext>
     </p:extLst>
   </p:cSld>

</xml_diff>

<commit_message>
Indicadores CTIC até a página 28
</commit_message>
<xml_diff>
--- a/apresentacao-sbg-2020.pptx
+++ b/apresentacao-sbg-2020.pptx
@@ -25,32 +25,36 @@
     <p:sldId id="288" r:id="rId19"/>
     <p:sldId id="289" r:id="rId20"/>
     <p:sldId id="282" r:id="rId21"/>
+    <p:sldId id="290" r:id="rId22"/>
+    <p:sldId id="291" r:id="rId23"/>
+    <p:sldId id="292" r:id="rId24"/>
+    <p:sldId id="293" r:id="rId25"/>
   </p:sldIdLst>
   <p:sldSz cx="9753600" cy="7315200"/>
   <p:notesSz cx="6858000" cy="9144000"/>
   <p:embeddedFontLst>
     <p:embeddedFont>
       <p:font typeface="Calibri" panose="020F0502020204030204" pitchFamily="34" charset="0"/>
-      <p:regular r:id="rId22"/>
-      <p:bold r:id="rId23"/>
-      <p:italic r:id="rId24"/>
-      <p:boldItalic r:id="rId25"/>
+      <p:regular r:id="rId26"/>
+      <p:bold r:id="rId27"/>
+      <p:italic r:id="rId28"/>
+      <p:boldItalic r:id="rId29"/>
     </p:embeddedFont>
     <p:embeddedFont>
       <p:font typeface="Josefin Sans Regular Bold" panose="020B0604020202020204" charset="0"/>
-      <p:regular r:id="rId26"/>
+      <p:regular r:id="rId30"/>
     </p:embeddedFont>
     <p:embeddedFont>
       <p:font typeface="Poppins" panose="00000500000000000000" pitchFamily="2" charset="0"/>
-      <p:regular r:id="rId27"/>
-      <p:bold r:id="rId28"/>
-      <p:italic r:id="rId29"/>
-      <p:boldItalic r:id="rId30"/>
+      <p:regular r:id="rId31"/>
+      <p:bold r:id="rId32"/>
+      <p:italic r:id="rId33"/>
+      <p:boldItalic r:id="rId34"/>
     </p:embeddedFont>
     <p:embeddedFont>
       <p:font typeface="Poppins Light" panose="00000400000000000000" pitchFamily="2" charset="0"/>
-      <p:regular r:id="rId31"/>
-      <p:italic r:id="rId32"/>
+      <p:regular r:id="rId35"/>
+      <p:italic r:id="rId36"/>
     </p:embeddedFont>
   </p:embeddedFontLst>
   <p:defaultTextStyle>
@@ -15449,6 +15453,499 @@
 </p:sld>
 </file>
 
+<file path=ppt/slides/slide21.xml><?xml version="1.0" encoding="utf-8"?>
+<p:sld xmlns:a="http://schemas.openxmlformats.org/drawingml/2006/main" xmlns:r="http://schemas.openxmlformats.org/officeDocument/2006/relationships" xmlns:p="http://schemas.openxmlformats.org/presentationml/2006/main">
+  <p:cSld>
+    <p:spTree>
+      <p:nvGrpSpPr>
+        <p:cNvPr id="1" name=""/>
+        <p:cNvGrpSpPr/>
+        <p:nvPr/>
+      </p:nvGrpSpPr>
+      <p:grpSpPr>
+        <a:xfrm>
+          <a:off x="0" y="0"/>
+          <a:ext cx="0" cy="0"/>
+          <a:chOff x="0" y="0"/>
+          <a:chExt cx="0" cy="0"/>
+        </a:xfrm>
+      </p:grpSpPr>
+      <p:sp>
+        <p:nvSpPr>
+          <p:cNvPr id="3" name="Título 2">
+            <a:extLst>
+              <a:ext uri="{FF2B5EF4-FFF2-40B4-BE49-F238E27FC236}">
+                <a16:creationId xmlns:a16="http://schemas.microsoft.com/office/drawing/2014/main" id="{B26534A5-42A1-43F1-B430-2F9C785E62C9}"/>
+              </a:ext>
+            </a:extLst>
+          </p:cNvPr>
+          <p:cNvSpPr>
+            <a:spLocks noGrp="1"/>
+          </p:cNvSpPr>
+          <p:nvPr>
+            <p:ph type="title"/>
+          </p:nvPr>
+        </p:nvSpPr>
+        <p:spPr/>
+        <p:txBody>
+          <a:bodyPr>
+            <a:noAutofit/>
+          </a:bodyPr>
+          <a:lstStyle/>
+          <a:p>
+            <a:r>
+              <a:rPr lang="pt-BR" sz="2800" dirty="0"/>
+              <a:t>Dispêndio nacional em ciência e tecnologia (C&amp;T) (em valores de 2017) por atividade</a:t>
+            </a:r>
+          </a:p>
+        </p:txBody>
+      </p:sp>
+      <p:sp>
+        <p:nvSpPr>
+          <p:cNvPr id="5" name="Espaço Reservado para Texto 4">
+            <a:extLst>
+              <a:ext uri="{FF2B5EF4-FFF2-40B4-BE49-F238E27FC236}">
+                <a16:creationId xmlns:a16="http://schemas.microsoft.com/office/drawing/2014/main" id="{520D949C-BC4F-41C9-B5F1-0597BFDDDEF2}"/>
+              </a:ext>
+            </a:extLst>
+          </p:cNvPr>
+          <p:cNvSpPr>
+            <a:spLocks noGrp="1"/>
+          </p:cNvSpPr>
+          <p:nvPr>
+            <p:ph type="body" sz="quarter" idx="13"/>
+          </p:nvPr>
+        </p:nvSpPr>
+        <p:spPr/>
+        <p:txBody>
+          <a:bodyPr/>
+          <a:lstStyle/>
+          <a:p>
+            <a:r>
+              <a:rPr lang="pt-BR" sz="2400" dirty="0"/>
+              <a:t>2000-2017</a:t>
+            </a:r>
+            <a:endParaRPr lang="pt-BR" dirty="0"/>
+          </a:p>
+        </p:txBody>
+      </p:sp>
+      <p:pic>
+        <p:nvPicPr>
+          <p:cNvPr id="10" name="Espaço Reservado para Conteúdo 6" descr="Uma imagem contendo texto, mapa&#10;&#10;Descrição gerada automaticamente">
+            <a:extLst>
+              <a:ext uri="{FF2B5EF4-FFF2-40B4-BE49-F238E27FC236}">
+                <a16:creationId xmlns:a16="http://schemas.microsoft.com/office/drawing/2014/main" id="{BCE9FF5E-A6EB-4AB6-B8F9-1A0B71254680}"/>
+              </a:ext>
+            </a:extLst>
+          </p:cNvPr>
+          <p:cNvPicPr>
+            <a:picLocks noGrp="1" noChangeAspect="1"/>
+          </p:cNvPicPr>
+          <p:nvPr>
+            <p:ph idx="1"/>
+          </p:nvPr>
+        </p:nvPicPr>
+        <p:blipFill>
+          <a:blip r:embed="rId2">
+            <a:extLst>
+              <a:ext uri="{28A0092B-C50C-407E-A947-70E740481C1C}">
+                <a14:useLocalDpi xmlns:a14="http://schemas.microsoft.com/office/drawing/2010/main" val="0"/>
+              </a:ext>
+            </a:extLst>
+          </a:blip>
+          <a:stretch>
+            <a:fillRect/>
+          </a:stretch>
+        </p:blipFill>
+        <p:spPr>
+          <a:xfrm>
+            <a:off x="933655" y="1838325"/>
+            <a:ext cx="7886290" cy="4562475"/>
+          </a:xfrm>
+        </p:spPr>
+      </p:pic>
+    </p:spTree>
+    <p:extLst>
+      <p:ext uri="{BB962C8B-B14F-4D97-AF65-F5344CB8AC3E}">
+        <p14:creationId xmlns:p14="http://schemas.microsoft.com/office/powerpoint/2010/main" val="2900925845"/>
+      </p:ext>
+    </p:extLst>
+  </p:cSld>
+  <p:clrMapOvr>
+    <a:masterClrMapping/>
+  </p:clrMapOvr>
+</p:sld>
+</file>
+
+<file path=ppt/slides/slide22.xml><?xml version="1.0" encoding="utf-8"?>
+<p:sld xmlns:a="http://schemas.openxmlformats.org/drawingml/2006/main" xmlns:r="http://schemas.openxmlformats.org/officeDocument/2006/relationships" xmlns:p="http://schemas.openxmlformats.org/presentationml/2006/main">
+  <p:cSld>
+    <p:spTree>
+      <p:nvGrpSpPr>
+        <p:cNvPr id="1" name=""/>
+        <p:cNvGrpSpPr/>
+        <p:nvPr/>
+      </p:nvGrpSpPr>
+      <p:grpSpPr>
+        <a:xfrm>
+          <a:off x="0" y="0"/>
+          <a:ext cx="0" cy="0"/>
+          <a:chOff x="0" y="0"/>
+          <a:chExt cx="0" cy="0"/>
+        </a:xfrm>
+      </p:grpSpPr>
+      <p:sp>
+        <p:nvSpPr>
+          <p:cNvPr id="2" name="Título 1">
+            <a:extLst>
+              <a:ext uri="{FF2B5EF4-FFF2-40B4-BE49-F238E27FC236}">
+                <a16:creationId xmlns:a16="http://schemas.microsoft.com/office/drawing/2014/main" id="{4CEC0666-11B8-410C-8500-C62BB753B5DD}"/>
+              </a:ext>
+            </a:extLst>
+          </p:cNvPr>
+          <p:cNvSpPr>
+            <a:spLocks noGrp="1"/>
+          </p:cNvSpPr>
+          <p:nvPr>
+            <p:ph type="title"/>
+          </p:nvPr>
+        </p:nvSpPr>
+        <p:spPr/>
+        <p:txBody>
+          <a:bodyPr>
+            <a:noAutofit/>
+          </a:bodyPr>
+          <a:lstStyle/>
+          <a:p>
+            <a:r>
+              <a:rPr lang="pt-BR" sz="2800" dirty="0"/>
+              <a:t>Dispêndio nacional em ciência e tecnologia (C&amp;T) em relação ao produto interno bruto (PIB) por setor</a:t>
+            </a:r>
+          </a:p>
+        </p:txBody>
+      </p:sp>
+      <p:sp>
+        <p:nvSpPr>
+          <p:cNvPr id="4" name="Espaço Reservado para Texto 3">
+            <a:extLst>
+              <a:ext uri="{FF2B5EF4-FFF2-40B4-BE49-F238E27FC236}">
+                <a16:creationId xmlns:a16="http://schemas.microsoft.com/office/drawing/2014/main" id="{590AC66B-C1CF-41B1-8523-8F988CF69D74}"/>
+              </a:ext>
+            </a:extLst>
+          </p:cNvPr>
+          <p:cNvSpPr>
+            <a:spLocks noGrp="1"/>
+          </p:cNvSpPr>
+          <p:nvPr>
+            <p:ph type="body" sz="quarter" idx="13"/>
+          </p:nvPr>
+        </p:nvSpPr>
+        <p:spPr/>
+        <p:txBody>
+          <a:bodyPr/>
+          <a:lstStyle/>
+          <a:p>
+            <a:r>
+              <a:rPr lang="pt-BR" dirty="0"/>
+              <a:t>2000-2017</a:t>
+            </a:r>
+          </a:p>
+        </p:txBody>
+      </p:sp>
+      <p:pic>
+        <p:nvPicPr>
+          <p:cNvPr id="9" name="Espaço Reservado para Conteúdo 5">
+            <a:extLst>
+              <a:ext uri="{FF2B5EF4-FFF2-40B4-BE49-F238E27FC236}">
+                <a16:creationId xmlns:a16="http://schemas.microsoft.com/office/drawing/2014/main" id="{8790572A-AD5C-43BC-9A72-B9C167F1E5A1}"/>
+              </a:ext>
+            </a:extLst>
+          </p:cNvPr>
+          <p:cNvPicPr>
+            <a:picLocks noGrp="1" noChangeAspect="1"/>
+          </p:cNvPicPr>
+          <p:nvPr>
+            <p:ph idx="1"/>
+          </p:nvPr>
+        </p:nvPicPr>
+        <p:blipFill>
+          <a:blip r:embed="rId2" cstate="print">
+            <a:extLst>
+              <a:ext uri="{28A0092B-C50C-407E-A947-70E740481C1C}">
+                <a14:useLocalDpi xmlns:a14="http://schemas.microsoft.com/office/drawing/2010/main" val="0"/>
+              </a:ext>
+            </a:extLst>
+          </a:blip>
+          <a:stretch>
+            <a:fillRect/>
+          </a:stretch>
+        </p:blipFill>
+        <p:spPr>
+          <a:xfrm>
+            <a:off x="895817" y="1838325"/>
+            <a:ext cx="7961966" cy="4562475"/>
+          </a:xfrm>
+        </p:spPr>
+      </p:pic>
+    </p:spTree>
+    <p:extLst>
+      <p:ext uri="{BB962C8B-B14F-4D97-AF65-F5344CB8AC3E}">
+        <p14:creationId xmlns:p14="http://schemas.microsoft.com/office/powerpoint/2010/main" val="4205440663"/>
+      </p:ext>
+    </p:extLst>
+  </p:cSld>
+  <p:clrMapOvr>
+    <a:masterClrMapping/>
+  </p:clrMapOvr>
+</p:sld>
+</file>
+
+<file path=ppt/slides/slide23.xml><?xml version="1.0" encoding="utf-8"?>
+<p:sld xmlns:a="http://schemas.openxmlformats.org/drawingml/2006/main" xmlns:r="http://schemas.openxmlformats.org/officeDocument/2006/relationships" xmlns:p="http://schemas.openxmlformats.org/presentationml/2006/main">
+  <p:cSld>
+    <p:spTree>
+      <p:nvGrpSpPr>
+        <p:cNvPr id="1" name=""/>
+        <p:cNvGrpSpPr/>
+        <p:nvPr/>
+      </p:nvGrpSpPr>
+      <p:grpSpPr>
+        <a:xfrm>
+          <a:off x="0" y="0"/>
+          <a:ext cx="0" cy="0"/>
+          <a:chOff x="0" y="0"/>
+          <a:chExt cx="0" cy="0"/>
+        </a:xfrm>
+      </p:grpSpPr>
+      <p:sp>
+        <p:nvSpPr>
+          <p:cNvPr id="2" name="Título 1">
+            <a:extLst>
+              <a:ext uri="{FF2B5EF4-FFF2-40B4-BE49-F238E27FC236}">
+                <a16:creationId xmlns:a16="http://schemas.microsoft.com/office/drawing/2014/main" id="{79663FC4-424E-4544-8E23-E0599CBADFEF}"/>
+              </a:ext>
+            </a:extLst>
+          </p:cNvPr>
+          <p:cNvSpPr>
+            <a:spLocks noGrp="1"/>
+          </p:cNvSpPr>
+          <p:nvPr>
+            <p:ph type="title"/>
+          </p:nvPr>
+        </p:nvSpPr>
+        <p:spPr/>
+        <p:txBody>
+          <a:bodyPr>
+            <a:noAutofit/>
+          </a:bodyPr>
+          <a:lstStyle/>
+          <a:p>
+            <a:r>
+              <a:rPr lang="pt-BR" sz="2400" dirty="0"/>
+              <a:t>Dispêndio nacional em pesquisa e desenvolvimento (P&amp;D) em relação ao produto interno bruto (PIB) por setor</a:t>
+            </a:r>
+          </a:p>
+        </p:txBody>
+      </p:sp>
+      <p:sp>
+        <p:nvSpPr>
+          <p:cNvPr id="4" name="Espaço Reservado para Texto 3">
+            <a:extLst>
+              <a:ext uri="{FF2B5EF4-FFF2-40B4-BE49-F238E27FC236}">
+                <a16:creationId xmlns:a16="http://schemas.microsoft.com/office/drawing/2014/main" id="{5C776551-9108-44BD-8DC7-876ED40DBC4A}"/>
+              </a:ext>
+            </a:extLst>
+          </p:cNvPr>
+          <p:cNvSpPr>
+            <a:spLocks noGrp="1"/>
+          </p:cNvSpPr>
+          <p:nvPr>
+            <p:ph type="body" sz="quarter" idx="13"/>
+          </p:nvPr>
+        </p:nvSpPr>
+        <p:spPr/>
+        <p:txBody>
+          <a:bodyPr/>
+          <a:lstStyle/>
+          <a:p>
+            <a:r>
+              <a:rPr lang="pt-BR" dirty="0"/>
+              <a:t>2000-2017</a:t>
+            </a:r>
+          </a:p>
+        </p:txBody>
+      </p:sp>
+      <p:pic>
+        <p:nvPicPr>
+          <p:cNvPr id="9" name="Espaço Reservado para Conteúdo 5">
+            <a:extLst>
+              <a:ext uri="{FF2B5EF4-FFF2-40B4-BE49-F238E27FC236}">
+                <a16:creationId xmlns:a16="http://schemas.microsoft.com/office/drawing/2014/main" id="{07D1C5D8-2D4E-43F8-B00D-01AFCC144841}"/>
+              </a:ext>
+            </a:extLst>
+          </p:cNvPr>
+          <p:cNvPicPr>
+            <a:picLocks noGrp="1" noChangeAspect="1"/>
+          </p:cNvPicPr>
+          <p:nvPr>
+            <p:ph idx="1"/>
+          </p:nvPr>
+        </p:nvPicPr>
+        <p:blipFill>
+          <a:blip r:embed="rId2" cstate="print">
+            <a:extLst>
+              <a:ext uri="{28A0092B-C50C-407E-A947-70E740481C1C}">
+                <a14:useLocalDpi xmlns:a14="http://schemas.microsoft.com/office/drawing/2010/main" val="0"/>
+              </a:ext>
+            </a:extLst>
+          </a:blip>
+          <a:stretch>
+            <a:fillRect/>
+          </a:stretch>
+        </p:blipFill>
+        <p:spPr>
+          <a:xfrm>
+            <a:off x="895817" y="1838325"/>
+            <a:ext cx="7961966" cy="4562475"/>
+          </a:xfrm>
+        </p:spPr>
+      </p:pic>
+    </p:spTree>
+    <p:extLst>
+      <p:ext uri="{BB962C8B-B14F-4D97-AF65-F5344CB8AC3E}">
+        <p14:creationId xmlns:p14="http://schemas.microsoft.com/office/powerpoint/2010/main" val="3422659817"/>
+      </p:ext>
+    </p:extLst>
+  </p:cSld>
+  <p:clrMapOvr>
+    <a:masterClrMapping/>
+  </p:clrMapOvr>
+</p:sld>
+</file>
+
+<file path=ppt/slides/slide24.xml><?xml version="1.0" encoding="utf-8"?>
+<p:sld xmlns:a="http://schemas.openxmlformats.org/drawingml/2006/main" xmlns:r="http://schemas.openxmlformats.org/officeDocument/2006/relationships" xmlns:p="http://schemas.openxmlformats.org/presentationml/2006/main">
+  <p:cSld>
+    <p:spTree>
+      <p:nvGrpSpPr>
+        <p:cNvPr id="1" name=""/>
+        <p:cNvGrpSpPr/>
+        <p:nvPr/>
+      </p:nvGrpSpPr>
+      <p:grpSpPr>
+        <a:xfrm>
+          <a:off x="0" y="0"/>
+          <a:ext cx="0" cy="0"/>
+          <a:chOff x="0" y="0"/>
+          <a:chExt cx="0" cy="0"/>
+        </a:xfrm>
+      </p:grpSpPr>
+      <p:sp>
+        <p:nvSpPr>
+          <p:cNvPr id="2" name="Título 1">
+            <a:extLst>
+              <a:ext uri="{FF2B5EF4-FFF2-40B4-BE49-F238E27FC236}">
+                <a16:creationId xmlns:a16="http://schemas.microsoft.com/office/drawing/2014/main" id="{D4E7E92E-77AD-48BA-AFC5-ABBFD88101CB}"/>
+              </a:ext>
+            </a:extLst>
+          </p:cNvPr>
+          <p:cNvSpPr>
+            <a:spLocks noGrp="1"/>
+          </p:cNvSpPr>
+          <p:nvPr>
+            <p:ph type="title"/>
+          </p:nvPr>
+        </p:nvSpPr>
+        <p:spPr/>
+        <p:txBody>
+          <a:bodyPr>
+            <a:noAutofit/>
+          </a:bodyPr>
+          <a:lstStyle/>
+          <a:p>
+            <a:r>
+              <a:rPr lang="pt-BR" sz="2800" dirty="0"/>
+              <a:t>Distribuição percentual do dispêndio nacional em pesquisa e desenvolvimento (P&amp;D) por setor</a:t>
+            </a:r>
+          </a:p>
+        </p:txBody>
+      </p:sp>
+      <p:sp>
+        <p:nvSpPr>
+          <p:cNvPr id="4" name="Espaço Reservado para Texto 3">
+            <a:extLst>
+              <a:ext uri="{FF2B5EF4-FFF2-40B4-BE49-F238E27FC236}">
+                <a16:creationId xmlns:a16="http://schemas.microsoft.com/office/drawing/2014/main" id="{2D87DB7D-78CC-42C7-82BD-E85BA91476A6}"/>
+              </a:ext>
+            </a:extLst>
+          </p:cNvPr>
+          <p:cNvSpPr>
+            <a:spLocks noGrp="1"/>
+          </p:cNvSpPr>
+          <p:nvPr>
+            <p:ph type="body" sz="quarter" idx="13"/>
+          </p:nvPr>
+        </p:nvSpPr>
+        <p:spPr/>
+        <p:txBody>
+          <a:bodyPr/>
+          <a:lstStyle/>
+          <a:p>
+            <a:r>
+              <a:rPr lang="pt-BR" dirty="0"/>
+              <a:t>2000-2017</a:t>
+            </a:r>
+          </a:p>
+        </p:txBody>
+      </p:sp>
+      <p:pic>
+        <p:nvPicPr>
+          <p:cNvPr id="9" name="Espaço Reservado para Conteúdo 5">
+            <a:extLst>
+              <a:ext uri="{FF2B5EF4-FFF2-40B4-BE49-F238E27FC236}">
+                <a16:creationId xmlns:a16="http://schemas.microsoft.com/office/drawing/2014/main" id="{9E60FB7B-B6AE-4108-9B15-2BD868AF10D1}"/>
+              </a:ext>
+            </a:extLst>
+          </p:cNvPr>
+          <p:cNvPicPr>
+            <a:picLocks noGrp="1" noChangeAspect="1"/>
+          </p:cNvPicPr>
+          <p:nvPr>
+            <p:ph idx="1"/>
+          </p:nvPr>
+        </p:nvPicPr>
+        <p:blipFill>
+          <a:blip r:embed="rId2" cstate="print">
+            <a:extLst>
+              <a:ext uri="{28A0092B-C50C-407E-A947-70E740481C1C}">
+                <a14:useLocalDpi xmlns:a14="http://schemas.microsoft.com/office/drawing/2010/main" val="0"/>
+              </a:ext>
+            </a:extLst>
+          </a:blip>
+          <a:stretch>
+            <a:fillRect/>
+          </a:stretch>
+        </p:blipFill>
+        <p:spPr>
+          <a:xfrm>
+            <a:off x="895817" y="1838325"/>
+            <a:ext cx="7961966" cy="4562475"/>
+          </a:xfrm>
+        </p:spPr>
+      </p:pic>
+    </p:spTree>
+    <p:extLst>
+      <p:ext uri="{BB962C8B-B14F-4D97-AF65-F5344CB8AC3E}">
+        <p14:creationId xmlns:p14="http://schemas.microsoft.com/office/powerpoint/2010/main" val="1939033398"/>
+      </p:ext>
+    </p:extLst>
+  </p:cSld>
+  <p:clrMapOvr>
+    <a:masterClrMapping/>
+  </p:clrMapOvr>
+</p:sld>
+</file>
+
 <file path=ppt/slides/slide3.xml><?xml version="1.0" encoding="utf-8"?>
 <p:sld xmlns:a="http://schemas.openxmlformats.org/drawingml/2006/main" xmlns:r="http://schemas.openxmlformats.org/officeDocument/2006/relationships" xmlns:p="http://schemas.openxmlformats.org/presentationml/2006/main">
   <p:cSld>

</xml_diff>